<commit_message>
Agrego diapositivas a ppw
</commit_message>
<xml_diff>
--- a/Northwind traders.pptx
+++ b/Northwind traders.pptx
@@ -7,6 +7,8 @@
   <p:sldIdLst>
     <p:sldId id="256" r:id="rId2"/>
     <p:sldId id="257" r:id="rId3"/>
+    <p:sldId id="258" r:id="rId4"/>
+    <p:sldId id="259" r:id="rId5"/>
   </p:sldIdLst>
   <p:sldSz cx="12192000" cy="6858000"/>
   <p:notesSz cx="6858000" cy="9144000"/>
@@ -105,7 +107,3666 @@
       </a:defRPr>
     </a:lvl9pPr>
   </p:defaultTextStyle>
+  <p:extLst>
+    <p:ext uri="{EFAFB233-063F-42B5-8137-9DF3F51BA10A}">
+      <p15:sldGuideLst xmlns:p15="http://schemas.microsoft.com/office/powerpoint/2012/main"/>
+    </p:ext>
+  </p:extLst>
 </p:presentation>
+</file>
+
+<file path=ppt/charts/chart1.xml><?xml version="1.0" encoding="utf-8"?>
+<c:chartSpace xmlns:c="http://schemas.openxmlformats.org/drawingml/2006/chart" xmlns:a="http://schemas.openxmlformats.org/drawingml/2006/main" xmlns:r="http://schemas.openxmlformats.org/officeDocument/2006/relationships" xmlns:c16r2="http://schemas.microsoft.com/office/drawing/2015/06/chart">
+  <c:date1904 val="0"/>
+  <c:lang val="es-ES"/>
+  <c:roundedCorners val="0"/>
+  <mc:AlternateContent xmlns:mc="http://schemas.openxmlformats.org/markup-compatibility/2006">
+    <mc:Choice xmlns:c14="http://schemas.microsoft.com/office/drawing/2007/8/2/chart" Requires="c14">
+      <c14:style val="105"/>
+    </mc:Choice>
+    <mc:Fallback>
+      <c:style val="5"/>
+    </mc:Fallback>
+  </mc:AlternateContent>
+  <c:chart>
+    <c:title>
+      <c:tx>
+        <c:rich>
+          <a:bodyPr rot="0" spcFirstLastPara="1" vertOverflow="ellipsis" vert="horz" wrap="square" anchor="ctr" anchorCtr="1"/>
+          <a:lstStyle/>
+          <a:p>
+            <a:pPr>
+              <a:defRPr sz="2200" b="1" i="0" u="none" strike="noStrike" kern="1200" baseline="0">
+                <a:solidFill>
+                  <a:schemeClr val="tx1"/>
+                </a:solidFill>
+                <a:latin typeface="+mn-lt"/>
+                <a:ea typeface="+mn-ea"/>
+                <a:cs typeface="+mn-cs"/>
+              </a:defRPr>
+            </a:pPr>
+            <a:r>
+              <a:rPr lang="en-US">
+                <a:solidFill>
+                  <a:schemeClr val="tx1"/>
+                </a:solidFill>
+              </a:rPr>
+              <a:t>Top 5 clientes por país</a:t>
+            </a:r>
+          </a:p>
+        </c:rich>
+      </c:tx>
+      <c:layout>
+        <c:manualLayout>
+          <c:xMode val="edge"/>
+          <c:yMode val="edge"/>
+          <c:x val="0.26548635738274995"/>
+          <c:y val="2.2089139825124744E-2"/>
+        </c:manualLayout>
+      </c:layout>
+      <c:overlay val="0"/>
+      <c:spPr>
+        <a:noFill/>
+        <a:ln>
+          <a:noFill/>
+        </a:ln>
+        <a:effectLst/>
+      </c:spPr>
+      <c:txPr>
+        <a:bodyPr rot="0" spcFirstLastPara="1" vertOverflow="ellipsis" vert="horz" wrap="square" anchor="ctr" anchorCtr="1"/>
+        <a:lstStyle/>
+        <a:p>
+          <a:pPr>
+            <a:defRPr sz="2200" b="1" i="0" u="none" strike="noStrike" kern="1200" baseline="0">
+              <a:solidFill>
+                <a:schemeClr val="tx1"/>
+              </a:solidFill>
+              <a:latin typeface="+mn-lt"/>
+              <a:ea typeface="+mn-ea"/>
+              <a:cs typeface="+mn-cs"/>
+            </a:defRPr>
+          </a:pPr>
+          <a:endParaRPr lang="es-ES"/>
+        </a:p>
+      </c:txPr>
+    </c:title>
+    <c:autoTitleDeleted val="0"/>
+    <c:plotArea>
+      <c:layout>
+        <c:manualLayout>
+          <c:layoutTarget val="inner"/>
+          <c:xMode val="edge"/>
+          <c:yMode val="edge"/>
+          <c:x val="0.14234844991343176"/>
+          <c:y val="0.13898852031461659"/>
+          <c:w val="0.83173561344321745"/>
+          <c:h val="0.67586448399682408"/>
+        </c:manualLayout>
+      </c:layout>
+      <c:barChart>
+        <c:barDir val="bar"/>
+        <c:grouping val="clustered"/>
+        <c:varyColors val="0"/>
+        <c:ser>
+          <c:idx val="0"/>
+          <c:order val="0"/>
+          <c:tx>
+            <c:strRef>
+              <c:f>Hoja1!$B$1</c:f>
+              <c:strCache>
+                <c:ptCount val="1"/>
+                <c:pt idx="0">
+                  <c:v>Total Clientes</c:v>
+                </c:pt>
+              </c:strCache>
+            </c:strRef>
+          </c:tx>
+          <c:spPr>
+            <a:solidFill>
+              <a:schemeClr val="accent3">
+                <a:lumMod val="75000"/>
+                <a:alpha val="85000"/>
+              </a:schemeClr>
+            </a:solidFill>
+            <a:ln w="9525" cap="flat" cmpd="sng" algn="ctr">
+              <a:solidFill>
+                <a:schemeClr val="lt1">
+                  <a:alpha val="50000"/>
+                </a:schemeClr>
+              </a:solidFill>
+              <a:round/>
+            </a:ln>
+            <a:effectLst/>
+          </c:spPr>
+          <c:invertIfNegative val="0"/>
+          <c:dLbls>
+            <c:spPr>
+              <a:noFill/>
+              <a:ln>
+                <a:noFill/>
+              </a:ln>
+              <a:effectLst/>
+            </c:spPr>
+            <c:txPr>
+              <a:bodyPr rot="0" spcFirstLastPara="1" vertOverflow="ellipsis" vert="horz" wrap="square" lIns="38100" tIns="19050" rIns="38100" bIns="19050" anchor="ctr" anchorCtr="1">
+                <a:spAutoFit/>
+              </a:bodyPr>
+              <a:lstStyle/>
+              <a:p>
+                <a:pPr>
+                  <a:defRPr sz="1197" b="1" i="0" u="none" strike="noStrike" kern="1200" baseline="0">
+                    <a:solidFill>
+                      <a:schemeClr val="lt1"/>
+                    </a:solidFill>
+                    <a:latin typeface="+mn-lt"/>
+                    <a:ea typeface="+mn-ea"/>
+                    <a:cs typeface="+mn-cs"/>
+                  </a:defRPr>
+                </a:pPr>
+                <a:endParaRPr lang="es-ES"/>
+              </a:p>
+            </c:txPr>
+            <c:dLblPos val="inEnd"/>
+            <c:showLegendKey val="0"/>
+            <c:showVal val="1"/>
+            <c:showCatName val="0"/>
+            <c:showSerName val="0"/>
+            <c:showPercent val="0"/>
+            <c:showBubbleSize val="0"/>
+            <c:showLeaderLines val="0"/>
+            <c:extLst>
+              <c:ext xmlns:c15="http://schemas.microsoft.com/office/drawing/2012/chart" uri="{CE6537A1-D6FC-4f65-9D91-7224C49458BB}">
+                <c15:showLeaderLines val="1"/>
+                <c15:leaderLines>
+                  <c:spPr>
+                    <a:ln w="9525">
+                      <a:solidFill>
+                        <a:schemeClr val="dk1">
+                          <a:lumMod val="50000"/>
+                          <a:lumOff val="50000"/>
+                        </a:schemeClr>
+                      </a:solidFill>
+                    </a:ln>
+                    <a:effectLst/>
+                  </c:spPr>
+                </c15:leaderLines>
+              </c:ext>
+            </c:extLst>
+          </c:dLbls>
+          <c:cat>
+            <c:strRef>
+              <c:f>Hoja1!$A$2:$A$5</c:f>
+              <c:strCache>
+                <c:ptCount val="4"/>
+                <c:pt idx="0">
+                  <c:v>USA</c:v>
+                </c:pt>
+                <c:pt idx="1">
+                  <c:v>France</c:v>
+                </c:pt>
+                <c:pt idx="2">
+                  <c:v>Germany</c:v>
+                </c:pt>
+                <c:pt idx="3">
+                  <c:v>Brazil</c:v>
+                </c:pt>
+              </c:strCache>
+            </c:strRef>
+          </c:cat>
+          <c:val>
+            <c:numRef>
+              <c:f>Hoja1!$B$2:$B$5</c:f>
+              <c:numCache>
+                <c:formatCode>General</c:formatCode>
+                <c:ptCount val="4"/>
+                <c:pt idx="0">
+                  <c:v>13</c:v>
+                </c:pt>
+                <c:pt idx="1">
+                  <c:v>11</c:v>
+                </c:pt>
+                <c:pt idx="2">
+                  <c:v>11</c:v>
+                </c:pt>
+                <c:pt idx="3">
+                  <c:v>9</c:v>
+                </c:pt>
+              </c:numCache>
+            </c:numRef>
+          </c:val>
+          <c:extLst>
+            <c:ext xmlns:c16="http://schemas.microsoft.com/office/drawing/2014/chart" uri="{C3380CC4-5D6E-409C-BE32-E72D297353CC}">
+              <c16:uniqueId val="{00000000-3A99-45EB-8C0D-2F46B8BCD508}"/>
+            </c:ext>
+          </c:extLst>
+        </c:ser>
+        <c:dLbls>
+          <c:dLblPos val="inEnd"/>
+          <c:showLegendKey val="0"/>
+          <c:showVal val="1"/>
+          <c:showCatName val="0"/>
+          <c:showSerName val="0"/>
+          <c:showPercent val="0"/>
+          <c:showBubbleSize val="0"/>
+        </c:dLbls>
+        <c:gapWidth val="65"/>
+        <c:axId val="1789632928"/>
+        <c:axId val="1789635808"/>
+      </c:barChart>
+      <c:catAx>
+        <c:axId val="1789632928"/>
+        <c:scaling>
+          <c:orientation val="minMax"/>
+        </c:scaling>
+        <c:delete val="0"/>
+        <c:axPos val="l"/>
+        <c:numFmt formatCode="General" sourceLinked="1"/>
+        <c:majorTickMark val="none"/>
+        <c:minorTickMark val="none"/>
+        <c:tickLblPos val="nextTo"/>
+        <c:spPr>
+          <a:noFill/>
+          <a:ln w="19050" cap="flat" cmpd="sng" algn="ctr">
+            <a:solidFill>
+              <a:schemeClr val="dk1">
+                <a:lumMod val="75000"/>
+                <a:lumOff val="25000"/>
+              </a:schemeClr>
+            </a:solidFill>
+            <a:round/>
+          </a:ln>
+          <a:effectLst/>
+        </c:spPr>
+        <c:txPr>
+          <a:bodyPr rot="-60000000" spcFirstLastPara="1" vertOverflow="ellipsis" vert="horz" wrap="square" anchor="ctr" anchorCtr="1"/>
+          <a:lstStyle/>
+          <a:p>
+            <a:pPr>
+              <a:defRPr sz="1197" b="0" i="0" u="none" strike="noStrike" kern="1200" cap="all" baseline="0">
+                <a:solidFill>
+                  <a:schemeClr val="tx1"/>
+                </a:solidFill>
+                <a:latin typeface="+mn-lt"/>
+                <a:ea typeface="+mn-ea"/>
+                <a:cs typeface="+mn-cs"/>
+              </a:defRPr>
+            </a:pPr>
+            <a:endParaRPr lang="es-ES"/>
+          </a:p>
+        </c:txPr>
+        <c:crossAx val="1789635808"/>
+        <c:crosses val="autoZero"/>
+        <c:auto val="1"/>
+        <c:lblAlgn val="ctr"/>
+        <c:lblOffset val="100"/>
+        <c:noMultiLvlLbl val="0"/>
+      </c:catAx>
+      <c:valAx>
+        <c:axId val="1789635808"/>
+        <c:scaling>
+          <c:orientation val="minMax"/>
+        </c:scaling>
+        <c:delete val="0"/>
+        <c:axPos val="b"/>
+        <c:majorGridlines>
+          <c:spPr>
+            <a:ln w="9525" cap="flat" cmpd="sng" algn="ctr">
+              <a:gradFill>
+                <a:gsLst>
+                  <a:gs pos="100000">
+                    <a:schemeClr val="dk1">
+                      <a:lumMod val="95000"/>
+                      <a:lumOff val="5000"/>
+                      <a:alpha val="42000"/>
+                    </a:schemeClr>
+                  </a:gs>
+                  <a:gs pos="0">
+                    <a:schemeClr val="lt1">
+                      <a:lumMod val="75000"/>
+                      <a:alpha val="36000"/>
+                    </a:schemeClr>
+                  </a:gs>
+                </a:gsLst>
+                <a:lin ang="5400000" scaled="0"/>
+              </a:gradFill>
+              <a:round/>
+            </a:ln>
+            <a:effectLst/>
+          </c:spPr>
+        </c:majorGridlines>
+        <c:numFmt formatCode="General" sourceLinked="1"/>
+        <c:majorTickMark val="none"/>
+        <c:minorTickMark val="none"/>
+        <c:tickLblPos val="nextTo"/>
+        <c:spPr>
+          <a:noFill/>
+          <a:ln>
+            <a:noFill/>
+          </a:ln>
+          <a:effectLst/>
+        </c:spPr>
+        <c:txPr>
+          <a:bodyPr rot="-60000000" spcFirstLastPara="1" vertOverflow="ellipsis" vert="horz" wrap="square" anchor="ctr" anchorCtr="1"/>
+          <a:lstStyle/>
+          <a:p>
+            <a:pPr>
+              <a:defRPr sz="1197" b="0" i="0" u="none" strike="noStrike" kern="1200" baseline="0">
+                <a:solidFill>
+                  <a:schemeClr val="dk1">
+                    <a:lumMod val="75000"/>
+                    <a:lumOff val="25000"/>
+                  </a:schemeClr>
+                </a:solidFill>
+                <a:latin typeface="+mn-lt"/>
+                <a:ea typeface="+mn-ea"/>
+                <a:cs typeface="+mn-cs"/>
+              </a:defRPr>
+            </a:pPr>
+            <a:endParaRPr lang="es-ES"/>
+          </a:p>
+        </c:txPr>
+        <c:crossAx val="1789632928"/>
+        <c:crosses val="autoZero"/>
+        <c:crossBetween val="between"/>
+      </c:valAx>
+      <c:spPr>
+        <a:noFill/>
+        <a:ln>
+          <a:noFill/>
+        </a:ln>
+        <a:effectLst/>
+      </c:spPr>
+    </c:plotArea>
+    <c:plotVisOnly val="1"/>
+    <c:dispBlanksAs val="gap"/>
+    <c:showDLblsOverMax val="0"/>
+    <c:extLst>
+      <c:ext xmlns:c16r3="http://schemas.microsoft.com/office/drawing/2017/03/chart" uri="{56B9EC1D-385E-4148-901F-78D8002777C0}">
+        <c16r3:dataDisplayOptions16>
+          <c16r3:dispNaAsBlank val="1"/>
+        </c16r3:dataDisplayOptions16>
+      </c:ext>
+    </c:extLst>
+  </c:chart>
+  <c:spPr>
+    <a:solidFill>
+      <a:schemeClr val="accent1"/>
+    </a:solidFill>
+    <a:ln w="9525" cap="flat" cmpd="sng" algn="ctr">
+      <a:solidFill>
+        <a:schemeClr val="dk1">
+          <a:lumMod val="25000"/>
+          <a:lumOff val="75000"/>
+        </a:schemeClr>
+      </a:solidFill>
+      <a:round/>
+    </a:ln>
+    <a:effectLst/>
+  </c:spPr>
+  <c:txPr>
+    <a:bodyPr/>
+    <a:lstStyle/>
+    <a:p>
+      <a:pPr>
+        <a:defRPr/>
+      </a:pPr>
+      <a:endParaRPr lang="es-ES"/>
+    </a:p>
+  </c:txPr>
+  <c:externalData r:id="rId3">
+    <c:autoUpdate val="0"/>
+  </c:externalData>
+</c:chartSpace>
+</file>
+
+<file path=ppt/charts/chart2.xml><?xml version="1.0" encoding="utf-8"?>
+<c:chartSpace xmlns:c="http://schemas.openxmlformats.org/drawingml/2006/chart" xmlns:a="http://schemas.openxmlformats.org/drawingml/2006/main" xmlns:r="http://schemas.openxmlformats.org/officeDocument/2006/relationships" xmlns:c16r2="http://schemas.microsoft.com/office/drawing/2015/06/chart">
+  <c:date1904 val="0"/>
+  <c:lang val="es-ES"/>
+  <c:roundedCorners val="0"/>
+  <mc:AlternateContent xmlns:mc="http://schemas.openxmlformats.org/markup-compatibility/2006">
+    <mc:Choice xmlns:c14="http://schemas.microsoft.com/office/drawing/2007/8/2/chart" Requires="c14">
+      <c14:style val="105"/>
+    </mc:Choice>
+    <mc:Fallback>
+      <c:style val="5"/>
+    </mc:Fallback>
+  </mc:AlternateContent>
+  <c:chart>
+    <c:title>
+      <c:tx>
+        <c:rich>
+          <a:bodyPr rot="0" spcFirstLastPara="1" vertOverflow="ellipsis" vert="horz" wrap="square" anchor="ctr" anchorCtr="1"/>
+          <a:lstStyle/>
+          <a:p>
+            <a:pPr>
+              <a:defRPr lang="en-US" sz="1596" b="0" i="0" u="none" strike="noStrike" kern="1200" baseline="0">
+                <a:solidFill>
+                  <a:schemeClr val="tx1"/>
+                </a:solidFill>
+                <a:latin typeface="+mn-lt"/>
+                <a:ea typeface="+mn-ea"/>
+                <a:cs typeface="+mn-cs"/>
+              </a:defRPr>
+            </a:pPr>
+            <a:r>
+              <a:rPr lang="en-US"/>
+              <a:t>Productos por categoría</a:t>
+            </a:r>
+          </a:p>
+        </c:rich>
+      </c:tx>
+      <c:overlay val="0"/>
+      <c:spPr>
+        <a:noFill/>
+        <a:ln>
+          <a:noFill/>
+        </a:ln>
+        <a:effectLst/>
+      </c:spPr>
+      <c:txPr>
+        <a:bodyPr rot="0" spcFirstLastPara="1" vertOverflow="ellipsis" vert="horz" wrap="square" anchor="ctr" anchorCtr="1"/>
+        <a:lstStyle/>
+        <a:p>
+          <a:pPr>
+            <a:defRPr lang="en-US" sz="1596" b="0" i="0" u="none" strike="noStrike" kern="1200" baseline="0">
+              <a:solidFill>
+                <a:schemeClr val="tx1"/>
+              </a:solidFill>
+              <a:latin typeface="+mn-lt"/>
+              <a:ea typeface="+mn-ea"/>
+              <a:cs typeface="+mn-cs"/>
+            </a:defRPr>
+          </a:pPr>
+          <a:endParaRPr lang="es-ES"/>
+        </a:p>
+      </c:txPr>
+    </c:title>
+    <c:autoTitleDeleted val="0"/>
+    <c:plotArea>
+      <c:layout/>
+      <c:barChart>
+        <c:barDir val="bar"/>
+        <c:grouping val="clustered"/>
+        <c:varyColors val="0"/>
+        <c:ser>
+          <c:idx val="0"/>
+          <c:order val="0"/>
+          <c:tx>
+            <c:strRef>
+              <c:f>Hoja1!$B$1</c:f>
+              <c:strCache>
+                <c:ptCount val="1"/>
+                <c:pt idx="0">
+                  <c:v>Serie 1</c:v>
+                </c:pt>
+              </c:strCache>
+            </c:strRef>
+          </c:tx>
+          <c:spPr>
+            <a:solidFill>
+              <a:schemeClr val="accent3">
+                <a:lumMod val="75000"/>
+                <a:alpha val="85000"/>
+              </a:schemeClr>
+            </a:solidFill>
+            <a:ln w="9525" cap="flat" cmpd="sng" algn="ctr">
+              <a:solidFill>
+                <a:schemeClr val="lt1">
+                  <a:alpha val="50000"/>
+                </a:schemeClr>
+              </a:solidFill>
+              <a:round/>
+            </a:ln>
+            <a:effectLst/>
+          </c:spPr>
+          <c:invertIfNegative val="0"/>
+          <c:dLbls>
+            <c:spPr>
+              <a:noFill/>
+              <a:ln>
+                <a:noFill/>
+              </a:ln>
+              <a:effectLst/>
+            </c:spPr>
+            <c:txPr>
+              <a:bodyPr rot="0" spcFirstLastPara="1" vertOverflow="ellipsis" vert="horz" wrap="square" anchor="ctr" anchorCtr="1"/>
+              <a:lstStyle/>
+              <a:p>
+                <a:pPr>
+                  <a:defRPr lang="en-US" sz="1330" b="0" i="0" u="none" strike="noStrike" kern="1200" baseline="0">
+                    <a:solidFill>
+                      <a:schemeClr val="tx1"/>
+                    </a:solidFill>
+                    <a:latin typeface="+mn-lt"/>
+                    <a:ea typeface="+mn-ea"/>
+                    <a:cs typeface="+mn-cs"/>
+                  </a:defRPr>
+                </a:pPr>
+                <a:endParaRPr lang="es-ES"/>
+              </a:p>
+            </c:txPr>
+            <c:dLblPos val="inEnd"/>
+            <c:showLegendKey val="0"/>
+            <c:showVal val="1"/>
+            <c:showCatName val="0"/>
+            <c:showSerName val="0"/>
+            <c:showPercent val="0"/>
+            <c:showBubbleSize val="0"/>
+            <c:showLeaderLines val="0"/>
+            <c:extLst>
+              <c:ext xmlns:c15="http://schemas.microsoft.com/office/drawing/2012/chart" uri="{CE6537A1-D6FC-4f65-9D91-7224C49458BB}">
+                <c15:showLeaderLines val="1"/>
+                <c15:leaderLines>
+                  <c:spPr>
+                    <a:ln w="9525">
+                      <a:solidFill>
+                        <a:schemeClr val="dk1">
+                          <a:lumMod val="50000"/>
+                          <a:lumOff val="50000"/>
+                        </a:schemeClr>
+                      </a:solidFill>
+                    </a:ln>
+                    <a:effectLst/>
+                  </c:spPr>
+                </c15:leaderLines>
+              </c:ext>
+            </c:extLst>
+          </c:dLbls>
+          <c:cat>
+            <c:strRef>
+              <c:f>Hoja1!$A$2:$A$8</c:f>
+              <c:strCache>
+                <c:ptCount val="7"/>
+                <c:pt idx="0">
+                  <c:v>Beverages</c:v>
+                </c:pt>
+                <c:pt idx="1">
+                  <c:v>Condiments</c:v>
+                </c:pt>
+                <c:pt idx="2">
+                  <c:v>Confections</c:v>
+                </c:pt>
+                <c:pt idx="3">
+                  <c:v>Dairy Products</c:v>
+                </c:pt>
+                <c:pt idx="4">
+                  <c:v>Grains/Cereals</c:v>
+                </c:pt>
+                <c:pt idx="5">
+                  <c:v>Meat/Poultry</c:v>
+                </c:pt>
+                <c:pt idx="6">
+                  <c:v>Produce</c:v>
+                </c:pt>
+              </c:strCache>
+            </c:strRef>
+          </c:cat>
+          <c:val>
+            <c:numRef>
+              <c:f>Hoja1!$B$2:$B$8</c:f>
+              <c:numCache>
+                <c:formatCode>General</c:formatCode>
+                <c:ptCount val="7"/>
+                <c:pt idx="0">
+                  <c:v>12</c:v>
+                </c:pt>
+                <c:pt idx="1">
+                  <c:v>12</c:v>
+                </c:pt>
+                <c:pt idx="2">
+                  <c:v>13</c:v>
+                </c:pt>
+                <c:pt idx="3">
+                  <c:v>10</c:v>
+                </c:pt>
+                <c:pt idx="4">
+                  <c:v>7</c:v>
+                </c:pt>
+                <c:pt idx="5">
+                  <c:v>6</c:v>
+                </c:pt>
+                <c:pt idx="6">
+                  <c:v>5</c:v>
+                </c:pt>
+              </c:numCache>
+            </c:numRef>
+          </c:val>
+          <c:extLst>
+            <c:ext xmlns:c16="http://schemas.microsoft.com/office/drawing/2014/chart" uri="{C3380CC4-5D6E-409C-BE32-E72D297353CC}">
+              <c16:uniqueId val="{00000000-5B80-4F68-A28F-671515FCDB25}"/>
+            </c:ext>
+          </c:extLst>
+        </c:ser>
+        <c:dLbls>
+          <c:dLblPos val="inEnd"/>
+          <c:showLegendKey val="0"/>
+          <c:showVal val="1"/>
+          <c:showCatName val="0"/>
+          <c:showSerName val="0"/>
+          <c:showPercent val="0"/>
+          <c:showBubbleSize val="0"/>
+        </c:dLbls>
+        <c:gapWidth val="65"/>
+        <c:axId val="1603129488"/>
+        <c:axId val="1603130448"/>
+      </c:barChart>
+      <c:catAx>
+        <c:axId val="1603129488"/>
+        <c:scaling>
+          <c:orientation val="minMax"/>
+        </c:scaling>
+        <c:delete val="0"/>
+        <c:axPos val="l"/>
+        <c:numFmt formatCode="General" sourceLinked="1"/>
+        <c:majorTickMark val="none"/>
+        <c:minorTickMark val="none"/>
+        <c:tickLblPos val="nextTo"/>
+        <c:spPr>
+          <a:noFill/>
+          <a:ln w="19050" cap="flat" cmpd="sng" algn="ctr">
+            <a:solidFill>
+              <a:schemeClr val="dk1">
+                <a:lumMod val="75000"/>
+                <a:lumOff val="25000"/>
+              </a:schemeClr>
+            </a:solidFill>
+            <a:round/>
+          </a:ln>
+          <a:effectLst/>
+        </c:spPr>
+        <c:txPr>
+          <a:bodyPr rot="-60000000" spcFirstLastPara="1" vertOverflow="ellipsis" vert="horz" wrap="square" anchor="ctr" anchorCtr="1"/>
+          <a:lstStyle/>
+          <a:p>
+            <a:pPr>
+              <a:defRPr lang="en-US" sz="1330" b="0" i="0" u="none" strike="noStrike" kern="1200" cap="all" baseline="0">
+                <a:solidFill>
+                  <a:schemeClr val="tx1"/>
+                </a:solidFill>
+                <a:latin typeface="+mn-lt"/>
+                <a:ea typeface="+mn-ea"/>
+                <a:cs typeface="+mn-cs"/>
+              </a:defRPr>
+            </a:pPr>
+            <a:endParaRPr lang="es-ES"/>
+          </a:p>
+        </c:txPr>
+        <c:crossAx val="1603130448"/>
+        <c:crosses val="autoZero"/>
+        <c:auto val="1"/>
+        <c:lblAlgn val="ctr"/>
+        <c:lblOffset val="100"/>
+        <c:noMultiLvlLbl val="0"/>
+      </c:catAx>
+      <c:valAx>
+        <c:axId val="1603130448"/>
+        <c:scaling>
+          <c:orientation val="minMax"/>
+        </c:scaling>
+        <c:delete val="0"/>
+        <c:axPos val="b"/>
+        <c:majorGridlines>
+          <c:spPr>
+            <a:ln w="9525" cap="flat" cmpd="sng" algn="ctr">
+              <a:gradFill>
+                <a:gsLst>
+                  <a:gs pos="100000">
+                    <a:schemeClr val="dk1">
+                      <a:lumMod val="95000"/>
+                      <a:lumOff val="5000"/>
+                      <a:alpha val="42000"/>
+                    </a:schemeClr>
+                  </a:gs>
+                  <a:gs pos="0">
+                    <a:schemeClr val="lt1">
+                      <a:lumMod val="75000"/>
+                      <a:alpha val="36000"/>
+                    </a:schemeClr>
+                  </a:gs>
+                </a:gsLst>
+                <a:lin ang="5400000" scaled="0"/>
+              </a:gradFill>
+              <a:round/>
+            </a:ln>
+            <a:effectLst/>
+          </c:spPr>
+        </c:majorGridlines>
+        <c:numFmt formatCode="General" sourceLinked="1"/>
+        <c:majorTickMark val="none"/>
+        <c:minorTickMark val="none"/>
+        <c:tickLblPos val="nextTo"/>
+        <c:spPr>
+          <a:noFill/>
+          <a:ln>
+            <a:noFill/>
+          </a:ln>
+          <a:effectLst/>
+        </c:spPr>
+        <c:txPr>
+          <a:bodyPr rot="-60000000" spcFirstLastPara="1" vertOverflow="ellipsis" vert="horz" wrap="square" anchor="ctr" anchorCtr="1"/>
+          <a:lstStyle/>
+          <a:p>
+            <a:pPr>
+              <a:defRPr lang="en-US" sz="1330" b="0" i="0" u="none" strike="noStrike" kern="1200" baseline="0">
+                <a:solidFill>
+                  <a:schemeClr val="tx1"/>
+                </a:solidFill>
+                <a:latin typeface="+mn-lt"/>
+                <a:ea typeface="+mn-ea"/>
+                <a:cs typeface="+mn-cs"/>
+              </a:defRPr>
+            </a:pPr>
+            <a:endParaRPr lang="es-ES"/>
+          </a:p>
+        </c:txPr>
+        <c:crossAx val="1603129488"/>
+        <c:crosses val="autoZero"/>
+        <c:crossBetween val="between"/>
+      </c:valAx>
+      <c:spPr>
+        <a:noFill/>
+        <a:ln>
+          <a:noFill/>
+        </a:ln>
+        <a:effectLst/>
+      </c:spPr>
+    </c:plotArea>
+    <c:plotVisOnly val="1"/>
+    <c:dispBlanksAs val="gap"/>
+    <c:showDLblsOverMax val="0"/>
+    <c:extLst>
+      <c:ext xmlns:c16r3="http://schemas.microsoft.com/office/drawing/2017/03/chart" uri="{56B9EC1D-385E-4148-901F-78D8002777C0}">
+        <c16r3:dataDisplayOptions16>
+          <c16r3:dispNaAsBlank val="1"/>
+        </c16r3:dataDisplayOptions16>
+      </c:ext>
+    </c:extLst>
+  </c:chart>
+  <c:spPr>
+    <a:solidFill>
+      <a:schemeClr val="accent1"/>
+    </a:solidFill>
+    <a:ln w="9525" cap="flat" cmpd="sng" algn="ctr">
+      <a:noFill/>
+      <a:round/>
+    </a:ln>
+    <a:effectLst/>
+  </c:spPr>
+  <c:txPr>
+    <a:bodyPr/>
+    <a:lstStyle/>
+    <a:p>
+      <a:pPr algn="ctr">
+        <a:defRPr lang="en-US" sz="1330" b="0" i="0" u="none" strike="noStrike" kern="1200" baseline="0">
+          <a:solidFill>
+            <a:schemeClr val="tx1"/>
+          </a:solidFill>
+          <a:latin typeface="+mn-lt"/>
+          <a:ea typeface="+mn-ea"/>
+          <a:cs typeface="+mn-cs"/>
+        </a:defRPr>
+      </a:pPr>
+      <a:endParaRPr lang="es-ES"/>
+    </a:p>
+  </c:txPr>
+  <c:externalData r:id="rId3">
+    <c:autoUpdate val="0"/>
+  </c:externalData>
+</c:chartSpace>
+</file>
+
+<file path=ppt/charts/chart3.xml><?xml version="1.0" encoding="utf-8"?>
+<c:chartSpace xmlns:c="http://schemas.openxmlformats.org/drawingml/2006/chart" xmlns:a="http://schemas.openxmlformats.org/drawingml/2006/main" xmlns:r="http://schemas.openxmlformats.org/officeDocument/2006/relationships" xmlns:c16r2="http://schemas.microsoft.com/office/drawing/2015/06/chart">
+  <c:date1904 val="0"/>
+  <c:lang val="es-ES"/>
+  <c:roundedCorners val="0"/>
+  <mc:AlternateContent xmlns:mc="http://schemas.openxmlformats.org/markup-compatibility/2006">
+    <mc:Choice xmlns:c14="http://schemas.microsoft.com/office/drawing/2007/8/2/chart" Requires="c14">
+      <c14:style val="105"/>
+    </mc:Choice>
+    <mc:Fallback>
+      <c:style val="5"/>
+    </mc:Fallback>
+  </mc:AlternateContent>
+  <c:chart>
+    <c:autoTitleDeleted val="1"/>
+    <c:plotArea>
+      <c:layout/>
+      <c:barChart>
+        <c:barDir val="col"/>
+        <c:grouping val="stacked"/>
+        <c:varyColors val="0"/>
+        <c:ser>
+          <c:idx val="0"/>
+          <c:order val="0"/>
+          <c:tx>
+            <c:strRef>
+              <c:f>Hoja1!$B$1</c:f>
+              <c:strCache>
+                <c:ptCount val="1"/>
+                <c:pt idx="0">
+                  <c:v>Serie 1</c:v>
+                </c:pt>
+              </c:strCache>
+            </c:strRef>
+          </c:tx>
+          <c:spPr>
+            <a:solidFill>
+              <a:schemeClr val="accent3">
+                <a:lumMod val="75000"/>
+              </a:schemeClr>
+            </a:solidFill>
+            <a:ln>
+              <a:noFill/>
+            </a:ln>
+            <a:effectLst>
+              <a:outerShdw blurRad="50800" dist="38100" dir="5400000" rotWithShape="0">
+                <a:srgbClr val="000000">
+                  <a:alpha val="46000"/>
+                </a:srgbClr>
+              </a:outerShdw>
+            </a:effectLst>
+            <a:scene3d>
+              <a:camera prst="orthographicFront">
+                <a:rot lat="0" lon="0" rev="0"/>
+              </a:camera>
+              <a:lightRig rig="threePt" dir="t"/>
+            </a:scene3d>
+            <a:sp3d prstMaterial="plastic">
+              <a:bevelT w="25400" h="25400"/>
+            </a:sp3d>
+          </c:spPr>
+          <c:invertIfNegative val="0"/>
+          <c:dLbls>
+            <c:spPr>
+              <a:noFill/>
+              <a:ln>
+                <a:noFill/>
+              </a:ln>
+              <a:effectLst/>
+            </c:spPr>
+            <c:txPr>
+              <a:bodyPr rot="0" spcFirstLastPara="1" vertOverflow="ellipsis" vert="horz" wrap="square" lIns="38100" tIns="19050" rIns="38100" bIns="19050" anchor="ctr" anchorCtr="1">
+                <a:spAutoFit/>
+              </a:bodyPr>
+              <a:lstStyle/>
+              <a:p>
+                <a:pPr>
+                  <a:defRPr sz="1197" b="0" i="0" u="none" strike="noStrike" kern="1200" baseline="0">
+                    <a:solidFill>
+                      <a:schemeClr val="lt1">
+                        <a:lumMod val="85000"/>
+                      </a:schemeClr>
+                    </a:solidFill>
+                    <a:latin typeface="+mn-lt"/>
+                    <a:ea typeface="+mn-ea"/>
+                    <a:cs typeface="+mn-cs"/>
+                  </a:defRPr>
+                </a:pPr>
+                <a:endParaRPr lang="es-ES"/>
+              </a:p>
+            </c:txPr>
+            <c:dLblPos val="ctr"/>
+            <c:showLegendKey val="0"/>
+            <c:showVal val="1"/>
+            <c:showCatName val="0"/>
+            <c:showSerName val="0"/>
+            <c:showPercent val="0"/>
+            <c:showBubbleSize val="0"/>
+            <c:showLeaderLines val="0"/>
+            <c:extLst>
+              <c:ext xmlns:c15="http://schemas.microsoft.com/office/drawing/2012/chart" uri="{CE6537A1-D6FC-4f65-9D91-7224C49458BB}">
+                <c15:showLeaderLines val="1"/>
+                <c15:leaderLines>
+                  <c:spPr>
+                    <a:ln w="9525">
+                      <a:solidFill>
+                        <a:schemeClr val="lt1">
+                          <a:lumMod val="95000"/>
+                          <a:alpha val="54000"/>
+                        </a:schemeClr>
+                      </a:solidFill>
+                    </a:ln>
+                    <a:effectLst/>
+                  </c:spPr>
+                </c15:leaderLines>
+              </c:ext>
+            </c:extLst>
+          </c:dLbls>
+          <c:cat>
+            <c:strRef>
+              <c:f>Hoja1!$A$2:$A$8</c:f>
+              <c:strCache>
+                <c:ptCount val="7"/>
+                <c:pt idx="0">
+                  <c:v>Beverages</c:v>
+                </c:pt>
+                <c:pt idx="1">
+                  <c:v>Condiments</c:v>
+                </c:pt>
+                <c:pt idx="2">
+                  <c:v>Confections</c:v>
+                </c:pt>
+                <c:pt idx="3">
+                  <c:v>Dairy Products</c:v>
+                </c:pt>
+                <c:pt idx="4">
+                  <c:v>Grains/Cereals</c:v>
+                </c:pt>
+                <c:pt idx="5">
+                  <c:v>Meat/Poultry</c:v>
+                </c:pt>
+                <c:pt idx="6">
+                  <c:v>Produce</c:v>
+                </c:pt>
+              </c:strCache>
+            </c:strRef>
+          </c:cat>
+          <c:val>
+            <c:numRef>
+              <c:f>Hoja1!$B$2:$B$8</c:f>
+              <c:numCache>
+                <c:formatCode>General</c:formatCode>
+                <c:ptCount val="7"/>
+                <c:pt idx="0">
+                  <c:v>37.97</c:v>
+                </c:pt>
+                <c:pt idx="1">
+                  <c:v>23.06</c:v>
+                </c:pt>
+                <c:pt idx="2">
+                  <c:v>25.16</c:v>
+                </c:pt>
+                <c:pt idx="3">
+                  <c:v>28.73</c:v>
+                </c:pt>
+                <c:pt idx="4">
+                  <c:v>20.25</c:v>
+                </c:pt>
+                <c:pt idx="5">
+                  <c:v>54.06</c:v>
+                </c:pt>
+                <c:pt idx="6">
+                  <c:v>32.369999999999997</c:v>
+                </c:pt>
+              </c:numCache>
+            </c:numRef>
+          </c:val>
+          <c:extLst>
+            <c:ext xmlns:c16="http://schemas.microsoft.com/office/drawing/2014/chart" uri="{C3380CC4-5D6E-409C-BE32-E72D297353CC}">
+              <c16:uniqueId val="{00000000-72AB-442A-BBF6-B020C206722E}"/>
+            </c:ext>
+          </c:extLst>
+        </c:ser>
+        <c:dLbls>
+          <c:dLblPos val="ctr"/>
+          <c:showLegendKey val="0"/>
+          <c:showVal val="1"/>
+          <c:showCatName val="0"/>
+          <c:showSerName val="0"/>
+          <c:showPercent val="0"/>
+          <c:showBubbleSize val="0"/>
+        </c:dLbls>
+        <c:gapWidth val="150"/>
+        <c:overlap val="100"/>
+        <c:axId val="1944264608"/>
+        <c:axId val="1944265088"/>
+      </c:barChart>
+      <c:catAx>
+        <c:axId val="1944264608"/>
+        <c:scaling>
+          <c:orientation val="minMax"/>
+        </c:scaling>
+        <c:delete val="0"/>
+        <c:axPos val="b"/>
+        <c:numFmt formatCode="General" sourceLinked="1"/>
+        <c:majorTickMark val="none"/>
+        <c:minorTickMark val="none"/>
+        <c:tickLblPos val="nextTo"/>
+        <c:spPr>
+          <a:noFill/>
+          <a:ln w="12700" cap="flat" cmpd="sng" algn="ctr">
+            <a:solidFill>
+              <a:schemeClr val="lt1">
+                <a:lumMod val="95000"/>
+                <a:alpha val="54000"/>
+              </a:schemeClr>
+            </a:solidFill>
+            <a:round/>
+          </a:ln>
+          <a:effectLst/>
+        </c:spPr>
+        <c:txPr>
+          <a:bodyPr rot="-60000000" spcFirstLastPara="1" vertOverflow="ellipsis" vert="horz" wrap="square" anchor="ctr" anchorCtr="1"/>
+          <a:lstStyle/>
+          <a:p>
+            <a:pPr>
+              <a:defRPr sz="1197" b="0" i="0" u="none" strike="noStrike" kern="1200" baseline="0">
+                <a:solidFill>
+                  <a:schemeClr val="lt1">
+                    <a:lumMod val="85000"/>
+                  </a:schemeClr>
+                </a:solidFill>
+                <a:latin typeface="+mn-lt"/>
+                <a:ea typeface="+mn-ea"/>
+                <a:cs typeface="+mn-cs"/>
+              </a:defRPr>
+            </a:pPr>
+            <a:endParaRPr lang="es-ES"/>
+          </a:p>
+        </c:txPr>
+        <c:crossAx val="1944265088"/>
+        <c:crosses val="autoZero"/>
+        <c:auto val="1"/>
+        <c:lblAlgn val="ctr"/>
+        <c:lblOffset val="100"/>
+        <c:noMultiLvlLbl val="0"/>
+      </c:catAx>
+      <c:valAx>
+        <c:axId val="1944265088"/>
+        <c:scaling>
+          <c:orientation val="minMax"/>
+        </c:scaling>
+        <c:delete val="0"/>
+        <c:axPos val="l"/>
+        <c:majorGridlines>
+          <c:spPr>
+            <a:ln w="9525" cap="flat" cmpd="sng" algn="ctr">
+              <a:solidFill>
+                <a:schemeClr val="lt1">
+                  <a:lumMod val="95000"/>
+                  <a:alpha val="10000"/>
+                </a:schemeClr>
+              </a:solidFill>
+              <a:round/>
+            </a:ln>
+            <a:effectLst/>
+          </c:spPr>
+        </c:majorGridlines>
+        <c:numFmt formatCode="General" sourceLinked="1"/>
+        <c:majorTickMark val="none"/>
+        <c:minorTickMark val="none"/>
+        <c:tickLblPos val="nextTo"/>
+        <c:spPr>
+          <a:noFill/>
+          <a:ln>
+            <a:noFill/>
+          </a:ln>
+          <a:effectLst/>
+        </c:spPr>
+        <c:txPr>
+          <a:bodyPr rot="-60000000" spcFirstLastPara="1" vertOverflow="ellipsis" vert="horz" wrap="square" anchor="ctr" anchorCtr="1"/>
+          <a:lstStyle/>
+          <a:p>
+            <a:pPr>
+              <a:defRPr sz="1197" b="0" i="0" u="none" strike="noStrike" kern="1200" baseline="0">
+                <a:solidFill>
+                  <a:schemeClr val="lt1">
+                    <a:lumMod val="85000"/>
+                  </a:schemeClr>
+                </a:solidFill>
+                <a:latin typeface="+mn-lt"/>
+                <a:ea typeface="+mn-ea"/>
+                <a:cs typeface="+mn-cs"/>
+              </a:defRPr>
+            </a:pPr>
+            <a:endParaRPr lang="es-ES"/>
+          </a:p>
+        </c:txPr>
+        <c:crossAx val="1944264608"/>
+        <c:crosses val="autoZero"/>
+        <c:crossBetween val="between"/>
+      </c:valAx>
+      <c:spPr>
+        <a:noFill/>
+        <a:ln>
+          <a:noFill/>
+        </a:ln>
+        <a:effectLst/>
+      </c:spPr>
+    </c:plotArea>
+    <c:plotVisOnly val="1"/>
+    <c:dispBlanksAs val="gap"/>
+    <c:showDLblsOverMax val="0"/>
+    <c:extLst>
+      <c:ext xmlns:c16r3="http://schemas.microsoft.com/office/drawing/2017/03/chart" uri="{56B9EC1D-385E-4148-901F-78D8002777C0}">
+        <c16r3:dataDisplayOptions16>
+          <c16r3:dispNaAsBlank val="1"/>
+        </c16r3:dataDisplayOptions16>
+      </c:ext>
+    </c:extLst>
+  </c:chart>
+  <c:spPr>
+    <a:solidFill>
+      <a:schemeClr val="accent1"/>
+    </a:solidFill>
+    <a:ln>
+      <a:noFill/>
+    </a:ln>
+    <a:effectLst/>
+  </c:spPr>
+  <c:txPr>
+    <a:bodyPr/>
+    <a:lstStyle/>
+    <a:p>
+      <a:pPr>
+        <a:defRPr/>
+      </a:pPr>
+      <a:endParaRPr lang="es-ES"/>
+    </a:p>
+  </c:txPr>
+  <c:externalData r:id="rId3">
+    <c:autoUpdate val="0"/>
+  </c:externalData>
+</c:chartSpace>
+</file>
+
+<file path=ppt/charts/chart4.xml><?xml version="1.0" encoding="utf-8"?>
+<c:chartSpace xmlns:c="http://schemas.openxmlformats.org/drawingml/2006/chart" xmlns:a="http://schemas.openxmlformats.org/drawingml/2006/main" xmlns:r="http://schemas.openxmlformats.org/officeDocument/2006/relationships" xmlns:c16r2="http://schemas.microsoft.com/office/drawing/2015/06/chart">
+  <c:date1904 val="0"/>
+  <c:lang val="es-ES"/>
+  <c:roundedCorners val="0"/>
+  <mc:AlternateContent xmlns:mc="http://schemas.openxmlformats.org/markup-compatibility/2006">
+    <mc:Choice xmlns:c14="http://schemas.microsoft.com/office/drawing/2007/8/2/chart" Requires="c14">
+      <c14:style val="102"/>
+    </mc:Choice>
+    <mc:Fallback>
+      <c:style val="2"/>
+    </mc:Fallback>
+  </mc:AlternateContent>
+  <c:chart>
+    <c:title>
+      <c:overlay val="0"/>
+      <c:spPr>
+        <a:noFill/>
+        <a:ln>
+          <a:noFill/>
+        </a:ln>
+        <a:effectLst/>
+      </c:spPr>
+      <c:txPr>
+        <a:bodyPr rot="0" spcFirstLastPara="1" vertOverflow="ellipsis" vert="horz" wrap="square" anchor="ctr" anchorCtr="1"/>
+        <a:lstStyle/>
+        <a:p>
+          <a:pPr>
+            <a:defRPr sz="1862" b="0" i="0" u="none" strike="noStrike" kern="1200" spc="0" baseline="0">
+              <a:solidFill>
+                <a:schemeClr val="tx1">
+                  <a:lumMod val="65000"/>
+                  <a:lumOff val="35000"/>
+                </a:schemeClr>
+              </a:solidFill>
+              <a:latin typeface="+mn-lt"/>
+              <a:ea typeface="+mn-ea"/>
+              <a:cs typeface="+mn-cs"/>
+            </a:defRPr>
+          </a:pPr>
+          <a:endParaRPr lang="es-ES"/>
+        </a:p>
+      </c:txPr>
+    </c:title>
+    <c:autoTitleDeleted val="0"/>
+    <c:plotArea>
+      <c:layout/>
+      <c:barChart>
+        <c:barDir val="col"/>
+        <c:grouping val="clustered"/>
+        <c:varyColors val="0"/>
+        <c:ser>
+          <c:idx val="0"/>
+          <c:order val="0"/>
+          <c:tx>
+            <c:strRef>
+              <c:f>Hoja1!$B$1</c:f>
+              <c:strCache>
+                <c:ptCount val="1"/>
+                <c:pt idx="0">
+                  <c:v>Columna1</c:v>
+                </c:pt>
+              </c:strCache>
+            </c:strRef>
+          </c:tx>
+          <c:spPr>
+            <a:solidFill>
+              <a:schemeClr val="accent1"/>
+            </a:solidFill>
+            <a:ln>
+              <a:noFill/>
+            </a:ln>
+            <a:effectLst/>
+          </c:spPr>
+          <c:invertIfNegative val="0"/>
+          <c:cat>
+            <c:numRef>
+              <c:f>Hoja1!$A$2:$A$4</c:f>
+              <c:numCache>
+                <c:formatCode>General</c:formatCode>
+                <c:ptCount val="3"/>
+                <c:pt idx="0">
+                  <c:v>1996</c:v>
+                </c:pt>
+                <c:pt idx="1">
+                  <c:v>1997</c:v>
+                </c:pt>
+                <c:pt idx="2">
+                  <c:v>1998</c:v>
+                </c:pt>
+              </c:numCache>
+            </c:numRef>
+          </c:cat>
+          <c:val>
+            <c:numRef>
+              <c:f>Hoja1!$B$2:$B$4</c:f>
+              <c:numCache>
+                <c:formatCode>General</c:formatCode>
+                <c:ptCount val="3"/>
+                <c:pt idx="0">
+                  <c:v>193316.55</c:v>
+                </c:pt>
+                <c:pt idx="1">
+                  <c:v>608846.87</c:v>
+                </c:pt>
+                <c:pt idx="2">
+                  <c:v>437692.17</c:v>
+                </c:pt>
+              </c:numCache>
+            </c:numRef>
+          </c:val>
+          <c:extLst>
+            <c:ext xmlns:c16="http://schemas.microsoft.com/office/drawing/2014/chart" uri="{C3380CC4-5D6E-409C-BE32-E72D297353CC}">
+              <c16:uniqueId val="{00000000-05DB-403E-96CA-7988F33F0EFF}"/>
+            </c:ext>
+          </c:extLst>
+        </c:ser>
+        <c:dLbls>
+          <c:showLegendKey val="0"/>
+          <c:showVal val="0"/>
+          <c:showCatName val="0"/>
+          <c:showSerName val="0"/>
+          <c:showPercent val="0"/>
+          <c:showBubbleSize val="0"/>
+        </c:dLbls>
+        <c:gapWidth val="219"/>
+        <c:overlap val="-27"/>
+        <c:axId val="1596492384"/>
+        <c:axId val="1872871840"/>
+      </c:barChart>
+      <c:catAx>
+        <c:axId val="1596492384"/>
+        <c:scaling>
+          <c:orientation val="minMax"/>
+        </c:scaling>
+        <c:delete val="0"/>
+        <c:axPos val="b"/>
+        <c:numFmt formatCode="General" sourceLinked="1"/>
+        <c:majorTickMark val="none"/>
+        <c:minorTickMark val="none"/>
+        <c:tickLblPos val="nextTo"/>
+        <c:spPr>
+          <a:noFill/>
+          <a:ln w="9525" cap="flat" cmpd="sng" algn="ctr">
+            <a:solidFill>
+              <a:schemeClr val="tx1">
+                <a:lumMod val="15000"/>
+                <a:lumOff val="85000"/>
+              </a:schemeClr>
+            </a:solidFill>
+            <a:round/>
+          </a:ln>
+          <a:effectLst/>
+        </c:spPr>
+        <c:txPr>
+          <a:bodyPr rot="-60000000" spcFirstLastPara="1" vertOverflow="ellipsis" vert="horz" wrap="square" anchor="ctr" anchorCtr="1"/>
+          <a:lstStyle/>
+          <a:p>
+            <a:pPr>
+              <a:defRPr sz="1197" b="0" i="0" u="none" strike="noStrike" kern="1200" baseline="0">
+                <a:solidFill>
+                  <a:schemeClr val="tx1">
+                    <a:lumMod val="65000"/>
+                    <a:lumOff val="35000"/>
+                  </a:schemeClr>
+                </a:solidFill>
+                <a:latin typeface="+mn-lt"/>
+                <a:ea typeface="+mn-ea"/>
+                <a:cs typeface="+mn-cs"/>
+              </a:defRPr>
+            </a:pPr>
+            <a:endParaRPr lang="es-ES"/>
+          </a:p>
+        </c:txPr>
+        <c:crossAx val="1872871840"/>
+        <c:crosses val="autoZero"/>
+        <c:auto val="1"/>
+        <c:lblAlgn val="ctr"/>
+        <c:lblOffset val="100"/>
+        <c:noMultiLvlLbl val="0"/>
+      </c:catAx>
+      <c:valAx>
+        <c:axId val="1872871840"/>
+        <c:scaling>
+          <c:orientation val="minMax"/>
+        </c:scaling>
+        <c:delete val="0"/>
+        <c:axPos val="l"/>
+        <c:majorGridlines>
+          <c:spPr>
+            <a:ln w="9525" cap="flat" cmpd="sng" algn="ctr">
+              <a:solidFill>
+                <a:schemeClr val="tx1">
+                  <a:lumMod val="15000"/>
+                  <a:lumOff val="85000"/>
+                </a:schemeClr>
+              </a:solidFill>
+              <a:round/>
+            </a:ln>
+            <a:effectLst/>
+          </c:spPr>
+        </c:majorGridlines>
+        <c:numFmt formatCode="General" sourceLinked="1"/>
+        <c:majorTickMark val="none"/>
+        <c:minorTickMark val="none"/>
+        <c:tickLblPos val="nextTo"/>
+        <c:spPr>
+          <a:noFill/>
+          <a:ln>
+            <a:noFill/>
+          </a:ln>
+          <a:effectLst/>
+        </c:spPr>
+        <c:txPr>
+          <a:bodyPr rot="-60000000" spcFirstLastPara="1" vertOverflow="ellipsis" vert="horz" wrap="square" anchor="ctr" anchorCtr="1"/>
+          <a:lstStyle/>
+          <a:p>
+            <a:pPr>
+              <a:defRPr sz="1197" b="0" i="0" u="none" strike="noStrike" kern="1200" baseline="0">
+                <a:solidFill>
+                  <a:schemeClr val="tx1">
+                    <a:lumMod val="65000"/>
+                    <a:lumOff val="35000"/>
+                  </a:schemeClr>
+                </a:solidFill>
+                <a:latin typeface="+mn-lt"/>
+                <a:ea typeface="+mn-ea"/>
+                <a:cs typeface="+mn-cs"/>
+              </a:defRPr>
+            </a:pPr>
+            <a:endParaRPr lang="es-ES"/>
+          </a:p>
+        </c:txPr>
+        <c:crossAx val="1596492384"/>
+        <c:crosses val="autoZero"/>
+        <c:crossBetween val="between"/>
+      </c:valAx>
+      <c:spPr>
+        <a:noFill/>
+        <a:ln>
+          <a:noFill/>
+        </a:ln>
+        <a:effectLst/>
+      </c:spPr>
+    </c:plotArea>
+    <c:legend>
+      <c:legendPos val="b"/>
+      <c:overlay val="0"/>
+      <c:spPr>
+        <a:noFill/>
+        <a:ln>
+          <a:noFill/>
+        </a:ln>
+        <a:effectLst/>
+      </c:spPr>
+      <c:txPr>
+        <a:bodyPr rot="0" spcFirstLastPara="1" vertOverflow="ellipsis" vert="horz" wrap="square" anchor="ctr" anchorCtr="1"/>
+        <a:lstStyle/>
+        <a:p>
+          <a:pPr>
+            <a:defRPr sz="1197" b="0" i="0" u="none" strike="noStrike" kern="1200" baseline="0">
+              <a:solidFill>
+                <a:schemeClr val="tx1">
+                  <a:lumMod val="65000"/>
+                  <a:lumOff val="35000"/>
+                </a:schemeClr>
+              </a:solidFill>
+              <a:latin typeface="+mn-lt"/>
+              <a:ea typeface="+mn-ea"/>
+              <a:cs typeface="+mn-cs"/>
+            </a:defRPr>
+          </a:pPr>
+          <a:endParaRPr lang="es-ES"/>
+        </a:p>
+      </c:txPr>
+    </c:legend>
+    <c:plotVisOnly val="1"/>
+    <c:dispBlanksAs val="gap"/>
+    <c:showDLblsOverMax val="0"/>
+    <c:extLst>
+      <c:ext xmlns:c16r3="http://schemas.microsoft.com/office/drawing/2017/03/chart" uri="{56B9EC1D-385E-4148-901F-78D8002777C0}">
+        <c16r3:dataDisplayOptions16>
+          <c16r3:dispNaAsBlank val="1"/>
+        </c16r3:dataDisplayOptions16>
+      </c:ext>
+    </c:extLst>
+  </c:chart>
+  <c:spPr>
+    <a:noFill/>
+    <a:ln>
+      <a:noFill/>
+    </a:ln>
+    <a:effectLst/>
+  </c:spPr>
+  <c:txPr>
+    <a:bodyPr/>
+    <a:lstStyle/>
+    <a:p>
+      <a:pPr>
+        <a:defRPr/>
+      </a:pPr>
+      <a:endParaRPr lang="es-ES"/>
+    </a:p>
+  </c:txPr>
+  <c:externalData r:id="rId3">
+    <c:autoUpdate val="0"/>
+  </c:externalData>
+</c:chartSpace>
+</file>
+
+<file path=ppt/charts/colors1.xml><?xml version="1.0" encoding="utf-8"?>
+<cs:colorStyle xmlns:cs="http://schemas.microsoft.com/office/drawing/2012/chartStyle" xmlns:a="http://schemas.openxmlformats.org/drawingml/2006/main" meth="withinLinearReversed" id="23">
+  <a:schemeClr val="accent3"/>
+</cs:colorStyle>
+</file>
+
+<file path=ppt/charts/colors2.xml><?xml version="1.0" encoding="utf-8"?>
+<cs:colorStyle xmlns:cs="http://schemas.microsoft.com/office/drawing/2012/chartStyle" xmlns:a="http://schemas.openxmlformats.org/drawingml/2006/main" meth="withinLinear" id="16">
+  <a:schemeClr val="accent3"/>
+</cs:colorStyle>
+</file>
+
+<file path=ppt/charts/colors3.xml><?xml version="1.0" encoding="utf-8"?>
+<cs:colorStyle xmlns:cs="http://schemas.microsoft.com/office/drawing/2012/chartStyle" xmlns:a="http://schemas.openxmlformats.org/drawingml/2006/main" meth="withinLinear" id="16">
+  <a:schemeClr val="accent3"/>
+</cs:colorStyle>
+</file>
+
+<file path=ppt/charts/colors4.xml><?xml version="1.0" encoding="utf-8"?>
+<cs:colorStyle xmlns:cs="http://schemas.microsoft.com/office/drawing/2012/chartStyle" xmlns:a="http://schemas.openxmlformats.org/drawingml/2006/main" meth="cycle" id="10">
+  <a:schemeClr val="accent1"/>
+  <a:schemeClr val="accent2"/>
+  <a:schemeClr val="accent3"/>
+  <a:schemeClr val="accent4"/>
+  <a:schemeClr val="accent5"/>
+  <a:schemeClr val="accent6"/>
+  <cs:variation/>
+  <cs:variation>
+    <a:lumMod val="60000"/>
+  </cs:variation>
+  <cs:variation>
+    <a:lumMod val="80000"/>
+    <a:lumOff val="20000"/>
+  </cs:variation>
+  <cs:variation>
+    <a:lumMod val="80000"/>
+  </cs:variation>
+  <cs:variation>
+    <a:lumMod val="60000"/>
+    <a:lumOff val="40000"/>
+  </cs:variation>
+  <cs:variation>
+    <a:lumMod val="50000"/>
+  </cs:variation>
+  <cs:variation>
+    <a:lumMod val="70000"/>
+    <a:lumOff val="30000"/>
+  </cs:variation>
+  <cs:variation>
+    <a:lumMod val="70000"/>
+  </cs:variation>
+  <cs:variation>
+    <a:lumMod val="50000"/>
+    <a:lumOff val="50000"/>
+  </cs:variation>
+</cs:colorStyle>
+</file>
+
+<file path=ppt/charts/style1.xml><?xml version="1.0" encoding="utf-8"?>
+<cs:chartStyle xmlns:cs="http://schemas.microsoft.com/office/drawing/2012/chartStyle" xmlns:a="http://schemas.openxmlformats.org/drawingml/2006/main" id="218">
+  <cs:axisTitle>
+    <cs:lnRef idx="0"/>
+    <cs:fillRef idx="0"/>
+    <cs:effectRef idx="0"/>
+    <cs:fontRef idx="minor">
+      <a:schemeClr val="dk1">
+        <a:lumMod val="75000"/>
+        <a:lumOff val="25000"/>
+      </a:schemeClr>
+    </cs:fontRef>
+    <cs:defRPr sz="1197" b="1" kern="1200"/>
+  </cs:axisTitle>
+  <cs:categoryAxis>
+    <cs:lnRef idx="0"/>
+    <cs:fillRef idx="0"/>
+    <cs:effectRef idx="0"/>
+    <cs:fontRef idx="minor">
+      <a:schemeClr val="dk1">
+        <a:lumMod val="75000"/>
+        <a:lumOff val="25000"/>
+      </a:schemeClr>
+    </cs:fontRef>
+    <cs:spPr>
+      <a:ln w="19050" cap="flat" cmpd="sng" algn="ctr">
+        <a:solidFill>
+          <a:schemeClr val="dk1">
+            <a:lumMod val="75000"/>
+            <a:lumOff val="25000"/>
+          </a:schemeClr>
+        </a:solidFill>
+        <a:round/>
+      </a:ln>
+    </cs:spPr>
+    <cs:defRPr sz="1197" kern="1200" cap="all" baseline="0"/>
+  </cs:categoryAxis>
+  <cs:chartArea>
+    <cs:lnRef idx="0"/>
+    <cs:fillRef idx="0"/>
+    <cs:effectRef idx="0"/>
+    <cs:fontRef idx="minor">
+      <a:schemeClr val="dk1"/>
+    </cs:fontRef>
+    <cs:spPr>
+      <a:gradFill flip="none" rotWithShape="1">
+        <a:gsLst>
+          <a:gs pos="0">
+            <a:schemeClr val="lt1"/>
+          </a:gs>
+          <a:gs pos="39000">
+            <a:schemeClr val="lt1"/>
+          </a:gs>
+          <a:gs pos="100000">
+            <a:schemeClr val="lt1">
+              <a:lumMod val="75000"/>
+            </a:schemeClr>
+          </a:gs>
+        </a:gsLst>
+        <a:path path="circle">
+          <a:fillToRect l="50000" t="-80000" r="50000" b="180000"/>
+        </a:path>
+        <a:tileRect/>
+      </a:gradFill>
+      <a:ln w="9525" cap="flat" cmpd="sng" algn="ctr">
+        <a:solidFill>
+          <a:schemeClr val="dk1">
+            <a:lumMod val="25000"/>
+            <a:lumOff val="75000"/>
+          </a:schemeClr>
+        </a:solidFill>
+        <a:round/>
+      </a:ln>
+    </cs:spPr>
+    <cs:defRPr sz="1197" kern="1200"/>
+  </cs:chartArea>
+  <cs:dataLabel>
+    <cs:lnRef idx="0"/>
+    <cs:fillRef idx="0"/>
+    <cs:effectRef idx="0"/>
+    <cs:fontRef idx="minor">
+      <a:schemeClr val="lt1"/>
+    </cs:fontRef>
+    <cs:defRPr sz="1197" b="1" i="0" u="none" strike="noStrike" kern="1200" baseline="0"/>
+  </cs:dataLabel>
+  <cs:dataLabelCallout>
+    <cs:lnRef idx="0"/>
+    <cs:fillRef idx="0"/>
+    <cs:effectRef idx="0"/>
+    <cs:fontRef idx="minor">
+      <a:schemeClr val="lt1"/>
+    </cs:fontRef>
+    <cs:spPr>
+      <a:solidFill>
+        <a:schemeClr val="dk1">
+          <a:lumMod val="65000"/>
+          <a:lumOff val="35000"/>
+          <a:alpha val="75000"/>
+        </a:schemeClr>
+      </a:solidFill>
+    </cs:spPr>
+    <cs:defRPr sz="1197" b="1" kern="1200"/>
+    <cs:bodyPr rot="0" spcFirstLastPara="1" vertOverflow="clip" horzOverflow="clip" vert="horz" wrap="square" lIns="36576" tIns="18288" rIns="36576" bIns="18288" anchor="ctr" anchorCtr="1">
+      <a:spAutoFit/>
+    </cs:bodyPr>
+  </cs:dataLabelCallout>
+  <cs:dataPoint>
+    <cs:lnRef idx="0"/>
+    <cs:fillRef idx="0">
+      <cs:styleClr val="auto"/>
+    </cs:fillRef>
+    <cs:effectRef idx="0"/>
+    <cs:fontRef idx="minor">
+      <a:schemeClr val="dk1"/>
+    </cs:fontRef>
+    <cs:spPr>
+      <a:solidFill>
+        <a:schemeClr val="phClr">
+          <a:alpha val="85000"/>
+        </a:schemeClr>
+      </a:solidFill>
+      <a:ln w="9525" cap="flat" cmpd="sng" algn="ctr">
+        <a:solidFill>
+          <a:schemeClr val="lt1">
+            <a:alpha val="50000"/>
+          </a:schemeClr>
+        </a:solidFill>
+        <a:round/>
+      </a:ln>
+    </cs:spPr>
+  </cs:dataPoint>
+  <cs:dataPoint3D>
+    <cs:lnRef idx="0"/>
+    <cs:fillRef idx="0">
+      <cs:styleClr val="auto"/>
+    </cs:fillRef>
+    <cs:effectRef idx="0"/>
+    <cs:fontRef idx="minor">
+      <a:schemeClr val="dk1"/>
+    </cs:fontRef>
+    <cs:spPr>
+      <a:solidFill>
+        <a:schemeClr val="phClr">
+          <a:alpha val="85000"/>
+        </a:schemeClr>
+      </a:solidFill>
+      <a:ln w="9525" cap="flat" cmpd="sng" algn="ctr">
+        <a:solidFill>
+          <a:schemeClr val="lt1">
+            <a:alpha val="50000"/>
+          </a:schemeClr>
+        </a:solidFill>
+        <a:round/>
+      </a:ln>
+    </cs:spPr>
+  </cs:dataPoint3D>
+  <cs:dataPointLine>
+    <cs:lnRef idx="0">
+      <cs:styleClr val="auto"/>
+    </cs:lnRef>
+    <cs:fillRef idx="0"/>
+    <cs:effectRef idx="0"/>
+    <cs:fontRef idx="minor">
+      <a:schemeClr val="dk1"/>
+    </cs:fontRef>
+    <cs:spPr>
+      <a:ln w="31750" cap="rnd">
+        <a:solidFill>
+          <a:schemeClr val="phClr">
+            <a:alpha val="85000"/>
+          </a:schemeClr>
+        </a:solidFill>
+        <a:round/>
+      </a:ln>
+    </cs:spPr>
+  </cs:dataPointLine>
+  <cs:dataPointMarker>
+    <cs:lnRef idx="0"/>
+    <cs:fillRef idx="0">
+      <cs:styleClr val="auto"/>
+    </cs:fillRef>
+    <cs:effectRef idx="0"/>
+    <cs:fontRef idx="minor">
+      <a:schemeClr val="dk1"/>
+    </cs:fontRef>
+    <cs:spPr>
+      <a:solidFill>
+        <a:schemeClr val="phClr">
+          <a:alpha val="85000"/>
+        </a:schemeClr>
+      </a:solidFill>
+    </cs:spPr>
+  </cs:dataPointMarker>
+  <cs:dataPointMarkerLayout symbol="circle" size="6"/>
+  <cs:dataPointWireframe>
+    <cs:lnRef idx="0">
+      <cs:styleClr val="auto"/>
+    </cs:lnRef>
+    <cs:fillRef idx="0"/>
+    <cs:effectRef idx="0"/>
+    <cs:fontRef idx="minor">
+      <a:schemeClr val="dk1"/>
+    </cs:fontRef>
+    <cs:spPr>
+      <a:ln w="9525" cap="rnd">
+        <a:solidFill>
+          <a:schemeClr val="phClr"/>
+        </a:solidFill>
+        <a:round/>
+      </a:ln>
+    </cs:spPr>
+  </cs:dataPointWireframe>
+  <cs:dataTable>
+    <cs:lnRef idx="0"/>
+    <cs:fillRef idx="0"/>
+    <cs:effectRef idx="0"/>
+    <cs:fontRef idx="minor">
+      <a:schemeClr val="dk1">
+        <a:lumMod val="75000"/>
+        <a:lumOff val="25000"/>
+      </a:schemeClr>
+    </cs:fontRef>
+    <cs:spPr>
+      <a:ln w="9525">
+        <a:solidFill>
+          <a:schemeClr val="dk1">
+            <a:lumMod val="35000"/>
+            <a:lumOff val="65000"/>
+          </a:schemeClr>
+        </a:solidFill>
+      </a:ln>
+    </cs:spPr>
+    <cs:defRPr sz="1197" kern="1200"/>
+  </cs:dataTable>
+  <cs:downBar>
+    <cs:lnRef idx="0"/>
+    <cs:fillRef idx="0"/>
+    <cs:effectRef idx="0"/>
+    <cs:fontRef idx="minor">
+      <a:schemeClr val="dk1"/>
+    </cs:fontRef>
+    <cs:spPr>
+      <a:solidFill>
+        <a:schemeClr val="dk1">
+          <a:lumMod val="50000"/>
+          <a:lumOff val="50000"/>
+        </a:schemeClr>
+      </a:solidFill>
+      <a:ln w="9525">
+        <a:solidFill>
+          <a:schemeClr val="dk1">
+            <a:lumMod val="65000"/>
+            <a:lumOff val="35000"/>
+          </a:schemeClr>
+        </a:solidFill>
+      </a:ln>
+    </cs:spPr>
+  </cs:downBar>
+  <cs:dropLine>
+    <cs:lnRef idx="0"/>
+    <cs:fillRef idx="0"/>
+    <cs:effectRef idx="0"/>
+    <cs:fontRef idx="minor">
+      <a:schemeClr val="dk1"/>
+    </cs:fontRef>
+    <cs:spPr>
+      <a:ln w="9525">
+        <a:solidFill>
+          <a:schemeClr val="dk1">
+            <a:lumMod val="35000"/>
+            <a:lumOff val="65000"/>
+          </a:schemeClr>
+        </a:solidFill>
+        <a:prstDash val="dash"/>
+      </a:ln>
+    </cs:spPr>
+  </cs:dropLine>
+  <cs:errorBar>
+    <cs:lnRef idx="0"/>
+    <cs:fillRef idx="0"/>
+    <cs:effectRef idx="0"/>
+    <cs:fontRef idx="minor">
+      <a:schemeClr val="dk1"/>
+    </cs:fontRef>
+    <cs:spPr>
+      <a:ln w="9525">
+        <a:solidFill>
+          <a:schemeClr val="dk1">
+            <a:lumMod val="65000"/>
+            <a:lumOff val="35000"/>
+          </a:schemeClr>
+        </a:solidFill>
+        <a:round/>
+      </a:ln>
+    </cs:spPr>
+  </cs:errorBar>
+  <cs:floor>
+    <cs:lnRef idx="0"/>
+    <cs:fillRef idx="0"/>
+    <cs:effectRef idx="0"/>
+    <cs:fontRef idx="minor">
+      <a:schemeClr val="dk1"/>
+    </cs:fontRef>
+  </cs:floor>
+  <cs:gridlineMajor>
+    <cs:lnRef idx="0"/>
+    <cs:fillRef idx="0"/>
+    <cs:effectRef idx="0"/>
+    <cs:fontRef idx="minor">
+      <a:schemeClr val="dk1"/>
+    </cs:fontRef>
+    <cs:spPr>
+      <a:ln w="9525" cap="flat" cmpd="sng" algn="ctr">
+        <a:gradFill>
+          <a:gsLst>
+            <a:gs pos="100000">
+              <a:schemeClr val="dk1">
+                <a:lumMod val="95000"/>
+                <a:lumOff val="5000"/>
+                <a:alpha val="42000"/>
+              </a:schemeClr>
+            </a:gs>
+            <a:gs pos="0">
+              <a:schemeClr val="lt1">
+                <a:lumMod val="75000"/>
+                <a:alpha val="36000"/>
+              </a:schemeClr>
+            </a:gs>
+          </a:gsLst>
+          <a:lin ang="5400000" scaled="0"/>
+        </a:gradFill>
+        <a:round/>
+      </a:ln>
+    </cs:spPr>
+  </cs:gridlineMajor>
+  <cs:gridlineMinor>
+    <cs:lnRef idx="0"/>
+    <cs:fillRef idx="0"/>
+    <cs:effectRef idx="0"/>
+    <cs:fontRef idx="minor">
+      <a:schemeClr val="dk1"/>
+    </cs:fontRef>
+    <cs:spPr>
+      <a:ln>
+        <a:gradFill>
+          <a:gsLst>
+            <a:gs pos="100000">
+              <a:schemeClr val="dk1">
+                <a:lumMod val="95000"/>
+                <a:lumOff val="5000"/>
+                <a:alpha val="42000"/>
+              </a:schemeClr>
+            </a:gs>
+            <a:gs pos="0">
+              <a:schemeClr val="lt1">
+                <a:lumMod val="75000"/>
+                <a:alpha val="36000"/>
+              </a:schemeClr>
+            </a:gs>
+          </a:gsLst>
+          <a:lin ang="5400000" scaled="0"/>
+        </a:gradFill>
+      </a:ln>
+    </cs:spPr>
+  </cs:gridlineMinor>
+  <cs:hiLoLine>
+    <cs:lnRef idx="0"/>
+    <cs:fillRef idx="0"/>
+    <cs:effectRef idx="0"/>
+    <cs:fontRef idx="minor">
+      <a:schemeClr val="dk1"/>
+    </cs:fontRef>
+    <cs:spPr>
+      <a:ln w="9525">
+        <a:solidFill>
+          <a:schemeClr val="dk1">
+            <a:lumMod val="35000"/>
+            <a:lumOff val="65000"/>
+          </a:schemeClr>
+        </a:solidFill>
+        <a:prstDash val="dash"/>
+      </a:ln>
+    </cs:spPr>
+  </cs:hiLoLine>
+  <cs:leaderLine>
+    <cs:lnRef idx="0"/>
+    <cs:fillRef idx="0"/>
+    <cs:effectRef idx="0"/>
+    <cs:fontRef idx="minor">
+      <a:schemeClr val="dk1"/>
+    </cs:fontRef>
+    <cs:spPr>
+      <a:ln w="9525">
+        <a:solidFill>
+          <a:schemeClr val="dk1">
+            <a:lumMod val="50000"/>
+            <a:lumOff val="50000"/>
+          </a:schemeClr>
+        </a:solidFill>
+      </a:ln>
+    </cs:spPr>
+  </cs:leaderLine>
+  <cs:legend>
+    <cs:lnRef idx="0"/>
+    <cs:fillRef idx="0"/>
+    <cs:effectRef idx="0"/>
+    <cs:fontRef idx="minor">
+      <a:schemeClr val="dk1">
+        <a:lumMod val="75000"/>
+        <a:lumOff val="25000"/>
+      </a:schemeClr>
+    </cs:fontRef>
+    <cs:spPr>
+      <a:solidFill>
+        <a:schemeClr val="lt1">
+          <a:lumMod val="95000"/>
+          <a:alpha val="39000"/>
+        </a:schemeClr>
+      </a:solidFill>
+    </cs:spPr>
+    <cs:defRPr sz="1197" kern="1200"/>
+  </cs:legend>
+  <cs:plotArea>
+    <cs:lnRef idx="0"/>
+    <cs:fillRef idx="0"/>
+    <cs:effectRef idx="0"/>
+    <cs:fontRef idx="minor">
+      <a:schemeClr val="dk1"/>
+    </cs:fontRef>
+  </cs:plotArea>
+  <cs:plotArea3D>
+    <cs:lnRef idx="0"/>
+    <cs:fillRef idx="0"/>
+    <cs:effectRef idx="0"/>
+    <cs:fontRef idx="minor">
+      <a:schemeClr val="dk1"/>
+    </cs:fontRef>
+  </cs:plotArea3D>
+  <cs:seriesAxis>
+    <cs:lnRef idx="0"/>
+    <cs:fillRef idx="0"/>
+    <cs:effectRef idx="0"/>
+    <cs:fontRef idx="minor">
+      <a:schemeClr val="dk1">
+        <a:lumMod val="75000"/>
+        <a:lumOff val="25000"/>
+      </a:schemeClr>
+    </cs:fontRef>
+    <cs:spPr>
+      <a:ln w="31750" cap="flat" cmpd="sng" algn="ctr">
+        <a:solidFill>
+          <a:schemeClr val="dk1">
+            <a:lumMod val="75000"/>
+            <a:lumOff val="25000"/>
+          </a:schemeClr>
+        </a:solidFill>
+        <a:round/>
+      </a:ln>
+    </cs:spPr>
+    <cs:defRPr sz="1197" kern="1200"/>
+  </cs:seriesAxis>
+  <cs:seriesLine>
+    <cs:lnRef idx="0"/>
+    <cs:fillRef idx="0"/>
+    <cs:effectRef idx="0"/>
+    <cs:fontRef idx="minor">
+      <a:schemeClr val="dk1"/>
+    </cs:fontRef>
+    <cs:spPr>
+      <a:ln w="9525">
+        <a:solidFill>
+          <a:schemeClr val="dk1">
+            <a:lumMod val="50000"/>
+            <a:lumOff val="50000"/>
+          </a:schemeClr>
+        </a:solidFill>
+        <a:round/>
+      </a:ln>
+    </cs:spPr>
+  </cs:seriesLine>
+  <cs:title>
+    <cs:lnRef idx="0"/>
+    <cs:fillRef idx="0"/>
+    <cs:effectRef idx="0"/>
+    <cs:fontRef idx="minor">
+      <a:schemeClr val="dk1">
+        <a:lumMod val="75000"/>
+        <a:lumOff val="25000"/>
+      </a:schemeClr>
+    </cs:fontRef>
+    <cs:defRPr sz="2200" b="1" kern="1200" baseline="0"/>
+  </cs:title>
+  <cs:trendline>
+    <cs:lnRef idx="0">
+      <cs:styleClr val="auto"/>
+    </cs:lnRef>
+    <cs:fillRef idx="0"/>
+    <cs:effectRef idx="0"/>
+    <cs:fontRef idx="minor">
+      <a:schemeClr val="dk1"/>
+    </cs:fontRef>
+    <cs:spPr>
+      <a:ln w="19050" cap="rnd">
+        <a:solidFill>
+          <a:schemeClr val="phClr"/>
+        </a:solidFill>
+      </a:ln>
+    </cs:spPr>
+  </cs:trendline>
+  <cs:trendlineLabel>
+    <cs:lnRef idx="0"/>
+    <cs:fillRef idx="0"/>
+    <cs:effectRef idx="0"/>
+    <cs:fontRef idx="minor">
+      <a:schemeClr val="dk1">
+        <a:lumMod val="75000"/>
+        <a:lumOff val="25000"/>
+      </a:schemeClr>
+    </cs:fontRef>
+    <cs:defRPr sz="1197" kern="1200"/>
+  </cs:trendlineLabel>
+  <cs:upBar>
+    <cs:lnRef idx="0"/>
+    <cs:fillRef idx="0"/>
+    <cs:effectRef idx="0"/>
+    <cs:fontRef idx="minor">
+      <a:schemeClr val="dk1"/>
+    </cs:fontRef>
+    <cs:spPr>
+      <a:solidFill>
+        <a:schemeClr val="lt1"/>
+      </a:solidFill>
+      <a:ln w="9525">
+        <a:solidFill>
+          <a:schemeClr val="dk1">
+            <a:lumMod val="65000"/>
+            <a:lumOff val="35000"/>
+          </a:schemeClr>
+        </a:solidFill>
+      </a:ln>
+    </cs:spPr>
+  </cs:upBar>
+  <cs:valueAxis>
+    <cs:lnRef idx="0"/>
+    <cs:fillRef idx="0"/>
+    <cs:effectRef idx="0"/>
+    <cs:fontRef idx="minor">
+      <a:schemeClr val="dk1">
+        <a:lumMod val="75000"/>
+        <a:lumOff val="25000"/>
+      </a:schemeClr>
+    </cs:fontRef>
+    <cs:spPr>
+      <a:ln>
+        <a:noFill/>
+      </a:ln>
+    </cs:spPr>
+    <cs:defRPr sz="1197" kern="1200"/>
+  </cs:valueAxis>
+  <cs:wall>
+    <cs:lnRef idx="0"/>
+    <cs:fillRef idx="0"/>
+    <cs:effectRef idx="0"/>
+    <cs:fontRef idx="minor">
+      <a:schemeClr val="dk1"/>
+    </cs:fontRef>
+  </cs:wall>
+</cs:chartStyle>
+</file>
+
+<file path=ppt/charts/style2.xml><?xml version="1.0" encoding="utf-8"?>
+<cs:chartStyle xmlns:cs="http://schemas.microsoft.com/office/drawing/2012/chartStyle" xmlns:a="http://schemas.openxmlformats.org/drawingml/2006/main" id="218">
+  <cs:axisTitle>
+    <cs:lnRef idx="0"/>
+    <cs:fillRef idx="0"/>
+    <cs:effectRef idx="0"/>
+    <cs:fontRef idx="minor">
+      <a:schemeClr val="dk1">
+        <a:lumMod val="75000"/>
+        <a:lumOff val="25000"/>
+      </a:schemeClr>
+    </cs:fontRef>
+    <cs:defRPr sz="1197" b="1" kern="1200"/>
+  </cs:axisTitle>
+  <cs:categoryAxis>
+    <cs:lnRef idx="0"/>
+    <cs:fillRef idx="0"/>
+    <cs:effectRef idx="0"/>
+    <cs:fontRef idx="minor">
+      <a:schemeClr val="dk1">
+        <a:lumMod val="75000"/>
+        <a:lumOff val="25000"/>
+      </a:schemeClr>
+    </cs:fontRef>
+    <cs:spPr>
+      <a:ln w="19050" cap="flat" cmpd="sng" algn="ctr">
+        <a:solidFill>
+          <a:schemeClr val="dk1">
+            <a:lumMod val="75000"/>
+            <a:lumOff val="25000"/>
+          </a:schemeClr>
+        </a:solidFill>
+        <a:round/>
+      </a:ln>
+    </cs:spPr>
+    <cs:defRPr sz="1197" kern="1200" cap="all" baseline="0"/>
+  </cs:categoryAxis>
+  <cs:chartArea>
+    <cs:lnRef idx="0"/>
+    <cs:fillRef idx="0"/>
+    <cs:effectRef idx="0"/>
+    <cs:fontRef idx="minor">
+      <a:schemeClr val="dk1"/>
+    </cs:fontRef>
+    <cs:spPr>
+      <a:gradFill flip="none" rotWithShape="1">
+        <a:gsLst>
+          <a:gs pos="0">
+            <a:schemeClr val="lt1"/>
+          </a:gs>
+          <a:gs pos="39000">
+            <a:schemeClr val="lt1"/>
+          </a:gs>
+          <a:gs pos="100000">
+            <a:schemeClr val="lt1">
+              <a:lumMod val="75000"/>
+            </a:schemeClr>
+          </a:gs>
+        </a:gsLst>
+        <a:path path="circle">
+          <a:fillToRect l="50000" t="-80000" r="50000" b="180000"/>
+        </a:path>
+        <a:tileRect/>
+      </a:gradFill>
+      <a:ln w="9525" cap="flat" cmpd="sng" algn="ctr">
+        <a:solidFill>
+          <a:schemeClr val="dk1">
+            <a:lumMod val="25000"/>
+            <a:lumOff val="75000"/>
+          </a:schemeClr>
+        </a:solidFill>
+        <a:round/>
+      </a:ln>
+    </cs:spPr>
+    <cs:defRPr sz="1197" kern="1200"/>
+  </cs:chartArea>
+  <cs:dataLabel>
+    <cs:lnRef idx="0"/>
+    <cs:fillRef idx="0"/>
+    <cs:effectRef idx="0"/>
+    <cs:fontRef idx="minor">
+      <a:schemeClr val="lt1"/>
+    </cs:fontRef>
+    <cs:defRPr sz="1197" b="1" i="0" u="none" strike="noStrike" kern="1200" baseline="0"/>
+  </cs:dataLabel>
+  <cs:dataLabelCallout>
+    <cs:lnRef idx="0"/>
+    <cs:fillRef idx="0"/>
+    <cs:effectRef idx="0"/>
+    <cs:fontRef idx="minor">
+      <a:schemeClr val="lt1"/>
+    </cs:fontRef>
+    <cs:spPr>
+      <a:solidFill>
+        <a:schemeClr val="dk1">
+          <a:lumMod val="65000"/>
+          <a:lumOff val="35000"/>
+          <a:alpha val="75000"/>
+        </a:schemeClr>
+      </a:solidFill>
+    </cs:spPr>
+    <cs:defRPr sz="1197" b="1" kern="1200"/>
+    <cs:bodyPr rot="0" spcFirstLastPara="1" vertOverflow="clip" horzOverflow="clip" vert="horz" wrap="square" lIns="36576" tIns="18288" rIns="36576" bIns="18288" anchor="ctr" anchorCtr="1">
+      <a:spAutoFit/>
+    </cs:bodyPr>
+  </cs:dataLabelCallout>
+  <cs:dataPoint>
+    <cs:lnRef idx="0"/>
+    <cs:fillRef idx="0">
+      <cs:styleClr val="auto"/>
+    </cs:fillRef>
+    <cs:effectRef idx="0"/>
+    <cs:fontRef idx="minor">
+      <a:schemeClr val="dk1"/>
+    </cs:fontRef>
+    <cs:spPr>
+      <a:solidFill>
+        <a:schemeClr val="phClr">
+          <a:alpha val="85000"/>
+        </a:schemeClr>
+      </a:solidFill>
+      <a:ln w="9525" cap="flat" cmpd="sng" algn="ctr">
+        <a:solidFill>
+          <a:schemeClr val="lt1">
+            <a:alpha val="50000"/>
+          </a:schemeClr>
+        </a:solidFill>
+        <a:round/>
+      </a:ln>
+    </cs:spPr>
+  </cs:dataPoint>
+  <cs:dataPoint3D>
+    <cs:lnRef idx="0"/>
+    <cs:fillRef idx="0">
+      <cs:styleClr val="auto"/>
+    </cs:fillRef>
+    <cs:effectRef idx="0"/>
+    <cs:fontRef idx="minor">
+      <a:schemeClr val="dk1"/>
+    </cs:fontRef>
+    <cs:spPr>
+      <a:solidFill>
+        <a:schemeClr val="phClr">
+          <a:alpha val="85000"/>
+        </a:schemeClr>
+      </a:solidFill>
+      <a:ln w="9525" cap="flat" cmpd="sng" algn="ctr">
+        <a:solidFill>
+          <a:schemeClr val="lt1">
+            <a:alpha val="50000"/>
+          </a:schemeClr>
+        </a:solidFill>
+        <a:round/>
+      </a:ln>
+    </cs:spPr>
+  </cs:dataPoint3D>
+  <cs:dataPointLine>
+    <cs:lnRef idx="0">
+      <cs:styleClr val="auto"/>
+    </cs:lnRef>
+    <cs:fillRef idx="0"/>
+    <cs:effectRef idx="0"/>
+    <cs:fontRef idx="minor">
+      <a:schemeClr val="dk1"/>
+    </cs:fontRef>
+    <cs:spPr>
+      <a:ln w="31750" cap="rnd">
+        <a:solidFill>
+          <a:schemeClr val="phClr">
+            <a:alpha val="85000"/>
+          </a:schemeClr>
+        </a:solidFill>
+        <a:round/>
+      </a:ln>
+    </cs:spPr>
+  </cs:dataPointLine>
+  <cs:dataPointMarker>
+    <cs:lnRef idx="0"/>
+    <cs:fillRef idx="0">
+      <cs:styleClr val="auto"/>
+    </cs:fillRef>
+    <cs:effectRef idx="0"/>
+    <cs:fontRef idx="minor">
+      <a:schemeClr val="dk1"/>
+    </cs:fontRef>
+    <cs:spPr>
+      <a:solidFill>
+        <a:schemeClr val="phClr">
+          <a:alpha val="85000"/>
+        </a:schemeClr>
+      </a:solidFill>
+    </cs:spPr>
+  </cs:dataPointMarker>
+  <cs:dataPointMarkerLayout symbol="circle" size="6"/>
+  <cs:dataPointWireframe>
+    <cs:lnRef idx="0">
+      <cs:styleClr val="auto"/>
+    </cs:lnRef>
+    <cs:fillRef idx="0"/>
+    <cs:effectRef idx="0"/>
+    <cs:fontRef idx="minor">
+      <a:schemeClr val="dk1"/>
+    </cs:fontRef>
+    <cs:spPr>
+      <a:ln w="9525" cap="rnd">
+        <a:solidFill>
+          <a:schemeClr val="phClr"/>
+        </a:solidFill>
+        <a:round/>
+      </a:ln>
+    </cs:spPr>
+  </cs:dataPointWireframe>
+  <cs:dataTable>
+    <cs:lnRef idx="0"/>
+    <cs:fillRef idx="0"/>
+    <cs:effectRef idx="0"/>
+    <cs:fontRef idx="minor">
+      <a:schemeClr val="dk1">
+        <a:lumMod val="75000"/>
+        <a:lumOff val="25000"/>
+      </a:schemeClr>
+    </cs:fontRef>
+    <cs:spPr>
+      <a:ln w="9525">
+        <a:solidFill>
+          <a:schemeClr val="dk1">
+            <a:lumMod val="35000"/>
+            <a:lumOff val="65000"/>
+          </a:schemeClr>
+        </a:solidFill>
+      </a:ln>
+    </cs:spPr>
+    <cs:defRPr sz="1197" kern="1200"/>
+  </cs:dataTable>
+  <cs:downBar>
+    <cs:lnRef idx="0"/>
+    <cs:fillRef idx="0"/>
+    <cs:effectRef idx="0"/>
+    <cs:fontRef idx="minor">
+      <a:schemeClr val="dk1"/>
+    </cs:fontRef>
+    <cs:spPr>
+      <a:solidFill>
+        <a:schemeClr val="dk1">
+          <a:lumMod val="50000"/>
+          <a:lumOff val="50000"/>
+        </a:schemeClr>
+      </a:solidFill>
+      <a:ln w="9525">
+        <a:solidFill>
+          <a:schemeClr val="dk1">
+            <a:lumMod val="65000"/>
+            <a:lumOff val="35000"/>
+          </a:schemeClr>
+        </a:solidFill>
+      </a:ln>
+    </cs:spPr>
+  </cs:downBar>
+  <cs:dropLine>
+    <cs:lnRef idx="0"/>
+    <cs:fillRef idx="0"/>
+    <cs:effectRef idx="0"/>
+    <cs:fontRef idx="minor">
+      <a:schemeClr val="dk1"/>
+    </cs:fontRef>
+    <cs:spPr>
+      <a:ln w="9525">
+        <a:solidFill>
+          <a:schemeClr val="dk1">
+            <a:lumMod val="35000"/>
+            <a:lumOff val="65000"/>
+          </a:schemeClr>
+        </a:solidFill>
+        <a:prstDash val="dash"/>
+      </a:ln>
+    </cs:spPr>
+  </cs:dropLine>
+  <cs:errorBar>
+    <cs:lnRef idx="0"/>
+    <cs:fillRef idx="0"/>
+    <cs:effectRef idx="0"/>
+    <cs:fontRef idx="minor">
+      <a:schemeClr val="dk1"/>
+    </cs:fontRef>
+    <cs:spPr>
+      <a:ln w="9525">
+        <a:solidFill>
+          <a:schemeClr val="dk1">
+            <a:lumMod val="65000"/>
+            <a:lumOff val="35000"/>
+          </a:schemeClr>
+        </a:solidFill>
+        <a:round/>
+      </a:ln>
+    </cs:spPr>
+  </cs:errorBar>
+  <cs:floor>
+    <cs:lnRef idx="0"/>
+    <cs:fillRef idx="0"/>
+    <cs:effectRef idx="0"/>
+    <cs:fontRef idx="minor">
+      <a:schemeClr val="dk1"/>
+    </cs:fontRef>
+  </cs:floor>
+  <cs:gridlineMajor>
+    <cs:lnRef idx="0"/>
+    <cs:fillRef idx="0"/>
+    <cs:effectRef idx="0"/>
+    <cs:fontRef idx="minor">
+      <a:schemeClr val="dk1"/>
+    </cs:fontRef>
+    <cs:spPr>
+      <a:ln w="9525" cap="flat" cmpd="sng" algn="ctr">
+        <a:gradFill>
+          <a:gsLst>
+            <a:gs pos="100000">
+              <a:schemeClr val="dk1">
+                <a:lumMod val="95000"/>
+                <a:lumOff val="5000"/>
+                <a:alpha val="42000"/>
+              </a:schemeClr>
+            </a:gs>
+            <a:gs pos="0">
+              <a:schemeClr val="lt1">
+                <a:lumMod val="75000"/>
+                <a:alpha val="36000"/>
+              </a:schemeClr>
+            </a:gs>
+          </a:gsLst>
+          <a:lin ang="5400000" scaled="0"/>
+        </a:gradFill>
+        <a:round/>
+      </a:ln>
+    </cs:spPr>
+  </cs:gridlineMajor>
+  <cs:gridlineMinor>
+    <cs:lnRef idx="0"/>
+    <cs:fillRef idx="0"/>
+    <cs:effectRef idx="0"/>
+    <cs:fontRef idx="minor">
+      <a:schemeClr val="dk1"/>
+    </cs:fontRef>
+    <cs:spPr>
+      <a:ln>
+        <a:gradFill>
+          <a:gsLst>
+            <a:gs pos="100000">
+              <a:schemeClr val="dk1">
+                <a:lumMod val="95000"/>
+                <a:lumOff val="5000"/>
+                <a:alpha val="42000"/>
+              </a:schemeClr>
+            </a:gs>
+            <a:gs pos="0">
+              <a:schemeClr val="lt1">
+                <a:lumMod val="75000"/>
+                <a:alpha val="36000"/>
+              </a:schemeClr>
+            </a:gs>
+          </a:gsLst>
+          <a:lin ang="5400000" scaled="0"/>
+        </a:gradFill>
+      </a:ln>
+    </cs:spPr>
+  </cs:gridlineMinor>
+  <cs:hiLoLine>
+    <cs:lnRef idx="0"/>
+    <cs:fillRef idx="0"/>
+    <cs:effectRef idx="0"/>
+    <cs:fontRef idx="minor">
+      <a:schemeClr val="dk1"/>
+    </cs:fontRef>
+    <cs:spPr>
+      <a:ln w="9525">
+        <a:solidFill>
+          <a:schemeClr val="dk1">
+            <a:lumMod val="35000"/>
+            <a:lumOff val="65000"/>
+          </a:schemeClr>
+        </a:solidFill>
+        <a:prstDash val="dash"/>
+      </a:ln>
+    </cs:spPr>
+  </cs:hiLoLine>
+  <cs:leaderLine>
+    <cs:lnRef idx="0"/>
+    <cs:fillRef idx="0"/>
+    <cs:effectRef idx="0"/>
+    <cs:fontRef idx="minor">
+      <a:schemeClr val="dk1"/>
+    </cs:fontRef>
+    <cs:spPr>
+      <a:ln w="9525">
+        <a:solidFill>
+          <a:schemeClr val="dk1">
+            <a:lumMod val="50000"/>
+            <a:lumOff val="50000"/>
+          </a:schemeClr>
+        </a:solidFill>
+      </a:ln>
+    </cs:spPr>
+  </cs:leaderLine>
+  <cs:legend>
+    <cs:lnRef idx="0"/>
+    <cs:fillRef idx="0"/>
+    <cs:effectRef idx="0"/>
+    <cs:fontRef idx="minor">
+      <a:schemeClr val="dk1">
+        <a:lumMod val="75000"/>
+        <a:lumOff val="25000"/>
+      </a:schemeClr>
+    </cs:fontRef>
+    <cs:spPr>
+      <a:solidFill>
+        <a:schemeClr val="lt1">
+          <a:lumMod val="95000"/>
+          <a:alpha val="39000"/>
+        </a:schemeClr>
+      </a:solidFill>
+    </cs:spPr>
+    <cs:defRPr sz="1197" kern="1200"/>
+  </cs:legend>
+  <cs:plotArea>
+    <cs:lnRef idx="0"/>
+    <cs:fillRef idx="0"/>
+    <cs:effectRef idx="0"/>
+    <cs:fontRef idx="minor">
+      <a:schemeClr val="dk1"/>
+    </cs:fontRef>
+  </cs:plotArea>
+  <cs:plotArea3D>
+    <cs:lnRef idx="0"/>
+    <cs:fillRef idx="0"/>
+    <cs:effectRef idx="0"/>
+    <cs:fontRef idx="minor">
+      <a:schemeClr val="dk1"/>
+    </cs:fontRef>
+  </cs:plotArea3D>
+  <cs:seriesAxis>
+    <cs:lnRef idx="0"/>
+    <cs:fillRef idx="0"/>
+    <cs:effectRef idx="0"/>
+    <cs:fontRef idx="minor">
+      <a:schemeClr val="dk1">
+        <a:lumMod val="75000"/>
+        <a:lumOff val="25000"/>
+      </a:schemeClr>
+    </cs:fontRef>
+    <cs:spPr>
+      <a:ln w="31750" cap="flat" cmpd="sng" algn="ctr">
+        <a:solidFill>
+          <a:schemeClr val="dk1">
+            <a:lumMod val="75000"/>
+            <a:lumOff val="25000"/>
+          </a:schemeClr>
+        </a:solidFill>
+        <a:round/>
+      </a:ln>
+    </cs:spPr>
+    <cs:defRPr sz="1197" kern="1200"/>
+  </cs:seriesAxis>
+  <cs:seriesLine>
+    <cs:lnRef idx="0"/>
+    <cs:fillRef idx="0"/>
+    <cs:effectRef idx="0"/>
+    <cs:fontRef idx="minor">
+      <a:schemeClr val="dk1"/>
+    </cs:fontRef>
+    <cs:spPr>
+      <a:ln w="9525">
+        <a:solidFill>
+          <a:schemeClr val="dk1">
+            <a:lumMod val="50000"/>
+            <a:lumOff val="50000"/>
+          </a:schemeClr>
+        </a:solidFill>
+        <a:round/>
+      </a:ln>
+    </cs:spPr>
+  </cs:seriesLine>
+  <cs:title>
+    <cs:lnRef idx="0"/>
+    <cs:fillRef idx="0"/>
+    <cs:effectRef idx="0"/>
+    <cs:fontRef idx="minor">
+      <a:schemeClr val="dk1">
+        <a:lumMod val="75000"/>
+        <a:lumOff val="25000"/>
+      </a:schemeClr>
+    </cs:fontRef>
+    <cs:defRPr sz="2200" b="1" kern="1200" baseline="0"/>
+  </cs:title>
+  <cs:trendline>
+    <cs:lnRef idx="0">
+      <cs:styleClr val="auto"/>
+    </cs:lnRef>
+    <cs:fillRef idx="0"/>
+    <cs:effectRef idx="0"/>
+    <cs:fontRef idx="minor">
+      <a:schemeClr val="dk1"/>
+    </cs:fontRef>
+    <cs:spPr>
+      <a:ln w="19050" cap="rnd">
+        <a:solidFill>
+          <a:schemeClr val="phClr"/>
+        </a:solidFill>
+      </a:ln>
+    </cs:spPr>
+  </cs:trendline>
+  <cs:trendlineLabel>
+    <cs:lnRef idx="0"/>
+    <cs:fillRef idx="0"/>
+    <cs:effectRef idx="0"/>
+    <cs:fontRef idx="minor">
+      <a:schemeClr val="dk1">
+        <a:lumMod val="75000"/>
+        <a:lumOff val="25000"/>
+      </a:schemeClr>
+    </cs:fontRef>
+    <cs:defRPr sz="1197" kern="1200"/>
+  </cs:trendlineLabel>
+  <cs:upBar>
+    <cs:lnRef idx="0"/>
+    <cs:fillRef idx="0"/>
+    <cs:effectRef idx="0"/>
+    <cs:fontRef idx="minor">
+      <a:schemeClr val="dk1"/>
+    </cs:fontRef>
+    <cs:spPr>
+      <a:solidFill>
+        <a:schemeClr val="lt1"/>
+      </a:solidFill>
+      <a:ln w="9525">
+        <a:solidFill>
+          <a:schemeClr val="dk1">
+            <a:lumMod val="65000"/>
+            <a:lumOff val="35000"/>
+          </a:schemeClr>
+        </a:solidFill>
+      </a:ln>
+    </cs:spPr>
+  </cs:upBar>
+  <cs:valueAxis>
+    <cs:lnRef idx="0"/>
+    <cs:fillRef idx="0"/>
+    <cs:effectRef idx="0"/>
+    <cs:fontRef idx="minor">
+      <a:schemeClr val="dk1">
+        <a:lumMod val="75000"/>
+        <a:lumOff val="25000"/>
+      </a:schemeClr>
+    </cs:fontRef>
+    <cs:spPr>
+      <a:ln>
+        <a:noFill/>
+      </a:ln>
+    </cs:spPr>
+    <cs:defRPr sz="1197" kern="1200"/>
+  </cs:valueAxis>
+  <cs:wall>
+    <cs:lnRef idx="0"/>
+    <cs:fillRef idx="0"/>
+    <cs:effectRef idx="0"/>
+    <cs:fontRef idx="minor">
+      <a:schemeClr val="dk1"/>
+    </cs:fontRef>
+  </cs:wall>
+</cs:chartStyle>
+</file>
+
+<file path=ppt/charts/style3.xml><?xml version="1.0" encoding="utf-8"?>
+<cs:chartStyle xmlns:cs="http://schemas.microsoft.com/office/drawing/2012/chartStyle" xmlns:a="http://schemas.openxmlformats.org/drawingml/2006/main" id="304">
+  <cs:axisTitle>
+    <cs:lnRef idx="0"/>
+    <cs:fillRef idx="0"/>
+    <cs:effectRef idx="0"/>
+    <cs:fontRef idx="minor">
+      <a:schemeClr val="lt1">
+        <a:lumMod val="85000"/>
+      </a:schemeClr>
+    </cs:fontRef>
+    <cs:defRPr sz="1197" b="1" kern="1200" cap="all"/>
+  </cs:axisTitle>
+  <cs:categoryAxis>
+    <cs:lnRef idx="0"/>
+    <cs:fillRef idx="0"/>
+    <cs:effectRef idx="0"/>
+    <cs:fontRef idx="minor">
+      <a:schemeClr val="lt1">
+        <a:lumMod val="85000"/>
+      </a:schemeClr>
+    </cs:fontRef>
+    <cs:spPr>
+      <a:ln w="12700" cap="flat" cmpd="sng" algn="ctr">
+        <a:solidFill>
+          <a:schemeClr val="lt1">
+            <a:lumMod val="95000"/>
+            <a:alpha val="54000"/>
+          </a:schemeClr>
+        </a:solidFill>
+        <a:round/>
+      </a:ln>
+    </cs:spPr>
+    <cs:defRPr sz="1197" kern="1200"/>
+  </cs:categoryAxis>
+  <cs:chartArea>
+    <cs:lnRef idx="0"/>
+    <cs:fillRef idx="0"/>
+    <cs:effectRef idx="0"/>
+    <cs:fontRef idx="minor">
+      <a:schemeClr val="dk1"/>
+    </cs:fontRef>
+    <cs:spPr>
+      <a:gradFill flip="none" rotWithShape="1">
+        <a:gsLst>
+          <a:gs pos="0">
+            <a:schemeClr val="dk1">
+              <a:lumMod val="65000"/>
+              <a:lumOff val="35000"/>
+            </a:schemeClr>
+          </a:gs>
+          <a:gs pos="100000">
+            <a:schemeClr val="dk1">
+              <a:lumMod val="85000"/>
+              <a:lumOff val="15000"/>
+            </a:schemeClr>
+          </a:gs>
+        </a:gsLst>
+        <a:path path="circle">
+          <a:fillToRect l="50000" t="50000" r="50000" b="50000"/>
+        </a:path>
+        <a:tileRect/>
+      </a:gradFill>
+    </cs:spPr>
+    <cs:defRPr sz="1330" kern="1200"/>
+  </cs:chartArea>
+  <cs:dataLabel>
+    <cs:lnRef idx="0"/>
+    <cs:fillRef idx="0"/>
+    <cs:effectRef idx="0"/>
+    <cs:fontRef idx="minor">
+      <a:schemeClr val="lt1">
+        <a:lumMod val="85000"/>
+      </a:schemeClr>
+    </cs:fontRef>
+    <cs:defRPr sz="1197" kern="1200"/>
+  </cs:dataLabel>
+  <cs:dataLabelCallout>
+    <cs:lnRef idx="0"/>
+    <cs:fillRef idx="0"/>
+    <cs:effectRef idx="0"/>
+    <cs:fontRef idx="minor">
+      <a:schemeClr val="dk1">
+        <a:lumMod val="65000"/>
+        <a:lumOff val="35000"/>
+      </a:schemeClr>
+    </cs:fontRef>
+    <cs:spPr>
+      <a:solidFill>
+        <a:schemeClr val="lt1"/>
+      </a:solidFill>
+    </cs:spPr>
+    <cs:defRPr sz="1197" kern="1200"/>
+    <cs:bodyPr rot="0" spcFirstLastPara="1" vertOverflow="clip" horzOverflow="clip" vert="horz" wrap="square" lIns="36576" tIns="18288" rIns="36576" bIns="18288" anchor="ctr" anchorCtr="1">
+      <a:spAutoFit/>
+    </cs:bodyPr>
+  </cs:dataLabelCallout>
+  <cs:dataPoint>
+    <cs:lnRef idx="0"/>
+    <cs:fillRef idx="3">
+      <cs:styleClr val="auto"/>
+    </cs:fillRef>
+    <cs:effectRef idx="3"/>
+    <cs:fontRef idx="minor">
+      <a:schemeClr val="tx1"/>
+    </cs:fontRef>
+  </cs:dataPoint>
+  <cs:dataPoint3D>
+    <cs:lnRef idx="0"/>
+    <cs:fillRef idx="3">
+      <cs:styleClr val="auto"/>
+    </cs:fillRef>
+    <cs:effectRef idx="3"/>
+    <cs:fontRef idx="minor">
+      <a:schemeClr val="tx1"/>
+    </cs:fontRef>
+  </cs:dataPoint3D>
+  <cs:dataPointLine>
+    <cs:lnRef idx="0">
+      <cs:styleClr val="auto"/>
+    </cs:lnRef>
+    <cs:fillRef idx="3"/>
+    <cs:effectRef idx="3"/>
+    <cs:fontRef idx="minor">
+      <a:schemeClr val="tx1"/>
+    </cs:fontRef>
+    <cs:spPr>
+      <a:ln w="34925" cap="rnd">
+        <a:solidFill>
+          <a:schemeClr val="phClr"/>
+        </a:solidFill>
+        <a:round/>
+      </a:ln>
+    </cs:spPr>
+  </cs:dataPointLine>
+  <cs:dataPointMarker>
+    <cs:lnRef idx="0">
+      <cs:styleClr val="auto"/>
+    </cs:lnRef>
+    <cs:fillRef idx="3">
+      <cs:styleClr val="auto"/>
+    </cs:fillRef>
+    <cs:effectRef idx="3"/>
+    <cs:fontRef idx="minor">
+      <a:schemeClr val="tx1"/>
+    </cs:fontRef>
+    <cs:spPr>
+      <a:ln w="9525">
+        <a:solidFill>
+          <a:schemeClr val="phClr"/>
+        </a:solidFill>
+        <a:round/>
+      </a:ln>
+    </cs:spPr>
+  </cs:dataPointMarker>
+  <cs:dataPointMarkerLayout symbol="circle" size="6"/>
+  <cs:dataPointWireframe>
+    <cs:lnRef idx="0">
+      <cs:styleClr val="auto"/>
+    </cs:lnRef>
+    <cs:fillRef idx="3"/>
+    <cs:effectRef idx="3"/>
+    <cs:fontRef idx="minor">
+      <a:schemeClr val="tx1"/>
+    </cs:fontRef>
+    <cs:spPr>
+      <a:ln w="9525" cap="rnd">
+        <a:solidFill>
+          <a:schemeClr val="phClr"/>
+        </a:solidFill>
+        <a:round/>
+      </a:ln>
+    </cs:spPr>
+  </cs:dataPointWireframe>
+  <cs:dataTable>
+    <cs:lnRef idx="0"/>
+    <cs:fillRef idx="0"/>
+    <cs:effectRef idx="0"/>
+    <cs:fontRef idx="minor">
+      <a:schemeClr val="lt1">
+        <a:lumMod val="85000"/>
+      </a:schemeClr>
+    </cs:fontRef>
+    <cs:spPr>
+      <a:ln w="9525">
+        <a:solidFill>
+          <a:schemeClr val="lt1">
+            <a:lumMod val="95000"/>
+            <a:alpha val="54000"/>
+          </a:schemeClr>
+        </a:solidFill>
+      </a:ln>
+    </cs:spPr>
+    <cs:defRPr sz="1197" kern="1200"/>
+  </cs:dataTable>
+  <cs:downBar>
+    <cs:lnRef idx="0"/>
+    <cs:fillRef idx="0"/>
+    <cs:effectRef idx="0"/>
+    <cs:fontRef idx="minor">
+      <a:schemeClr val="tx1"/>
+    </cs:fontRef>
+    <cs:spPr>
+      <a:solidFill>
+        <a:schemeClr val="dk1">
+          <a:lumMod val="75000"/>
+          <a:lumOff val="25000"/>
+        </a:schemeClr>
+      </a:solidFill>
+      <a:ln w="9525">
+        <a:solidFill>
+          <a:schemeClr val="lt1">
+            <a:lumMod val="95000"/>
+            <a:alpha val="54000"/>
+          </a:schemeClr>
+        </a:solidFill>
+      </a:ln>
+    </cs:spPr>
+  </cs:downBar>
+  <cs:dropLine>
+    <cs:lnRef idx="0"/>
+    <cs:fillRef idx="0"/>
+    <cs:effectRef idx="0"/>
+    <cs:fontRef idx="minor">
+      <a:schemeClr val="tx1"/>
+    </cs:fontRef>
+    <cs:spPr>
+      <a:ln w="9525">
+        <a:solidFill>
+          <a:schemeClr val="lt1">
+            <a:lumMod val="95000"/>
+            <a:alpha val="54000"/>
+          </a:schemeClr>
+        </a:solidFill>
+        <a:prstDash val="dash"/>
+      </a:ln>
+    </cs:spPr>
+  </cs:dropLine>
+  <cs:errorBar>
+    <cs:lnRef idx="0"/>
+    <cs:fillRef idx="0"/>
+    <cs:effectRef idx="0"/>
+    <cs:fontRef idx="minor">
+      <a:schemeClr val="tx1"/>
+    </cs:fontRef>
+    <cs:spPr>
+      <a:ln w="9525" cap="flat" cmpd="sng" algn="ctr">
+        <a:solidFill>
+          <a:schemeClr val="lt1">
+            <a:lumMod val="95000"/>
+          </a:schemeClr>
+        </a:solidFill>
+        <a:round/>
+      </a:ln>
+    </cs:spPr>
+  </cs:errorBar>
+  <cs:floor>
+    <cs:lnRef idx="0"/>
+    <cs:fillRef idx="0"/>
+    <cs:effectRef idx="0"/>
+    <cs:fontRef idx="minor">
+      <a:schemeClr val="tx1"/>
+    </cs:fontRef>
+  </cs:floor>
+  <cs:gridlineMajor>
+    <cs:lnRef idx="0"/>
+    <cs:fillRef idx="0"/>
+    <cs:effectRef idx="0"/>
+    <cs:fontRef idx="minor">
+      <a:schemeClr val="tx1"/>
+    </cs:fontRef>
+    <cs:spPr>
+      <a:ln w="9525" cap="flat" cmpd="sng" algn="ctr">
+        <a:solidFill>
+          <a:schemeClr val="lt1">
+            <a:lumMod val="95000"/>
+            <a:alpha val="10000"/>
+          </a:schemeClr>
+        </a:solidFill>
+        <a:round/>
+      </a:ln>
+    </cs:spPr>
+  </cs:gridlineMajor>
+  <cs:gridlineMinor>
+    <cs:lnRef idx="0"/>
+    <cs:fillRef idx="0"/>
+    <cs:effectRef idx="0"/>
+    <cs:fontRef idx="minor">
+      <a:schemeClr val="tx1"/>
+    </cs:fontRef>
+    <cs:spPr>
+      <a:ln>
+        <a:solidFill>
+          <a:schemeClr val="lt1">
+            <a:lumMod val="95000"/>
+            <a:alpha val="5000"/>
+          </a:schemeClr>
+        </a:solidFill>
+      </a:ln>
+    </cs:spPr>
+  </cs:gridlineMinor>
+  <cs:hiLoLine>
+    <cs:lnRef idx="0"/>
+    <cs:fillRef idx="0"/>
+    <cs:effectRef idx="0"/>
+    <cs:fontRef idx="minor">
+      <a:schemeClr val="tx1"/>
+    </cs:fontRef>
+    <cs:spPr>
+      <a:ln w="9525">
+        <a:solidFill>
+          <a:schemeClr val="lt1">
+            <a:lumMod val="95000"/>
+            <a:alpha val="54000"/>
+          </a:schemeClr>
+        </a:solidFill>
+        <a:prstDash val="dash"/>
+      </a:ln>
+    </cs:spPr>
+  </cs:hiLoLine>
+  <cs:leaderLine>
+    <cs:lnRef idx="0"/>
+    <cs:fillRef idx="0"/>
+    <cs:effectRef idx="0"/>
+    <cs:fontRef idx="minor">
+      <a:schemeClr val="tx1"/>
+    </cs:fontRef>
+    <cs:spPr>
+      <a:ln w="9525">
+        <a:solidFill>
+          <a:schemeClr val="lt1">
+            <a:lumMod val="95000"/>
+            <a:alpha val="54000"/>
+          </a:schemeClr>
+        </a:solidFill>
+      </a:ln>
+    </cs:spPr>
+  </cs:leaderLine>
+  <cs:legend>
+    <cs:lnRef idx="0"/>
+    <cs:fillRef idx="0"/>
+    <cs:effectRef idx="0"/>
+    <cs:fontRef idx="minor">
+      <a:schemeClr val="lt1">
+        <a:lumMod val="85000"/>
+      </a:schemeClr>
+    </cs:fontRef>
+    <cs:defRPr sz="1197" kern="1200"/>
+  </cs:legend>
+  <cs:plotArea>
+    <cs:lnRef idx="0"/>
+    <cs:fillRef idx="0"/>
+    <cs:effectRef idx="0"/>
+    <cs:fontRef idx="minor">
+      <a:schemeClr val="tx1"/>
+    </cs:fontRef>
+  </cs:plotArea>
+  <cs:plotArea3D>
+    <cs:lnRef idx="0"/>
+    <cs:fillRef idx="0"/>
+    <cs:effectRef idx="0"/>
+    <cs:fontRef idx="minor">
+      <a:schemeClr val="tx1"/>
+    </cs:fontRef>
+  </cs:plotArea3D>
+  <cs:seriesAxis>
+    <cs:lnRef idx="0"/>
+    <cs:fillRef idx="0"/>
+    <cs:effectRef idx="0"/>
+    <cs:fontRef idx="minor">
+      <a:schemeClr val="lt1">
+        <a:lumMod val="85000"/>
+      </a:schemeClr>
+    </cs:fontRef>
+    <cs:spPr>
+      <a:ln w="12700" cap="flat" cmpd="sng" algn="ctr">
+        <a:solidFill>
+          <a:schemeClr val="lt1">
+            <a:lumMod val="95000"/>
+            <a:alpha val="54000"/>
+          </a:schemeClr>
+        </a:solidFill>
+        <a:round/>
+      </a:ln>
+    </cs:spPr>
+    <cs:defRPr sz="1197" kern="1200"/>
+  </cs:seriesAxis>
+  <cs:seriesLine>
+    <cs:lnRef idx="0"/>
+    <cs:fillRef idx="0"/>
+    <cs:effectRef idx="0"/>
+    <cs:fontRef idx="minor">
+      <a:schemeClr val="lt1"/>
+    </cs:fontRef>
+    <cs:spPr>
+      <a:ln w="9525" cap="flat" cmpd="sng" algn="ctr">
+        <a:solidFill>
+          <a:schemeClr val="lt1">
+            <a:lumMod val="95000"/>
+            <a:alpha val="54000"/>
+          </a:schemeClr>
+        </a:solidFill>
+        <a:round/>
+      </a:ln>
+    </cs:spPr>
+  </cs:seriesLine>
+  <cs:title>
+    <cs:lnRef idx="0"/>
+    <cs:fillRef idx="0"/>
+    <cs:effectRef idx="0"/>
+    <cs:fontRef idx="minor">
+      <a:schemeClr val="lt1">
+        <a:lumMod val="95000"/>
+      </a:schemeClr>
+    </cs:fontRef>
+    <cs:defRPr sz="2128" b="1" kern="1200" spc="100" baseline="0">
+      <a:effectLst>
+        <a:outerShdw blurRad="50800" dist="38100" dir="5400000" algn="t" rotWithShape="0">
+          <a:prstClr val="black">
+            <a:alpha val="40000"/>
+          </a:prstClr>
+        </a:outerShdw>
+      </a:effectLst>
+    </cs:defRPr>
+  </cs:title>
+  <cs:trendline>
+    <cs:lnRef idx="0">
+      <cs:styleClr val="auto"/>
+    </cs:lnRef>
+    <cs:fillRef idx="0"/>
+    <cs:effectRef idx="0"/>
+    <cs:fontRef idx="minor">
+      <a:schemeClr val="tx1"/>
+    </cs:fontRef>
+    <cs:spPr>
+      <a:ln w="19050" cap="rnd">
+        <a:solidFill>
+          <a:schemeClr val="phClr"/>
+        </a:solidFill>
+      </a:ln>
+    </cs:spPr>
+  </cs:trendline>
+  <cs:trendlineLabel>
+    <cs:lnRef idx="0"/>
+    <cs:fillRef idx="0"/>
+    <cs:effectRef idx="0"/>
+    <cs:fontRef idx="minor">
+      <a:schemeClr val="lt1">
+        <a:lumMod val="85000"/>
+      </a:schemeClr>
+    </cs:fontRef>
+    <cs:defRPr sz="1197" kern="1200"/>
+  </cs:trendlineLabel>
+  <cs:upBar>
+    <cs:lnRef idx="0"/>
+    <cs:fillRef idx="0"/>
+    <cs:effectRef idx="0"/>
+    <cs:fontRef idx="minor">
+      <a:schemeClr val="tx1"/>
+    </cs:fontRef>
+    <cs:spPr>
+      <a:solidFill>
+        <a:schemeClr val="lt1"/>
+      </a:solidFill>
+      <a:ln w="9525">
+        <a:solidFill>
+          <a:schemeClr val="lt1">
+            <a:lumMod val="95000"/>
+            <a:alpha val="54000"/>
+          </a:schemeClr>
+        </a:solidFill>
+      </a:ln>
+    </cs:spPr>
+  </cs:upBar>
+  <cs:valueAxis>
+    <cs:lnRef idx="0"/>
+    <cs:fillRef idx="0"/>
+    <cs:effectRef idx="0"/>
+    <cs:fontRef idx="minor">
+      <a:schemeClr val="lt1">
+        <a:lumMod val="85000"/>
+      </a:schemeClr>
+    </cs:fontRef>
+    <cs:defRPr sz="1197" kern="1200"/>
+  </cs:valueAxis>
+  <cs:wall>
+    <cs:lnRef idx="0"/>
+    <cs:fillRef idx="0"/>
+    <cs:effectRef idx="0"/>
+    <cs:fontRef idx="minor">
+      <a:schemeClr val="tx1"/>
+    </cs:fontRef>
+  </cs:wall>
+</cs:chartStyle>
+</file>
+
+<file path=ppt/charts/style4.xml><?xml version="1.0" encoding="utf-8"?>
+<cs:chartStyle xmlns:cs="http://schemas.microsoft.com/office/drawing/2012/chartStyle" xmlns:a="http://schemas.openxmlformats.org/drawingml/2006/main" id="201">
+  <cs:axisTitle>
+    <cs:lnRef idx="0"/>
+    <cs:fillRef idx="0"/>
+    <cs:effectRef idx="0"/>
+    <cs:fontRef idx="minor">
+      <a:schemeClr val="tx1">
+        <a:lumMod val="65000"/>
+        <a:lumOff val="35000"/>
+      </a:schemeClr>
+    </cs:fontRef>
+    <cs:defRPr sz="1330" kern="1200"/>
+  </cs:axisTitle>
+  <cs:categoryAxis>
+    <cs:lnRef idx="0"/>
+    <cs:fillRef idx="0"/>
+    <cs:effectRef idx="0"/>
+    <cs:fontRef idx="minor">
+      <a:schemeClr val="tx1">
+        <a:lumMod val="65000"/>
+        <a:lumOff val="35000"/>
+      </a:schemeClr>
+    </cs:fontRef>
+    <cs:spPr>
+      <a:ln w="9525" cap="flat" cmpd="sng" algn="ctr">
+        <a:solidFill>
+          <a:schemeClr val="tx1">
+            <a:lumMod val="15000"/>
+            <a:lumOff val="85000"/>
+          </a:schemeClr>
+        </a:solidFill>
+        <a:round/>
+      </a:ln>
+    </cs:spPr>
+    <cs:defRPr sz="1197" kern="1200"/>
+  </cs:categoryAxis>
+  <cs:chartArea mods="allowNoFillOverride allowNoLineOverride">
+    <cs:lnRef idx="0"/>
+    <cs:fillRef idx="0"/>
+    <cs:effectRef idx="0"/>
+    <cs:fontRef idx="minor">
+      <a:schemeClr val="tx1"/>
+    </cs:fontRef>
+    <cs:spPr>
+      <a:solidFill>
+        <a:schemeClr val="bg1"/>
+      </a:solidFill>
+      <a:ln w="9525" cap="flat" cmpd="sng" algn="ctr">
+        <a:solidFill>
+          <a:schemeClr val="tx1">
+            <a:lumMod val="15000"/>
+            <a:lumOff val="85000"/>
+          </a:schemeClr>
+        </a:solidFill>
+        <a:round/>
+      </a:ln>
+    </cs:spPr>
+    <cs:defRPr sz="1330" kern="1200"/>
+  </cs:chartArea>
+  <cs:dataLabel>
+    <cs:lnRef idx="0"/>
+    <cs:fillRef idx="0"/>
+    <cs:effectRef idx="0"/>
+    <cs:fontRef idx="minor">
+      <a:schemeClr val="tx1">
+        <a:lumMod val="75000"/>
+        <a:lumOff val="25000"/>
+      </a:schemeClr>
+    </cs:fontRef>
+    <cs:defRPr sz="1197" kern="1200"/>
+  </cs:dataLabel>
+  <cs:dataLabelCallout>
+    <cs:lnRef idx="0"/>
+    <cs:fillRef idx="0"/>
+    <cs:effectRef idx="0"/>
+    <cs:fontRef idx="minor">
+      <a:schemeClr val="dk1">
+        <a:lumMod val="65000"/>
+        <a:lumOff val="35000"/>
+      </a:schemeClr>
+    </cs:fontRef>
+    <cs:spPr>
+      <a:solidFill>
+        <a:schemeClr val="lt1"/>
+      </a:solidFill>
+      <a:ln>
+        <a:solidFill>
+          <a:schemeClr val="dk1">
+            <a:lumMod val="25000"/>
+            <a:lumOff val="75000"/>
+          </a:schemeClr>
+        </a:solidFill>
+      </a:ln>
+    </cs:spPr>
+    <cs:defRPr sz="1197" kern="1200"/>
+    <cs:bodyPr rot="0" spcFirstLastPara="1" vertOverflow="clip" horzOverflow="clip" vert="horz" wrap="square" lIns="36576" tIns="18288" rIns="36576" bIns="18288" anchor="ctr" anchorCtr="1">
+      <a:spAutoFit/>
+    </cs:bodyPr>
+  </cs:dataLabelCallout>
+  <cs:dataPoint>
+    <cs:lnRef idx="0"/>
+    <cs:fillRef idx="1">
+      <cs:styleClr val="auto"/>
+    </cs:fillRef>
+    <cs:effectRef idx="0"/>
+    <cs:fontRef idx="minor">
+      <a:schemeClr val="tx1"/>
+    </cs:fontRef>
+  </cs:dataPoint>
+  <cs:dataPoint3D>
+    <cs:lnRef idx="0"/>
+    <cs:fillRef idx="1">
+      <cs:styleClr val="auto"/>
+    </cs:fillRef>
+    <cs:effectRef idx="0"/>
+    <cs:fontRef idx="minor">
+      <a:schemeClr val="tx1"/>
+    </cs:fontRef>
+  </cs:dataPoint3D>
+  <cs:dataPointLine>
+    <cs:lnRef idx="0">
+      <cs:styleClr val="auto"/>
+    </cs:lnRef>
+    <cs:fillRef idx="1"/>
+    <cs:effectRef idx="0"/>
+    <cs:fontRef idx="minor">
+      <a:schemeClr val="tx1"/>
+    </cs:fontRef>
+    <cs:spPr>
+      <a:ln w="28575" cap="rnd">
+        <a:solidFill>
+          <a:schemeClr val="phClr"/>
+        </a:solidFill>
+        <a:round/>
+      </a:ln>
+    </cs:spPr>
+  </cs:dataPointLine>
+  <cs:dataPointMarker>
+    <cs:lnRef idx="0">
+      <cs:styleClr val="auto"/>
+    </cs:lnRef>
+    <cs:fillRef idx="1">
+      <cs:styleClr val="auto"/>
+    </cs:fillRef>
+    <cs:effectRef idx="0"/>
+    <cs:fontRef idx="minor">
+      <a:schemeClr val="tx1"/>
+    </cs:fontRef>
+    <cs:spPr>
+      <a:ln w="9525">
+        <a:solidFill>
+          <a:schemeClr val="phClr"/>
+        </a:solidFill>
+      </a:ln>
+    </cs:spPr>
+  </cs:dataPointMarker>
+  <cs:dataPointMarkerLayout symbol="circle" size="5"/>
+  <cs:dataPointWireframe>
+    <cs:lnRef idx="0">
+      <cs:styleClr val="auto"/>
+    </cs:lnRef>
+    <cs:fillRef idx="1"/>
+    <cs:effectRef idx="0"/>
+    <cs:fontRef idx="minor">
+      <a:schemeClr val="tx1"/>
+    </cs:fontRef>
+    <cs:spPr>
+      <a:ln w="9525" cap="rnd">
+        <a:solidFill>
+          <a:schemeClr val="phClr"/>
+        </a:solidFill>
+        <a:round/>
+      </a:ln>
+    </cs:spPr>
+  </cs:dataPointWireframe>
+  <cs:dataTable>
+    <cs:lnRef idx="0"/>
+    <cs:fillRef idx="0"/>
+    <cs:effectRef idx="0"/>
+    <cs:fontRef idx="minor">
+      <a:schemeClr val="tx1">
+        <a:lumMod val="65000"/>
+        <a:lumOff val="35000"/>
+      </a:schemeClr>
+    </cs:fontRef>
+    <cs:spPr>
+      <a:noFill/>
+      <a:ln w="9525" cap="flat" cmpd="sng" algn="ctr">
+        <a:solidFill>
+          <a:schemeClr val="tx1">
+            <a:lumMod val="15000"/>
+            <a:lumOff val="85000"/>
+          </a:schemeClr>
+        </a:solidFill>
+        <a:round/>
+      </a:ln>
+    </cs:spPr>
+    <cs:defRPr sz="1197" kern="1200"/>
+  </cs:dataTable>
+  <cs:downBar>
+    <cs:lnRef idx="0"/>
+    <cs:fillRef idx="0"/>
+    <cs:effectRef idx="0"/>
+    <cs:fontRef idx="minor">
+      <a:schemeClr val="dk1"/>
+    </cs:fontRef>
+    <cs:spPr>
+      <a:solidFill>
+        <a:schemeClr val="dk1">
+          <a:lumMod val="65000"/>
+          <a:lumOff val="35000"/>
+        </a:schemeClr>
+      </a:solidFill>
+      <a:ln w="9525">
+        <a:solidFill>
+          <a:schemeClr val="tx1">
+            <a:lumMod val="65000"/>
+            <a:lumOff val="35000"/>
+          </a:schemeClr>
+        </a:solidFill>
+      </a:ln>
+    </cs:spPr>
+  </cs:downBar>
+  <cs:dropLine>
+    <cs:lnRef idx="0"/>
+    <cs:fillRef idx="0"/>
+    <cs:effectRef idx="0"/>
+    <cs:fontRef idx="minor">
+      <a:schemeClr val="tx1"/>
+    </cs:fontRef>
+    <cs:spPr>
+      <a:ln w="9525" cap="flat" cmpd="sng" algn="ctr">
+        <a:solidFill>
+          <a:schemeClr val="tx1">
+            <a:lumMod val="35000"/>
+            <a:lumOff val="65000"/>
+          </a:schemeClr>
+        </a:solidFill>
+        <a:round/>
+      </a:ln>
+    </cs:spPr>
+  </cs:dropLine>
+  <cs:errorBar>
+    <cs:lnRef idx="0"/>
+    <cs:fillRef idx="0"/>
+    <cs:effectRef idx="0"/>
+    <cs:fontRef idx="minor">
+      <a:schemeClr val="tx1"/>
+    </cs:fontRef>
+    <cs:spPr>
+      <a:ln w="9525" cap="flat" cmpd="sng" algn="ctr">
+        <a:solidFill>
+          <a:schemeClr val="tx1">
+            <a:lumMod val="65000"/>
+            <a:lumOff val="35000"/>
+          </a:schemeClr>
+        </a:solidFill>
+        <a:round/>
+      </a:ln>
+    </cs:spPr>
+  </cs:errorBar>
+  <cs:floor>
+    <cs:lnRef idx="0"/>
+    <cs:fillRef idx="0"/>
+    <cs:effectRef idx="0"/>
+    <cs:fontRef idx="minor">
+      <a:schemeClr val="tx1"/>
+    </cs:fontRef>
+    <cs:spPr>
+      <a:noFill/>
+      <a:ln>
+        <a:noFill/>
+      </a:ln>
+    </cs:spPr>
+  </cs:floor>
+  <cs:gridlineMajor>
+    <cs:lnRef idx="0"/>
+    <cs:fillRef idx="0"/>
+    <cs:effectRef idx="0"/>
+    <cs:fontRef idx="minor">
+      <a:schemeClr val="tx1"/>
+    </cs:fontRef>
+    <cs:spPr>
+      <a:ln w="9525" cap="flat" cmpd="sng" algn="ctr">
+        <a:solidFill>
+          <a:schemeClr val="tx1">
+            <a:lumMod val="15000"/>
+            <a:lumOff val="85000"/>
+          </a:schemeClr>
+        </a:solidFill>
+        <a:round/>
+      </a:ln>
+    </cs:spPr>
+  </cs:gridlineMajor>
+  <cs:gridlineMinor>
+    <cs:lnRef idx="0"/>
+    <cs:fillRef idx="0"/>
+    <cs:effectRef idx="0"/>
+    <cs:fontRef idx="minor">
+      <a:schemeClr val="tx1"/>
+    </cs:fontRef>
+    <cs:spPr>
+      <a:ln w="9525" cap="flat" cmpd="sng" algn="ctr">
+        <a:solidFill>
+          <a:schemeClr val="tx1">
+            <a:lumMod val="5000"/>
+            <a:lumOff val="95000"/>
+          </a:schemeClr>
+        </a:solidFill>
+        <a:round/>
+      </a:ln>
+    </cs:spPr>
+  </cs:gridlineMinor>
+  <cs:hiLoLine>
+    <cs:lnRef idx="0"/>
+    <cs:fillRef idx="0"/>
+    <cs:effectRef idx="0"/>
+    <cs:fontRef idx="minor">
+      <a:schemeClr val="tx1"/>
+    </cs:fontRef>
+    <cs:spPr>
+      <a:ln w="9525" cap="flat" cmpd="sng" algn="ctr">
+        <a:solidFill>
+          <a:schemeClr val="tx1">
+            <a:lumMod val="75000"/>
+            <a:lumOff val="25000"/>
+          </a:schemeClr>
+        </a:solidFill>
+        <a:round/>
+      </a:ln>
+    </cs:spPr>
+  </cs:hiLoLine>
+  <cs:leaderLine>
+    <cs:lnRef idx="0"/>
+    <cs:fillRef idx="0"/>
+    <cs:effectRef idx="0"/>
+    <cs:fontRef idx="minor">
+      <a:schemeClr val="tx1"/>
+    </cs:fontRef>
+    <cs:spPr>
+      <a:ln w="9525" cap="flat" cmpd="sng" algn="ctr">
+        <a:solidFill>
+          <a:schemeClr val="tx1">
+            <a:lumMod val="35000"/>
+            <a:lumOff val="65000"/>
+          </a:schemeClr>
+        </a:solidFill>
+        <a:round/>
+      </a:ln>
+    </cs:spPr>
+  </cs:leaderLine>
+  <cs:legend>
+    <cs:lnRef idx="0"/>
+    <cs:fillRef idx="0"/>
+    <cs:effectRef idx="0"/>
+    <cs:fontRef idx="minor">
+      <a:schemeClr val="tx1">
+        <a:lumMod val="65000"/>
+        <a:lumOff val="35000"/>
+      </a:schemeClr>
+    </cs:fontRef>
+    <cs:defRPr sz="1197" kern="1200"/>
+  </cs:legend>
+  <cs:plotArea mods="allowNoFillOverride allowNoLineOverride">
+    <cs:lnRef idx="0"/>
+    <cs:fillRef idx="0"/>
+    <cs:effectRef idx="0"/>
+    <cs:fontRef idx="minor">
+      <a:schemeClr val="tx1"/>
+    </cs:fontRef>
+  </cs:plotArea>
+  <cs:plotArea3D mods="allowNoFillOverride allowNoLineOverride">
+    <cs:lnRef idx="0"/>
+    <cs:fillRef idx="0"/>
+    <cs:effectRef idx="0"/>
+    <cs:fontRef idx="minor">
+      <a:schemeClr val="tx1"/>
+    </cs:fontRef>
+  </cs:plotArea3D>
+  <cs:seriesAxis>
+    <cs:lnRef idx="0"/>
+    <cs:fillRef idx="0"/>
+    <cs:effectRef idx="0"/>
+    <cs:fontRef idx="minor">
+      <a:schemeClr val="tx1">
+        <a:lumMod val="65000"/>
+        <a:lumOff val="35000"/>
+      </a:schemeClr>
+    </cs:fontRef>
+    <cs:defRPr sz="1197" kern="1200"/>
+  </cs:seriesAxis>
+  <cs:seriesLine>
+    <cs:lnRef idx="0"/>
+    <cs:fillRef idx="0"/>
+    <cs:effectRef idx="0"/>
+    <cs:fontRef idx="minor">
+      <a:schemeClr val="tx1"/>
+    </cs:fontRef>
+    <cs:spPr>
+      <a:ln w="9525" cap="flat" cmpd="sng" algn="ctr">
+        <a:solidFill>
+          <a:schemeClr val="tx1">
+            <a:lumMod val="35000"/>
+            <a:lumOff val="65000"/>
+          </a:schemeClr>
+        </a:solidFill>
+        <a:round/>
+      </a:ln>
+    </cs:spPr>
+  </cs:seriesLine>
+  <cs:title>
+    <cs:lnRef idx="0"/>
+    <cs:fillRef idx="0"/>
+    <cs:effectRef idx="0"/>
+    <cs:fontRef idx="minor">
+      <a:schemeClr val="tx1">
+        <a:lumMod val="65000"/>
+        <a:lumOff val="35000"/>
+      </a:schemeClr>
+    </cs:fontRef>
+    <cs:defRPr sz="1862" b="0" kern="1200" spc="0" baseline="0"/>
+  </cs:title>
+  <cs:trendline>
+    <cs:lnRef idx="0">
+      <cs:styleClr val="auto"/>
+    </cs:lnRef>
+    <cs:fillRef idx="0"/>
+    <cs:effectRef idx="0"/>
+    <cs:fontRef idx="minor">
+      <a:schemeClr val="tx1"/>
+    </cs:fontRef>
+    <cs:spPr>
+      <a:ln w="19050" cap="rnd">
+        <a:solidFill>
+          <a:schemeClr val="phClr"/>
+        </a:solidFill>
+        <a:prstDash val="sysDot"/>
+      </a:ln>
+    </cs:spPr>
+  </cs:trendline>
+  <cs:trendlineLabel>
+    <cs:lnRef idx="0"/>
+    <cs:fillRef idx="0"/>
+    <cs:effectRef idx="0"/>
+    <cs:fontRef idx="minor">
+      <a:schemeClr val="tx1">
+        <a:lumMod val="65000"/>
+        <a:lumOff val="35000"/>
+      </a:schemeClr>
+    </cs:fontRef>
+    <cs:defRPr sz="1197" kern="1200"/>
+  </cs:trendlineLabel>
+  <cs:upBar>
+    <cs:lnRef idx="0"/>
+    <cs:fillRef idx="0"/>
+    <cs:effectRef idx="0"/>
+    <cs:fontRef idx="minor">
+      <a:schemeClr val="dk1"/>
+    </cs:fontRef>
+    <cs:spPr>
+      <a:solidFill>
+        <a:schemeClr val="lt1"/>
+      </a:solidFill>
+      <a:ln w="9525">
+        <a:solidFill>
+          <a:schemeClr val="tx1">
+            <a:lumMod val="15000"/>
+            <a:lumOff val="85000"/>
+          </a:schemeClr>
+        </a:solidFill>
+      </a:ln>
+    </cs:spPr>
+  </cs:upBar>
+  <cs:valueAxis>
+    <cs:lnRef idx="0"/>
+    <cs:fillRef idx="0"/>
+    <cs:effectRef idx="0"/>
+    <cs:fontRef idx="minor">
+      <a:schemeClr val="tx1">
+        <a:lumMod val="65000"/>
+        <a:lumOff val="35000"/>
+      </a:schemeClr>
+    </cs:fontRef>
+    <cs:defRPr sz="1197" kern="1200"/>
+  </cs:valueAxis>
+  <cs:wall>
+    <cs:lnRef idx="0"/>
+    <cs:fillRef idx="0"/>
+    <cs:effectRef idx="0"/>
+    <cs:fontRef idx="minor">
+      <a:schemeClr val="tx1"/>
+    </cs:fontRef>
+    <cs:spPr>
+      <a:noFill/>
+      <a:ln>
+        <a:noFill/>
+      </a:ln>
+    </cs:spPr>
+  </cs:wall>
+</cs:chartStyle>
 </file>
 
 <file path=ppt/slideLayouts/slideLayout1.xml><?xml version="1.0" encoding="utf-8"?>
@@ -300,7 +3961,7 @@
             <a:fld id="{B61BEF0D-F0BB-DE4B-95CE-6DB70DBA9567}" type="datetimeFigureOut">
               <a:rPr lang="en-US" dirty="0"/>
               <a:pPr/>
-              <a:t>9/10/2025</a:t>
+              <a:t>9/14/2025</a:t>
             </a:fld>
             <a:endParaRPr lang="en-US" dirty="0"/>
           </a:p>
@@ -733,7 +4394,7 @@
             <a:fld id="{B61BEF0D-F0BB-DE4B-95CE-6DB70DBA9567}" type="datetimeFigureOut">
               <a:rPr lang="en-US" dirty="0"/>
               <a:pPr/>
-              <a:t>9/10/2025</a:t>
+              <a:t>9/14/2025</a:t>
             </a:fld>
             <a:endParaRPr lang="en-US" dirty="0"/>
           </a:p>
@@ -980,7 +4641,7 @@
             <a:fld id="{B61BEF0D-F0BB-DE4B-95CE-6DB70DBA9567}" type="datetimeFigureOut">
               <a:rPr lang="en-US" dirty="0"/>
               <a:pPr/>
-              <a:t>9/10/2025</a:t>
+              <a:t>9/14/2025</a:t>
             </a:fld>
             <a:endParaRPr lang="en-US" dirty="0"/>
           </a:p>
@@ -1285,7 +4946,7 @@
             <a:fld id="{B61BEF0D-F0BB-DE4B-95CE-6DB70DBA9567}" type="datetimeFigureOut">
               <a:rPr lang="en-US" dirty="0"/>
               <a:pPr/>
-              <a:t>9/10/2025</a:t>
+              <a:t>9/14/2025</a:t>
             </a:fld>
             <a:endParaRPr lang="en-US" dirty="0"/>
           </a:p>
@@ -1600,7 +5261,7 @@
             <a:fld id="{B61BEF0D-F0BB-DE4B-95CE-6DB70DBA9567}" type="datetimeFigureOut">
               <a:rPr lang="en-US" dirty="0"/>
               <a:pPr/>
-              <a:t>9/10/2025</a:t>
+              <a:t>9/14/2025</a:t>
             </a:fld>
             <a:endParaRPr lang="en-US" dirty="0"/>
           </a:p>
@@ -1899,7 +5560,7 @@
             <a:fld id="{B61BEF0D-F0BB-DE4B-95CE-6DB70DBA9567}" type="datetimeFigureOut">
               <a:rPr lang="en-US" dirty="0"/>
               <a:pPr/>
-              <a:t>9/10/2025</a:t>
+              <a:t>9/14/2025</a:t>
             </a:fld>
             <a:endParaRPr lang="en-US" dirty="0"/>
           </a:p>
@@ -2263,7 +5924,7 @@
             <a:fld id="{B61BEF0D-F0BB-DE4B-95CE-6DB70DBA9567}" type="datetimeFigureOut">
               <a:rPr lang="en-US" dirty="0"/>
               <a:pPr/>
-              <a:t>9/10/2025</a:t>
+              <a:t>9/14/2025</a:t>
             </a:fld>
             <a:endParaRPr lang="en-US" dirty="0"/>
           </a:p>
@@ -2434,7 +6095,7 @@
             <a:fld id="{B61BEF0D-F0BB-DE4B-95CE-6DB70DBA9567}" type="datetimeFigureOut">
               <a:rPr lang="en-US" dirty="0"/>
               <a:pPr/>
-              <a:t>9/10/2025</a:t>
+              <a:t>9/14/2025</a:t>
             </a:fld>
             <a:endParaRPr lang="en-US" dirty="0"/>
           </a:p>
@@ -2611,7 +6272,7 @@
             <a:fld id="{B61BEF0D-F0BB-DE4B-95CE-6DB70DBA9567}" type="datetimeFigureOut">
               <a:rPr lang="en-US" dirty="0"/>
               <a:pPr/>
-              <a:t>9/10/2025</a:t>
+              <a:t>9/14/2025</a:t>
             </a:fld>
             <a:endParaRPr lang="en-US" dirty="0"/>
           </a:p>
@@ -2778,7 +6439,7 @@
             <a:fld id="{B61BEF0D-F0BB-DE4B-95CE-6DB70DBA9567}" type="datetimeFigureOut">
               <a:rPr lang="en-US" dirty="0"/>
               <a:pPr/>
-              <a:t>9/10/2025</a:t>
+              <a:t>9/14/2025</a:t>
             </a:fld>
             <a:endParaRPr lang="en-US" dirty="0"/>
           </a:p>
@@ -3025,7 +6686,7 @@
             <a:fld id="{B61BEF0D-F0BB-DE4B-95CE-6DB70DBA9567}" type="datetimeFigureOut">
               <a:rPr lang="en-US" dirty="0"/>
               <a:pPr/>
-              <a:t>9/10/2025</a:t>
+              <a:t>9/14/2025</a:t>
             </a:fld>
             <a:endParaRPr lang="en-US" dirty="0"/>
           </a:p>
@@ -3258,7 +6919,7 @@
             <a:fld id="{B61BEF0D-F0BB-DE4B-95CE-6DB70DBA9567}" type="datetimeFigureOut">
               <a:rPr lang="en-US" dirty="0"/>
               <a:pPr/>
-              <a:t>9/10/2025</a:t>
+              <a:t>9/14/2025</a:t>
             </a:fld>
             <a:endParaRPr lang="en-US" dirty="0"/>
           </a:p>
@@ -3637,7 +7298,7 @@
             <a:fld id="{B61BEF0D-F0BB-DE4B-95CE-6DB70DBA9567}" type="datetimeFigureOut">
               <a:rPr lang="en-US" dirty="0"/>
               <a:pPr/>
-              <a:t>9/10/2025</a:t>
+              <a:t>9/14/2025</a:t>
             </a:fld>
             <a:endParaRPr lang="en-US" dirty="0"/>
           </a:p>
@@ -3752,7 +7413,7 @@
             <a:fld id="{B61BEF0D-F0BB-DE4B-95CE-6DB70DBA9567}" type="datetimeFigureOut">
               <a:rPr lang="en-US" dirty="0"/>
               <a:pPr/>
-              <a:t>9/10/2025</a:t>
+              <a:t>9/14/2025</a:t>
             </a:fld>
             <a:endParaRPr lang="en-US" dirty="0"/>
           </a:p>
@@ -3844,7 +7505,7 @@
             <a:fld id="{B61BEF0D-F0BB-DE4B-95CE-6DB70DBA9567}" type="datetimeFigureOut">
               <a:rPr lang="en-US" dirty="0"/>
               <a:pPr/>
-              <a:t>9/10/2025</a:t>
+              <a:t>9/14/2025</a:t>
             </a:fld>
             <a:endParaRPr lang="en-US" dirty="0"/>
           </a:p>
@@ -4096,7 +7757,7 @@
             <a:fld id="{B61BEF0D-F0BB-DE4B-95CE-6DB70DBA9567}" type="datetimeFigureOut">
               <a:rPr lang="en-US" dirty="0"/>
               <a:pPr/>
-              <a:t>9/10/2025</a:t>
+              <a:t>9/14/2025</a:t>
             </a:fld>
             <a:endParaRPr lang="en-US" dirty="0"/>
           </a:p>
@@ -4376,7 +8037,7 @@
             <a:fld id="{B61BEF0D-F0BB-DE4B-95CE-6DB70DBA9567}" type="datetimeFigureOut">
               <a:rPr lang="en-US" dirty="0"/>
               <a:pPr/>
-              <a:t>9/10/2025</a:t>
+              <a:t>9/14/2025</a:t>
             </a:fld>
             <a:endParaRPr lang="en-US" dirty="0"/>
           </a:p>
@@ -4779,7 +8440,7 @@
             <a:fld id="{B61BEF0D-F0BB-DE4B-95CE-6DB70DBA9567}" type="datetimeFigureOut">
               <a:rPr lang="en-US" dirty="0"/>
               <a:pPr/>
-              <a:t>9/10/2025</a:t>
+              <a:t>9/14/2025</a:t>
             </a:fld>
             <a:endParaRPr lang="en-US" dirty="0"/>
           </a:p>
@@ -5364,6 +9025,12 @@
               <a:rPr lang="es-AR" dirty="0"/>
               <a:t>Análisis exploratorio de ventas</a:t>
             </a:r>
+          </a:p>
+          <a:p>
+            <a:r>
+              <a:rPr lang="pt-BR" i="1" dirty="0"/>
+              <a:t>Informe rápido – SQL Server + PowerPoint</a:t>
+            </a:r>
             <a:endParaRPr lang="es-ES" dirty="0"/>
           </a:p>
         </p:txBody>
@@ -5398,10 +9065,1119 @@
           <a:chExt cx="0" cy="0"/>
         </a:xfrm>
       </p:grpSpPr>
+      <p:sp>
+        <p:nvSpPr>
+          <p:cNvPr id="2" name="CuadroTexto 1">
+            <a:extLst>
+              <a:ext uri="{FF2B5EF4-FFF2-40B4-BE49-F238E27FC236}">
+                <a16:creationId xmlns:a16="http://schemas.microsoft.com/office/drawing/2014/main" id="{DBB8F321-A333-190D-D404-F2B856FFA631}"/>
+              </a:ext>
+            </a:extLst>
+          </p:cNvPr>
+          <p:cNvSpPr txBox="1"/>
+          <p:nvPr/>
+        </p:nvSpPr>
+        <p:spPr>
+          <a:xfrm>
+            <a:off x="2712720" y="5490573"/>
+            <a:ext cx="6766560" cy="830997"/>
+          </a:xfrm>
+          <a:prstGeom prst="rect">
+            <a:avLst/>
+          </a:prstGeom>
+          <a:noFill/>
+        </p:spPr>
+        <p:txBody>
+          <a:bodyPr wrap="square" rtlCol="0">
+            <a:spAutoFit/>
+          </a:bodyPr>
+          <a:lstStyle/>
+          <a:p>
+            <a:r>
+              <a:rPr lang="es-ES" sz="4800" cap="all" dirty="0">
+                <a:ln w="3175" cmpd="sng">
+                  <a:noFill/>
+                </a:ln>
+                <a:latin typeface="+mj-lt"/>
+                <a:ea typeface="+mj-ea"/>
+                <a:cs typeface="+mj-cs"/>
+              </a:rPr>
+              <a:t>Panorama</a:t>
+            </a:r>
+            <a:r>
+              <a:rPr lang="es-ES" dirty="0"/>
+              <a:t> </a:t>
+            </a:r>
+            <a:r>
+              <a:rPr lang="es-ES" sz="4800" cap="all" dirty="0">
+                <a:ln w="3175" cmpd="sng">
+                  <a:noFill/>
+                </a:ln>
+                <a:latin typeface="+mj-lt"/>
+                <a:ea typeface="+mj-ea"/>
+                <a:cs typeface="+mj-cs"/>
+              </a:rPr>
+              <a:t>general</a:t>
+            </a:r>
+          </a:p>
+        </p:txBody>
+      </p:sp>
+      <p:graphicFrame>
+        <p:nvGraphicFramePr>
+          <p:cNvPr id="10" name="Gráfico 9">
+            <a:extLst>
+              <a:ext uri="{FF2B5EF4-FFF2-40B4-BE49-F238E27FC236}">
+                <a16:creationId xmlns:a16="http://schemas.microsoft.com/office/drawing/2014/main" id="{1550FFB7-509F-F506-360A-12BDDF113EC9}"/>
+              </a:ext>
+            </a:extLst>
+          </p:cNvPr>
+          <p:cNvGraphicFramePr/>
+          <p:nvPr>
+            <p:extLst>
+              <p:ext uri="{D42A27DB-BD31-4B8C-83A1-F6EECF244321}">
+                <p14:modId xmlns:p14="http://schemas.microsoft.com/office/powerpoint/2010/main" val="4249877940"/>
+              </p:ext>
+            </p:extLst>
+          </p:nvPr>
+        </p:nvGraphicFramePr>
+        <p:xfrm>
+          <a:off x="2561389" y="1704170"/>
+          <a:ext cx="7093249" cy="3449659"/>
+        </p:xfrm>
+        <a:graphic>
+          <a:graphicData uri="http://schemas.openxmlformats.org/drawingml/2006/chart">
+            <c:chart xmlns:c="http://schemas.openxmlformats.org/drawingml/2006/chart" xmlns:r="http://schemas.openxmlformats.org/officeDocument/2006/relationships" r:id="rId2"/>
+          </a:graphicData>
+        </a:graphic>
+      </p:graphicFrame>
+      <p:sp>
+        <p:nvSpPr>
+          <p:cNvPr id="11" name="Subtítulo 2">
+            <a:extLst>
+              <a:ext uri="{FF2B5EF4-FFF2-40B4-BE49-F238E27FC236}">
+                <a16:creationId xmlns:a16="http://schemas.microsoft.com/office/drawing/2014/main" id="{5E27CC7E-9A88-1126-0AD8-5BBF8091F9D9}"/>
+              </a:ext>
+            </a:extLst>
+          </p:cNvPr>
+          <p:cNvSpPr txBox="1">
+            <a:spLocks/>
+          </p:cNvSpPr>
+          <p:nvPr/>
+        </p:nvSpPr>
+        <p:spPr>
+          <a:xfrm>
+            <a:off x="87571" y="171526"/>
+            <a:ext cx="4942288" cy="1532644"/>
+          </a:xfrm>
+          <a:prstGeom prst="rect">
+            <a:avLst/>
+          </a:prstGeom>
+        </p:spPr>
+        <p:txBody>
+          <a:bodyPr vert="horz" lIns="91440" tIns="45720" rIns="91440" bIns="45720" rtlCol="0" anchor="ctr">
+            <a:normAutofit/>
+          </a:bodyPr>
+          <a:lstStyle>
+            <a:lvl1pPr marL="285750" indent="-285750" algn="l" defTabSz="457200" rtl="0" eaLnBrk="1" latinLnBrk="0" hangingPunct="1">
+              <a:spcBef>
+                <a:spcPct val="20000"/>
+              </a:spcBef>
+              <a:spcAft>
+                <a:spcPts val="600"/>
+              </a:spcAft>
+              <a:buClr>
+                <a:schemeClr val="tx1"/>
+              </a:buClr>
+              <a:buSzPct val="80000"/>
+              <a:buFont typeface="Wingdings 3" panose="05040102010807070707" pitchFamily="18" charset="2"/>
+              <a:buChar char=""/>
+              <a:defRPr sz="2000" kern="1200" cap="none">
+                <a:solidFill>
+                  <a:schemeClr val="bg2">
+                    <a:lumMod val="75000"/>
+                  </a:schemeClr>
+                </a:solidFill>
+                <a:effectLst/>
+                <a:latin typeface="+mn-lt"/>
+                <a:ea typeface="+mn-ea"/>
+                <a:cs typeface="+mn-cs"/>
+              </a:defRPr>
+            </a:lvl1pPr>
+            <a:lvl2pPr marL="742950" indent="-285750" algn="l" defTabSz="457200" rtl="0" eaLnBrk="1" latinLnBrk="0" hangingPunct="1">
+              <a:spcBef>
+                <a:spcPct val="20000"/>
+              </a:spcBef>
+              <a:spcAft>
+                <a:spcPts val="600"/>
+              </a:spcAft>
+              <a:buClr>
+                <a:schemeClr val="tx1"/>
+              </a:buClr>
+              <a:buSzPct val="80000"/>
+              <a:buFont typeface="Wingdings 3" panose="05040102010807070707" pitchFamily="18" charset="2"/>
+              <a:buChar char=""/>
+              <a:defRPr sz="1800" kern="1200" cap="none">
+                <a:solidFill>
+                  <a:schemeClr val="bg2">
+                    <a:lumMod val="75000"/>
+                  </a:schemeClr>
+                </a:solidFill>
+                <a:effectLst/>
+                <a:latin typeface="+mn-lt"/>
+                <a:ea typeface="+mn-ea"/>
+                <a:cs typeface="+mn-cs"/>
+              </a:defRPr>
+            </a:lvl2pPr>
+            <a:lvl3pPr marL="1200150" indent="-285750" algn="l" defTabSz="457200" rtl="0" eaLnBrk="1" latinLnBrk="0" hangingPunct="1">
+              <a:spcBef>
+                <a:spcPct val="20000"/>
+              </a:spcBef>
+              <a:spcAft>
+                <a:spcPts val="600"/>
+              </a:spcAft>
+              <a:buClr>
+                <a:schemeClr val="tx1"/>
+              </a:buClr>
+              <a:buSzPct val="80000"/>
+              <a:buFont typeface="Wingdings 3" panose="05040102010807070707" pitchFamily="18" charset="2"/>
+              <a:buChar char=""/>
+              <a:defRPr sz="1600" kern="1200" cap="none">
+                <a:solidFill>
+                  <a:schemeClr val="bg2">
+                    <a:lumMod val="75000"/>
+                  </a:schemeClr>
+                </a:solidFill>
+                <a:effectLst/>
+                <a:latin typeface="+mn-lt"/>
+                <a:ea typeface="+mn-ea"/>
+                <a:cs typeface="+mn-cs"/>
+              </a:defRPr>
+            </a:lvl3pPr>
+            <a:lvl4pPr marL="1543050" indent="-171450" algn="l" defTabSz="457200" rtl="0" eaLnBrk="1" latinLnBrk="0" hangingPunct="1">
+              <a:spcBef>
+                <a:spcPct val="20000"/>
+              </a:spcBef>
+              <a:spcAft>
+                <a:spcPts val="600"/>
+              </a:spcAft>
+              <a:buClr>
+                <a:schemeClr val="tx1"/>
+              </a:buClr>
+              <a:buSzPct val="80000"/>
+              <a:buFont typeface="Wingdings 3" panose="05040102010807070707" pitchFamily="18" charset="2"/>
+              <a:buChar char=""/>
+              <a:defRPr sz="1400" kern="1200" cap="none">
+                <a:solidFill>
+                  <a:schemeClr val="bg2">
+                    <a:lumMod val="75000"/>
+                  </a:schemeClr>
+                </a:solidFill>
+                <a:effectLst/>
+                <a:latin typeface="+mn-lt"/>
+                <a:ea typeface="+mn-ea"/>
+                <a:cs typeface="+mn-cs"/>
+              </a:defRPr>
+            </a:lvl4pPr>
+            <a:lvl5pPr marL="2000250" indent="-171450" algn="l" defTabSz="457200" rtl="0" eaLnBrk="1" latinLnBrk="0" hangingPunct="1">
+              <a:spcBef>
+                <a:spcPct val="20000"/>
+              </a:spcBef>
+              <a:spcAft>
+                <a:spcPts val="600"/>
+              </a:spcAft>
+              <a:buClr>
+                <a:schemeClr val="tx1"/>
+              </a:buClr>
+              <a:buSzPct val="80000"/>
+              <a:buFont typeface="Wingdings 3" panose="05040102010807070707" pitchFamily="18" charset="2"/>
+              <a:buChar char=""/>
+              <a:defRPr sz="1400" kern="1200" cap="none">
+                <a:solidFill>
+                  <a:schemeClr val="bg2">
+                    <a:lumMod val="75000"/>
+                  </a:schemeClr>
+                </a:solidFill>
+                <a:effectLst/>
+                <a:latin typeface="+mn-lt"/>
+                <a:ea typeface="+mn-ea"/>
+                <a:cs typeface="+mn-cs"/>
+              </a:defRPr>
+            </a:lvl5pPr>
+            <a:lvl6pPr marL="2514600" indent="-228600" algn="l" defTabSz="457200" rtl="0" eaLnBrk="1" latinLnBrk="0" hangingPunct="1">
+              <a:spcBef>
+                <a:spcPct val="20000"/>
+              </a:spcBef>
+              <a:spcAft>
+                <a:spcPts val="600"/>
+              </a:spcAft>
+              <a:buClr>
+                <a:schemeClr val="tx1"/>
+              </a:buClr>
+              <a:buSzPct val="80000"/>
+              <a:buFont typeface="Wingdings 3" panose="05040102010807070707" pitchFamily="18" charset="2"/>
+              <a:buChar char=""/>
+              <a:defRPr sz="1400" kern="1200" cap="none">
+                <a:solidFill>
+                  <a:schemeClr val="bg2">
+                    <a:lumMod val="75000"/>
+                  </a:schemeClr>
+                </a:solidFill>
+                <a:effectLst/>
+                <a:latin typeface="+mn-lt"/>
+                <a:ea typeface="+mn-ea"/>
+                <a:cs typeface="+mn-cs"/>
+              </a:defRPr>
+            </a:lvl6pPr>
+            <a:lvl7pPr marL="2971800" indent="-228600" algn="l" defTabSz="457200" rtl="0" eaLnBrk="1" latinLnBrk="0" hangingPunct="1">
+              <a:spcBef>
+                <a:spcPct val="20000"/>
+              </a:spcBef>
+              <a:spcAft>
+                <a:spcPts val="600"/>
+              </a:spcAft>
+              <a:buClr>
+                <a:schemeClr val="tx1"/>
+              </a:buClr>
+              <a:buSzPct val="80000"/>
+              <a:buFont typeface="Wingdings 3" panose="05040102010807070707" pitchFamily="18" charset="2"/>
+              <a:buChar char=""/>
+              <a:defRPr sz="1400" kern="1200" cap="none">
+                <a:solidFill>
+                  <a:schemeClr val="bg2">
+                    <a:lumMod val="75000"/>
+                  </a:schemeClr>
+                </a:solidFill>
+                <a:effectLst/>
+                <a:latin typeface="+mn-lt"/>
+                <a:ea typeface="+mn-ea"/>
+                <a:cs typeface="+mn-cs"/>
+              </a:defRPr>
+            </a:lvl7pPr>
+            <a:lvl8pPr marL="3429000" indent="-228600" algn="l" defTabSz="457200" rtl="0" eaLnBrk="1" latinLnBrk="0" hangingPunct="1">
+              <a:spcBef>
+                <a:spcPct val="20000"/>
+              </a:spcBef>
+              <a:spcAft>
+                <a:spcPts val="600"/>
+              </a:spcAft>
+              <a:buClr>
+                <a:schemeClr val="tx1"/>
+              </a:buClr>
+              <a:buSzPct val="80000"/>
+              <a:buFont typeface="Wingdings 3" panose="05040102010807070707" pitchFamily="18" charset="2"/>
+              <a:buChar char=""/>
+              <a:defRPr sz="1400" kern="1200" cap="none">
+                <a:solidFill>
+                  <a:schemeClr val="bg2">
+                    <a:lumMod val="75000"/>
+                  </a:schemeClr>
+                </a:solidFill>
+                <a:effectLst/>
+                <a:latin typeface="+mn-lt"/>
+                <a:ea typeface="+mn-ea"/>
+                <a:cs typeface="+mn-cs"/>
+              </a:defRPr>
+            </a:lvl8pPr>
+            <a:lvl9pPr marL="3886200" indent="-228600" algn="l" defTabSz="457200" rtl="0" eaLnBrk="1" latinLnBrk="0" hangingPunct="1">
+              <a:spcBef>
+                <a:spcPct val="20000"/>
+              </a:spcBef>
+              <a:spcAft>
+                <a:spcPts val="600"/>
+              </a:spcAft>
+              <a:buClr>
+                <a:schemeClr val="tx1"/>
+              </a:buClr>
+              <a:buSzPct val="80000"/>
+              <a:buFont typeface="Wingdings 3" panose="05040102010807070707" pitchFamily="18" charset="2"/>
+              <a:buChar char=""/>
+              <a:defRPr sz="1400" kern="1200" cap="none">
+                <a:solidFill>
+                  <a:schemeClr val="bg2">
+                    <a:lumMod val="75000"/>
+                  </a:schemeClr>
+                </a:solidFill>
+                <a:effectLst/>
+                <a:latin typeface="+mn-lt"/>
+                <a:ea typeface="+mn-ea"/>
+                <a:cs typeface="+mn-cs"/>
+              </a:defRPr>
+            </a:lvl9pPr>
+          </a:lstStyle>
+          <a:p>
+            <a:pPr>
+              <a:buFont typeface="Wingdings" panose="05000000000000000000" pitchFamily="2" charset="2"/>
+              <a:buChar char="v"/>
+            </a:pPr>
+            <a:r>
+              <a:rPr lang="es-ES" b="1" dirty="0" err="1"/>
+              <a:t>Insight</a:t>
+            </a:r>
+            <a:r>
+              <a:rPr lang="es-ES" b="1" dirty="0"/>
+              <a:t>:</a:t>
+            </a:r>
+            <a:r>
+              <a:rPr lang="es-ES" dirty="0"/>
+              <a:t> </a:t>
+            </a:r>
+            <a:r>
+              <a:rPr lang="es-ES" i="1" dirty="0"/>
+              <a:t>Mercado concentrado en Norteamérica y Europa Occidental.</a:t>
+            </a:r>
+          </a:p>
+          <a:p>
+            <a:pPr>
+              <a:buFont typeface="Wingdings" panose="05000000000000000000" pitchFamily="2" charset="2"/>
+              <a:buChar char="v"/>
+            </a:pPr>
+            <a:r>
+              <a:rPr lang="es-ES" b="1" dirty="0"/>
+              <a:t>Dato clave:</a:t>
+            </a:r>
+            <a:r>
+              <a:rPr lang="es-ES" dirty="0"/>
+              <a:t> 91 clientes en total.</a:t>
+            </a:r>
+          </a:p>
+        </p:txBody>
+      </p:sp>
     </p:spTree>
     <p:extLst>
       <p:ext uri="{BB962C8B-B14F-4D97-AF65-F5344CB8AC3E}">
         <p14:creationId xmlns:p14="http://schemas.microsoft.com/office/powerpoint/2010/main" val="920456789"/>
+      </p:ext>
+    </p:extLst>
+  </p:cSld>
+  <p:clrMapOvr>
+    <a:masterClrMapping/>
+  </p:clrMapOvr>
+</p:sld>
+</file>
+
+<file path=ppt/slides/slide3.xml><?xml version="1.0" encoding="utf-8"?>
+<p:sld xmlns:a="http://schemas.openxmlformats.org/drawingml/2006/main" xmlns:r="http://schemas.openxmlformats.org/officeDocument/2006/relationships" xmlns:p="http://schemas.openxmlformats.org/presentationml/2006/main">
+  <p:cSld>
+    <p:spTree>
+      <p:nvGrpSpPr>
+        <p:cNvPr id="1" name=""/>
+        <p:cNvGrpSpPr/>
+        <p:nvPr/>
+      </p:nvGrpSpPr>
+      <p:grpSpPr>
+        <a:xfrm>
+          <a:off x="0" y="0"/>
+          <a:ext cx="0" cy="0"/>
+          <a:chOff x="0" y="0"/>
+          <a:chExt cx="0" cy="0"/>
+        </a:xfrm>
+      </p:grpSpPr>
+      <p:sp>
+        <p:nvSpPr>
+          <p:cNvPr id="3" name="Marcador de contenido 2">
+            <a:extLst>
+              <a:ext uri="{FF2B5EF4-FFF2-40B4-BE49-F238E27FC236}">
+                <a16:creationId xmlns:a16="http://schemas.microsoft.com/office/drawing/2014/main" id="{6CDD2B1D-5B2A-7197-0B98-8F1B546ABC97}"/>
+              </a:ext>
+            </a:extLst>
+          </p:cNvPr>
+          <p:cNvSpPr>
+            <a:spLocks noGrp="1"/>
+          </p:cNvSpPr>
+          <p:nvPr>
+            <p:ph idx="1"/>
+          </p:nvPr>
+        </p:nvSpPr>
+        <p:spPr>
+          <a:xfrm>
+            <a:off x="1" y="0"/>
+            <a:ext cx="6612556" cy="1578543"/>
+          </a:xfrm>
+        </p:spPr>
+        <p:txBody>
+          <a:bodyPr/>
+          <a:lstStyle/>
+          <a:p>
+            <a:pPr marL="0" indent="0">
+              <a:buNone/>
+            </a:pPr>
+            <a:r>
+              <a:rPr lang="es-ES" b="1" dirty="0" err="1"/>
+              <a:t>Insight</a:t>
+            </a:r>
+            <a:r>
+              <a:rPr lang="es-ES" b="1" dirty="0"/>
+              <a:t>:</a:t>
+            </a:r>
+            <a:r>
+              <a:rPr lang="es-ES" dirty="0"/>
+              <a:t> </a:t>
+            </a:r>
+          </a:p>
+          <a:p>
+            <a:pPr>
+              <a:buFont typeface="Wingdings" panose="05000000000000000000" pitchFamily="2" charset="2"/>
+              <a:buChar char="v"/>
+            </a:pPr>
+            <a:r>
+              <a:rPr lang="es-ES" i="1" dirty="0"/>
+              <a:t>Categorías premium: carnes (≈54 USD). </a:t>
+            </a:r>
+          </a:p>
+          <a:p>
+            <a:pPr>
+              <a:buFont typeface="Wingdings" panose="05000000000000000000" pitchFamily="2" charset="2"/>
+              <a:buChar char="v"/>
+            </a:pPr>
+            <a:r>
+              <a:rPr lang="es-ES" i="1" dirty="0"/>
+              <a:t>Más económicos: granos y cereales (≈20 USD).</a:t>
+            </a:r>
+            <a:endParaRPr lang="es-ES" dirty="0"/>
+          </a:p>
+        </p:txBody>
+      </p:sp>
+      <p:graphicFrame>
+        <p:nvGraphicFramePr>
+          <p:cNvPr id="6" name="Gráfico 5">
+            <a:extLst>
+              <a:ext uri="{FF2B5EF4-FFF2-40B4-BE49-F238E27FC236}">
+                <a16:creationId xmlns:a16="http://schemas.microsoft.com/office/drawing/2014/main" id="{094D6333-A067-9614-5A8F-DB6F45119B27}"/>
+              </a:ext>
+            </a:extLst>
+          </p:cNvPr>
+          <p:cNvGraphicFramePr/>
+          <p:nvPr>
+            <p:extLst>
+              <p:ext uri="{D42A27DB-BD31-4B8C-83A1-F6EECF244321}">
+                <p14:modId xmlns:p14="http://schemas.microsoft.com/office/powerpoint/2010/main" val="3016374404"/>
+              </p:ext>
+            </p:extLst>
+          </p:nvPr>
+        </p:nvGraphicFramePr>
+        <p:xfrm>
+          <a:off x="352927" y="2438711"/>
+          <a:ext cx="5743073" cy="3801980"/>
+        </p:xfrm>
+        <a:graphic>
+          <a:graphicData uri="http://schemas.openxmlformats.org/drawingml/2006/chart">
+            <c:chart xmlns:c="http://schemas.openxmlformats.org/drawingml/2006/chart" xmlns:r="http://schemas.openxmlformats.org/officeDocument/2006/relationships" r:id="rId2"/>
+          </a:graphicData>
+        </a:graphic>
+      </p:graphicFrame>
+      <p:graphicFrame>
+        <p:nvGraphicFramePr>
+          <p:cNvPr id="9" name="Gráfico 8">
+            <a:extLst>
+              <a:ext uri="{FF2B5EF4-FFF2-40B4-BE49-F238E27FC236}">
+                <a16:creationId xmlns:a16="http://schemas.microsoft.com/office/drawing/2014/main" id="{34DE8971-34D4-C31A-38AC-512E2EA989A6}"/>
+              </a:ext>
+            </a:extLst>
+          </p:cNvPr>
+          <p:cNvGraphicFramePr/>
+          <p:nvPr>
+            <p:extLst>
+              <p:ext uri="{D42A27DB-BD31-4B8C-83A1-F6EECF244321}">
+                <p14:modId xmlns:p14="http://schemas.microsoft.com/office/powerpoint/2010/main" val="1290379194"/>
+              </p:ext>
+            </p:extLst>
+          </p:nvPr>
+        </p:nvGraphicFramePr>
+        <p:xfrm>
+          <a:off x="6612558" y="2438711"/>
+          <a:ext cx="5116360" cy="3801980"/>
+        </p:xfrm>
+        <a:graphic>
+          <a:graphicData uri="http://schemas.openxmlformats.org/drawingml/2006/chart">
+            <c:chart xmlns:c="http://schemas.openxmlformats.org/drawingml/2006/chart" xmlns:r="http://schemas.openxmlformats.org/officeDocument/2006/relationships" r:id="rId3"/>
+          </a:graphicData>
+        </a:graphic>
+      </p:graphicFrame>
+    </p:spTree>
+    <p:extLst>
+      <p:ext uri="{BB962C8B-B14F-4D97-AF65-F5344CB8AC3E}">
+        <p14:creationId xmlns:p14="http://schemas.microsoft.com/office/powerpoint/2010/main" val="1575220995"/>
+      </p:ext>
+    </p:extLst>
+  </p:cSld>
+  <p:clrMapOvr>
+    <a:masterClrMapping/>
+  </p:clrMapOvr>
+</p:sld>
+</file>
+
+<file path=ppt/slides/slide4.xml><?xml version="1.0" encoding="utf-8"?>
+<p:sld xmlns:a="http://schemas.openxmlformats.org/drawingml/2006/main" xmlns:r="http://schemas.openxmlformats.org/officeDocument/2006/relationships" xmlns:p="http://schemas.openxmlformats.org/presentationml/2006/main">
+  <p:cSld>
+    <p:spTree>
+      <p:nvGrpSpPr>
+        <p:cNvPr id="1" name=""/>
+        <p:cNvGrpSpPr/>
+        <p:nvPr/>
+      </p:nvGrpSpPr>
+      <p:grpSpPr>
+        <a:xfrm>
+          <a:off x="0" y="0"/>
+          <a:ext cx="0" cy="0"/>
+          <a:chOff x="0" y="0"/>
+          <a:chExt cx="0" cy="0"/>
+        </a:xfrm>
+      </p:grpSpPr>
+      <p:sp>
+        <p:nvSpPr>
+          <p:cNvPr id="2" name="Título 1">
+            <a:extLst>
+              <a:ext uri="{FF2B5EF4-FFF2-40B4-BE49-F238E27FC236}">
+                <a16:creationId xmlns:a16="http://schemas.microsoft.com/office/drawing/2014/main" id="{E7212D62-36BA-FD7E-22A4-718B7E466CCE}"/>
+              </a:ext>
+            </a:extLst>
+          </p:cNvPr>
+          <p:cNvSpPr>
+            <a:spLocks noGrp="1"/>
+          </p:cNvSpPr>
+          <p:nvPr>
+            <p:ph type="title"/>
+          </p:nvPr>
+        </p:nvSpPr>
+        <p:spPr/>
+        <p:txBody>
+          <a:bodyPr>
+            <a:normAutofit/>
+          </a:bodyPr>
+          <a:lstStyle/>
+          <a:p>
+            <a:pPr lvl="0" defTabSz="914400" eaLnBrk="0" fontAlgn="base" hangingPunct="0">
+              <a:spcAft>
+                <a:spcPct val="0"/>
+              </a:spcAft>
+            </a:pPr>
+            <a:br>
+              <a:rPr lang="es-ES" altLang="es-ES" cap="none" dirty="0">
+                <a:ln>
+                  <a:noFill/>
+                </a:ln>
+                <a:latin typeface="Arial" panose="020B0604020202020204" pitchFamily="34" charset="0"/>
+              </a:rPr>
+            </a:br>
+            <a:endParaRPr lang="es-ES" dirty="0"/>
+          </a:p>
+        </p:txBody>
+      </p:sp>
+      <p:sp>
+        <p:nvSpPr>
+          <p:cNvPr id="4" name="Rectangle 1">
+            <a:extLst>
+              <a:ext uri="{FF2B5EF4-FFF2-40B4-BE49-F238E27FC236}">
+                <a16:creationId xmlns:a16="http://schemas.microsoft.com/office/drawing/2014/main" id="{946D037A-5B53-768E-E6EF-9F7EE55E05ED}"/>
+              </a:ext>
+            </a:extLst>
+          </p:cNvPr>
+          <p:cNvSpPr>
+            <a:spLocks noGrp="1" noChangeArrowheads="1"/>
+          </p:cNvSpPr>
+          <p:nvPr>
+            <p:ph idx="1"/>
+          </p:nvPr>
+        </p:nvSpPr>
+        <p:spPr bwMode="auto">
+          <a:xfrm>
+            <a:off x="575355" y="4200705"/>
+            <a:ext cx="1390124" cy="1200329"/>
+          </a:xfrm>
+          <a:prstGeom prst="rect">
+            <a:avLst/>
+          </a:prstGeom>
+          <a:noFill/>
+          <a:ln>
+            <a:noFill/>
+          </a:ln>
+          <a:effectLst/>
+          <a:extLst>
+            <a:ext uri="{909E8E84-426E-40DD-AFC4-6F175D3DCCD1}">
+              <a14:hiddenFill xmlns:a14="http://schemas.microsoft.com/office/drawing/2010/main">
+                <a:solidFill>
+                  <a:schemeClr val="accent1"/>
+                </a:solidFill>
+              </a14:hiddenFill>
+            </a:ext>
+            <a:ext uri="{91240B29-F687-4F45-9708-019B960494DF}">
+              <a14:hiddenLine xmlns:a14="http://schemas.microsoft.com/office/drawing/2010/main" w="9525">
+                <a:solidFill>
+                  <a:schemeClr val="tx1"/>
+                </a:solidFill>
+                <a:miter lim="800000"/>
+                <a:headEnd/>
+                <a:tailEnd/>
+              </a14:hiddenLine>
+            </a:ext>
+            <a:ext uri="{AF507438-7753-43E0-B8FC-AC1667EBCBE1}">
+              <a14:hiddenEffects xmlns:a14="http://schemas.microsoft.com/office/drawing/2010/main">
+                <a:effectLst>
+                  <a:outerShdw dist="35921" dir="2700000" algn="ctr" rotWithShape="0">
+                    <a:schemeClr val="bg2"/>
+                  </a:outerShdw>
+                </a:effectLst>
+              </a14:hiddenEffects>
+            </a:ext>
+          </a:extLst>
+        </p:spPr>
+        <p:txBody>
+          <a:bodyPr vert="horz" wrap="none" lIns="91440" tIns="45720" rIns="91440" bIns="45720" numCol="1" anchor="ctr" anchorCtr="0" compatLnSpc="1">
+            <a:prstTxWarp prst="textNoShape">
+              <a:avLst/>
+            </a:prstTxWarp>
+            <a:spAutoFit/>
+          </a:bodyPr>
+          <a:lstStyle/>
+          <a:p>
+            <a:pPr marL="0" lvl="0" indent="0" defTabSz="914400" eaLnBrk="0" fontAlgn="base" hangingPunct="0">
+              <a:spcBef>
+                <a:spcPct val="0"/>
+              </a:spcBef>
+              <a:spcAft>
+                <a:spcPct val="0"/>
+              </a:spcAft>
+              <a:buClrTx/>
+              <a:buSzTx/>
+              <a:buFontTx/>
+              <a:buChar char="•"/>
+            </a:pPr>
+            <a:r>
+              <a:rPr lang="es-ES" altLang="es-ES" sz="1800" dirty="0">
+                <a:latin typeface="Arial" panose="020B0604020202020204" pitchFamily="34" charset="0"/>
+              </a:rPr>
+              <a:t>Datos:</a:t>
+            </a:r>
+            <a:br>
+              <a:rPr lang="es-ES" altLang="es-ES" sz="1800" dirty="0">
+                <a:latin typeface="Arial" panose="020B0604020202020204" pitchFamily="34" charset="0"/>
+              </a:rPr>
+            </a:br>
+            <a:r>
+              <a:rPr lang="es-ES" altLang="es-ES" sz="1800" dirty="0">
+                <a:latin typeface="Arial" panose="020B0604020202020204" pitchFamily="34" charset="0"/>
+              </a:rPr>
+              <a:t>1996: 193k</a:t>
+            </a:r>
+            <a:br>
+              <a:rPr lang="es-ES" altLang="es-ES" sz="1800" dirty="0">
+                <a:latin typeface="Arial" panose="020B0604020202020204" pitchFamily="34" charset="0"/>
+              </a:rPr>
+            </a:br>
+            <a:r>
+              <a:rPr lang="es-ES" altLang="es-ES" sz="1800" dirty="0">
+                <a:latin typeface="Arial" panose="020B0604020202020204" pitchFamily="34" charset="0"/>
+              </a:rPr>
+              <a:t>1997: 608k</a:t>
+            </a:r>
+            <a:br>
+              <a:rPr lang="es-ES" altLang="es-ES" sz="1800" dirty="0">
+                <a:latin typeface="Arial" panose="020B0604020202020204" pitchFamily="34" charset="0"/>
+              </a:rPr>
+            </a:br>
+            <a:r>
+              <a:rPr lang="es-ES" altLang="es-ES" sz="1800" dirty="0">
+                <a:latin typeface="Arial" panose="020B0604020202020204" pitchFamily="34" charset="0"/>
+              </a:rPr>
+              <a:t>1998: 438k</a:t>
+            </a:r>
+            <a:r>
+              <a:rPr kumimoji="0" lang="es-ES" altLang="es-ES" sz="1800" b="0" i="1" u="none" strike="noStrike" cap="none" normalizeH="0" baseline="0" dirty="0">
+                <a:ln>
+                  <a:noFill/>
+                </a:ln>
+                <a:solidFill>
+                  <a:schemeClr val="tx1"/>
+                </a:solidFill>
+                <a:effectLst/>
+                <a:latin typeface="Arial" panose="020B0604020202020204" pitchFamily="34" charset="0"/>
+              </a:rPr>
+              <a:t>.</a:t>
+            </a:r>
+            <a:endParaRPr kumimoji="0" lang="es-ES" altLang="es-ES" sz="1800" b="0" i="0" u="none" strike="noStrike" cap="none" normalizeH="0" baseline="0" dirty="0">
+              <a:ln>
+                <a:noFill/>
+              </a:ln>
+              <a:solidFill>
+                <a:schemeClr val="tx1"/>
+              </a:solidFill>
+              <a:effectLst/>
+              <a:latin typeface="Arial" panose="020B0604020202020204" pitchFamily="34" charset="0"/>
+            </a:endParaRPr>
+          </a:p>
+        </p:txBody>
+      </p:sp>
+      <p:sp>
+        <p:nvSpPr>
+          <p:cNvPr id="5" name="Rectangle 1">
+            <a:extLst>
+              <a:ext uri="{FF2B5EF4-FFF2-40B4-BE49-F238E27FC236}">
+                <a16:creationId xmlns:a16="http://schemas.microsoft.com/office/drawing/2014/main" id="{D74A7701-693F-9E15-E520-87B9C3287002}"/>
+              </a:ext>
+            </a:extLst>
+          </p:cNvPr>
+          <p:cNvSpPr txBox="1">
+            <a:spLocks noChangeArrowheads="1"/>
+          </p:cNvSpPr>
+          <p:nvPr/>
+        </p:nvSpPr>
+        <p:spPr bwMode="auto">
+          <a:xfrm>
+            <a:off x="135968" y="314870"/>
+            <a:ext cx="8023350" cy="369332"/>
+          </a:xfrm>
+          <a:prstGeom prst="rect">
+            <a:avLst/>
+          </a:prstGeom>
+          <a:noFill/>
+          <a:ln>
+            <a:noFill/>
+          </a:ln>
+          <a:effectLst/>
+          <a:extLst>
+            <a:ext uri="{909E8E84-426E-40DD-AFC4-6F175D3DCCD1}">
+              <a14:hiddenFill xmlns:a14="http://schemas.microsoft.com/office/drawing/2010/main">
+                <a:solidFill>
+                  <a:schemeClr val="accent1"/>
+                </a:solidFill>
+              </a14:hiddenFill>
+            </a:ext>
+            <a:ext uri="{91240B29-F687-4F45-9708-019B960494DF}">
+              <a14:hiddenLine xmlns:a14="http://schemas.microsoft.com/office/drawing/2010/main" w="9525">
+                <a:solidFill>
+                  <a:schemeClr val="tx1"/>
+                </a:solidFill>
+                <a:miter lim="800000"/>
+                <a:headEnd/>
+                <a:tailEnd/>
+              </a14:hiddenLine>
+            </a:ext>
+            <a:ext uri="{AF507438-7753-43E0-B8FC-AC1667EBCBE1}">
+              <a14:hiddenEffects xmlns:a14="http://schemas.microsoft.com/office/drawing/2010/main">
+                <a:effectLst>
+                  <a:outerShdw dist="35921" dir="2700000" algn="ctr" rotWithShape="0">
+                    <a:schemeClr val="bg2"/>
+                  </a:outerShdw>
+                </a:effectLst>
+              </a14:hiddenEffects>
+            </a:ext>
+          </a:extLst>
+        </p:spPr>
+        <p:txBody>
+          <a:bodyPr vert="horz" wrap="none" lIns="91440" tIns="45720" rIns="91440" bIns="45720" numCol="1" rtlCol="0" anchor="ctr" anchorCtr="0" compatLnSpc="1">
+            <a:prstTxWarp prst="textNoShape">
+              <a:avLst/>
+            </a:prstTxWarp>
+            <a:spAutoFit/>
+          </a:bodyPr>
+          <a:lstStyle>
+            <a:lvl1pPr marL="285750" indent="-285750" algn="l" defTabSz="457200" rtl="0" eaLnBrk="1" latinLnBrk="0" hangingPunct="1">
+              <a:spcBef>
+                <a:spcPct val="20000"/>
+              </a:spcBef>
+              <a:spcAft>
+                <a:spcPts val="600"/>
+              </a:spcAft>
+              <a:buClr>
+                <a:schemeClr val="tx1"/>
+              </a:buClr>
+              <a:buSzPct val="80000"/>
+              <a:buFont typeface="Wingdings 3" panose="05040102010807070707" pitchFamily="18" charset="2"/>
+              <a:buChar char=""/>
+              <a:defRPr sz="2000" kern="1200" cap="none">
+                <a:solidFill>
+                  <a:schemeClr val="bg2">
+                    <a:lumMod val="75000"/>
+                  </a:schemeClr>
+                </a:solidFill>
+                <a:effectLst/>
+                <a:latin typeface="+mn-lt"/>
+                <a:ea typeface="+mn-ea"/>
+                <a:cs typeface="+mn-cs"/>
+              </a:defRPr>
+            </a:lvl1pPr>
+            <a:lvl2pPr marL="742950" indent="-285750" algn="l" defTabSz="457200" rtl="0" eaLnBrk="1" latinLnBrk="0" hangingPunct="1">
+              <a:spcBef>
+                <a:spcPct val="20000"/>
+              </a:spcBef>
+              <a:spcAft>
+                <a:spcPts val="600"/>
+              </a:spcAft>
+              <a:buClr>
+                <a:schemeClr val="tx1"/>
+              </a:buClr>
+              <a:buSzPct val="80000"/>
+              <a:buFont typeface="Wingdings 3" panose="05040102010807070707" pitchFamily="18" charset="2"/>
+              <a:buChar char=""/>
+              <a:defRPr sz="1800" kern="1200" cap="none">
+                <a:solidFill>
+                  <a:schemeClr val="bg2">
+                    <a:lumMod val="75000"/>
+                  </a:schemeClr>
+                </a:solidFill>
+                <a:effectLst/>
+                <a:latin typeface="+mn-lt"/>
+                <a:ea typeface="+mn-ea"/>
+                <a:cs typeface="+mn-cs"/>
+              </a:defRPr>
+            </a:lvl2pPr>
+            <a:lvl3pPr marL="1200150" indent="-285750" algn="l" defTabSz="457200" rtl="0" eaLnBrk="1" latinLnBrk="0" hangingPunct="1">
+              <a:spcBef>
+                <a:spcPct val="20000"/>
+              </a:spcBef>
+              <a:spcAft>
+                <a:spcPts val="600"/>
+              </a:spcAft>
+              <a:buClr>
+                <a:schemeClr val="tx1"/>
+              </a:buClr>
+              <a:buSzPct val="80000"/>
+              <a:buFont typeface="Wingdings 3" panose="05040102010807070707" pitchFamily="18" charset="2"/>
+              <a:buChar char=""/>
+              <a:defRPr sz="1600" kern="1200" cap="none">
+                <a:solidFill>
+                  <a:schemeClr val="bg2">
+                    <a:lumMod val="75000"/>
+                  </a:schemeClr>
+                </a:solidFill>
+                <a:effectLst/>
+                <a:latin typeface="+mn-lt"/>
+                <a:ea typeface="+mn-ea"/>
+                <a:cs typeface="+mn-cs"/>
+              </a:defRPr>
+            </a:lvl3pPr>
+            <a:lvl4pPr marL="1543050" indent="-171450" algn="l" defTabSz="457200" rtl="0" eaLnBrk="1" latinLnBrk="0" hangingPunct="1">
+              <a:spcBef>
+                <a:spcPct val="20000"/>
+              </a:spcBef>
+              <a:spcAft>
+                <a:spcPts val="600"/>
+              </a:spcAft>
+              <a:buClr>
+                <a:schemeClr val="tx1"/>
+              </a:buClr>
+              <a:buSzPct val="80000"/>
+              <a:buFont typeface="Wingdings 3" panose="05040102010807070707" pitchFamily="18" charset="2"/>
+              <a:buChar char=""/>
+              <a:defRPr sz="1400" kern="1200" cap="none">
+                <a:solidFill>
+                  <a:schemeClr val="bg2">
+                    <a:lumMod val="75000"/>
+                  </a:schemeClr>
+                </a:solidFill>
+                <a:effectLst/>
+                <a:latin typeface="+mn-lt"/>
+                <a:ea typeface="+mn-ea"/>
+                <a:cs typeface="+mn-cs"/>
+              </a:defRPr>
+            </a:lvl4pPr>
+            <a:lvl5pPr marL="2000250" indent="-171450" algn="l" defTabSz="457200" rtl="0" eaLnBrk="1" latinLnBrk="0" hangingPunct="1">
+              <a:spcBef>
+                <a:spcPct val="20000"/>
+              </a:spcBef>
+              <a:spcAft>
+                <a:spcPts val="600"/>
+              </a:spcAft>
+              <a:buClr>
+                <a:schemeClr val="tx1"/>
+              </a:buClr>
+              <a:buSzPct val="80000"/>
+              <a:buFont typeface="Wingdings 3" panose="05040102010807070707" pitchFamily="18" charset="2"/>
+              <a:buChar char=""/>
+              <a:defRPr sz="1400" kern="1200" cap="none">
+                <a:solidFill>
+                  <a:schemeClr val="bg2">
+                    <a:lumMod val="75000"/>
+                  </a:schemeClr>
+                </a:solidFill>
+                <a:effectLst/>
+                <a:latin typeface="+mn-lt"/>
+                <a:ea typeface="+mn-ea"/>
+                <a:cs typeface="+mn-cs"/>
+              </a:defRPr>
+            </a:lvl5pPr>
+            <a:lvl6pPr marL="2514600" indent="-228600" algn="l" defTabSz="457200" rtl="0" eaLnBrk="1" latinLnBrk="0" hangingPunct="1">
+              <a:spcBef>
+                <a:spcPct val="20000"/>
+              </a:spcBef>
+              <a:spcAft>
+                <a:spcPts val="600"/>
+              </a:spcAft>
+              <a:buClr>
+                <a:schemeClr val="tx1"/>
+              </a:buClr>
+              <a:buSzPct val="80000"/>
+              <a:buFont typeface="Wingdings 3" panose="05040102010807070707" pitchFamily="18" charset="2"/>
+              <a:buChar char=""/>
+              <a:defRPr sz="1400" kern="1200" cap="none">
+                <a:solidFill>
+                  <a:schemeClr val="bg2">
+                    <a:lumMod val="75000"/>
+                  </a:schemeClr>
+                </a:solidFill>
+                <a:effectLst/>
+                <a:latin typeface="+mn-lt"/>
+                <a:ea typeface="+mn-ea"/>
+                <a:cs typeface="+mn-cs"/>
+              </a:defRPr>
+            </a:lvl6pPr>
+            <a:lvl7pPr marL="2971800" indent="-228600" algn="l" defTabSz="457200" rtl="0" eaLnBrk="1" latinLnBrk="0" hangingPunct="1">
+              <a:spcBef>
+                <a:spcPct val="20000"/>
+              </a:spcBef>
+              <a:spcAft>
+                <a:spcPts val="600"/>
+              </a:spcAft>
+              <a:buClr>
+                <a:schemeClr val="tx1"/>
+              </a:buClr>
+              <a:buSzPct val="80000"/>
+              <a:buFont typeface="Wingdings 3" panose="05040102010807070707" pitchFamily="18" charset="2"/>
+              <a:buChar char=""/>
+              <a:defRPr sz="1400" kern="1200" cap="none">
+                <a:solidFill>
+                  <a:schemeClr val="bg2">
+                    <a:lumMod val="75000"/>
+                  </a:schemeClr>
+                </a:solidFill>
+                <a:effectLst/>
+                <a:latin typeface="+mn-lt"/>
+                <a:ea typeface="+mn-ea"/>
+                <a:cs typeface="+mn-cs"/>
+              </a:defRPr>
+            </a:lvl7pPr>
+            <a:lvl8pPr marL="3429000" indent="-228600" algn="l" defTabSz="457200" rtl="0" eaLnBrk="1" latinLnBrk="0" hangingPunct="1">
+              <a:spcBef>
+                <a:spcPct val="20000"/>
+              </a:spcBef>
+              <a:spcAft>
+                <a:spcPts val="600"/>
+              </a:spcAft>
+              <a:buClr>
+                <a:schemeClr val="tx1"/>
+              </a:buClr>
+              <a:buSzPct val="80000"/>
+              <a:buFont typeface="Wingdings 3" panose="05040102010807070707" pitchFamily="18" charset="2"/>
+              <a:buChar char=""/>
+              <a:defRPr sz="1400" kern="1200" cap="none">
+                <a:solidFill>
+                  <a:schemeClr val="bg2">
+                    <a:lumMod val="75000"/>
+                  </a:schemeClr>
+                </a:solidFill>
+                <a:effectLst/>
+                <a:latin typeface="+mn-lt"/>
+                <a:ea typeface="+mn-ea"/>
+                <a:cs typeface="+mn-cs"/>
+              </a:defRPr>
+            </a:lvl8pPr>
+            <a:lvl9pPr marL="3886200" indent="-228600" algn="l" defTabSz="457200" rtl="0" eaLnBrk="1" latinLnBrk="0" hangingPunct="1">
+              <a:spcBef>
+                <a:spcPct val="20000"/>
+              </a:spcBef>
+              <a:spcAft>
+                <a:spcPts val="600"/>
+              </a:spcAft>
+              <a:buClr>
+                <a:schemeClr val="tx1"/>
+              </a:buClr>
+              <a:buSzPct val="80000"/>
+              <a:buFont typeface="Wingdings 3" panose="05040102010807070707" pitchFamily="18" charset="2"/>
+              <a:buChar char=""/>
+              <a:defRPr sz="1400" kern="1200" cap="none">
+                <a:solidFill>
+                  <a:schemeClr val="bg2">
+                    <a:lumMod val="75000"/>
+                  </a:schemeClr>
+                </a:solidFill>
+                <a:effectLst/>
+                <a:latin typeface="+mn-lt"/>
+                <a:ea typeface="+mn-ea"/>
+                <a:cs typeface="+mn-cs"/>
+              </a:defRPr>
+            </a:lvl9pPr>
+          </a:lstStyle>
+          <a:p>
+            <a:pPr marL="0" indent="0" defTabSz="914400" eaLnBrk="0" fontAlgn="base" hangingPunct="0">
+              <a:spcBef>
+                <a:spcPct val="0"/>
+              </a:spcBef>
+              <a:spcAft>
+                <a:spcPct val="0"/>
+              </a:spcAft>
+              <a:buClrTx/>
+              <a:buSzTx/>
+              <a:buFontTx/>
+              <a:buChar char="•"/>
+            </a:pPr>
+            <a:r>
+              <a:rPr lang="es-ES" altLang="es-ES" sz="1800" b="1">
+                <a:solidFill>
+                  <a:schemeClr val="tx1"/>
+                </a:solidFill>
+                <a:latin typeface="Arial" panose="020B0604020202020204" pitchFamily="34" charset="0"/>
+              </a:rPr>
+              <a:t>Insight:</a:t>
+            </a:r>
+            <a:r>
+              <a:rPr lang="es-ES" altLang="es-ES" sz="1800">
+                <a:solidFill>
+                  <a:schemeClr val="tx1"/>
+                </a:solidFill>
+                <a:latin typeface="Arial" panose="020B0604020202020204" pitchFamily="34" charset="0"/>
+              </a:rPr>
+              <a:t> </a:t>
+            </a:r>
+            <a:r>
+              <a:rPr lang="es-ES" altLang="es-ES" sz="1800" i="1">
+                <a:solidFill>
+                  <a:schemeClr val="tx1"/>
+                </a:solidFill>
+                <a:latin typeface="Arial" panose="020B0604020202020204" pitchFamily="34" charset="0"/>
+              </a:rPr>
+              <a:t>1997 fue el año pico, con más del triple de ventas respecto a 1996.</a:t>
+            </a:r>
+            <a:endParaRPr lang="es-ES" altLang="es-ES" sz="1800" dirty="0">
+              <a:solidFill>
+                <a:schemeClr val="tx1"/>
+              </a:solidFill>
+              <a:latin typeface="Arial" panose="020B0604020202020204" pitchFamily="34" charset="0"/>
+            </a:endParaRPr>
+          </a:p>
+        </p:txBody>
+      </p:sp>
+      <p:graphicFrame>
+        <p:nvGraphicFramePr>
+          <p:cNvPr id="8" name="Gráfico 7">
+            <a:extLst>
+              <a:ext uri="{FF2B5EF4-FFF2-40B4-BE49-F238E27FC236}">
+                <a16:creationId xmlns:a16="http://schemas.microsoft.com/office/drawing/2014/main" id="{CF88F972-4B56-CFB7-A4F9-9412AB1C6E14}"/>
+              </a:ext>
+            </a:extLst>
+          </p:cNvPr>
+          <p:cNvGraphicFramePr/>
+          <p:nvPr>
+            <p:extLst>
+              <p:ext uri="{D42A27DB-BD31-4B8C-83A1-F6EECF244321}">
+                <p14:modId xmlns:p14="http://schemas.microsoft.com/office/powerpoint/2010/main" val="285221071"/>
+              </p:ext>
+            </p:extLst>
+          </p:nvPr>
+        </p:nvGraphicFramePr>
+        <p:xfrm>
+          <a:off x="2032000" y="719666"/>
+          <a:ext cx="8128000" cy="5418667"/>
+        </p:xfrm>
+        <a:graphic>
+          <a:graphicData uri="http://schemas.openxmlformats.org/drawingml/2006/chart">
+            <c:chart xmlns:c="http://schemas.openxmlformats.org/drawingml/2006/chart" xmlns:r="http://schemas.openxmlformats.org/officeDocument/2006/relationships" r:id="rId2"/>
+          </a:graphicData>
+        </a:graphic>
+      </p:graphicFrame>
+    </p:spTree>
+    <p:extLst>
+      <p:ext uri="{BB962C8B-B14F-4D97-AF65-F5344CB8AC3E}">
+        <p14:creationId xmlns:p14="http://schemas.microsoft.com/office/powerpoint/2010/main" val="2640548449"/>
       </p:ext>
     </p:extLst>
   </p:cSld>

</xml_diff>

<commit_message>
Agrego analisis rapido en PowerPoint de Northwind
</commit_message>
<xml_diff>
--- a/Northwind traders.pptx
+++ b/Northwind traders.pptx
@@ -9,6 +9,8 @@
     <p:sldId id="257" r:id="rId3"/>
     <p:sldId id="258" r:id="rId4"/>
     <p:sldId id="259" r:id="rId5"/>
+    <p:sldId id="260" r:id="rId6"/>
+    <p:sldId id="261" r:id="rId7"/>
   </p:sldIdLst>
   <p:sldSz cx="12192000" cy="6858000"/>
   <p:notesSz cx="6858000" cy="9144000"/>
@@ -452,10 +454,7 @@
             <a:pPr>
               <a:defRPr sz="1197" b="0" i="0" u="none" strike="noStrike" kern="1200" baseline="0">
                 <a:solidFill>
-                  <a:schemeClr val="dk1">
-                    <a:lumMod val="75000"/>
-                    <a:lumOff val="25000"/>
-                  </a:schemeClr>
+                  <a:schemeClr val="tx1"/>
                 </a:solidFill>
                 <a:latin typeface="+mn-lt"/>
                 <a:ea typeface="+mn-ea"/>
@@ -995,9 +994,7 @@
                 <a:pPr>
                   <a:defRPr sz="1197" b="0" i="0" u="none" strike="noStrike" kern="1200" baseline="0">
                     <a:solidFill>
-                      <a:schemeClr val="lt1">
-                        <a:lumMod val="85000"/>
-                      </a:schemeClr>
+                      <a:schemeClr val="tx1"/>
                     </a:solidFill>
                     <a:latin typeface="+mn-lt"/>
                     <a:ea typeface="+mn-ea"/>
@@ -1144,9 +1141,7 @@
             <a:pPr>
               <a:defRPr sz="1197" b="0" i="0" u="none" strike="noStrike" kern="1200" baseline="0">
                 <a:solidFill>
-                  <a:schemeClr val="lt1">
-                    <a:lumMod val="85000"/>
-                  </a:schemeClr>
+                  <a:schemeClr val="tx1"/>
                 </a:solidFill>
                 <a:latin typeface="+mn-lt"/>
                 <a:ea typeface="+mn-ea"/>
@@ -1277,6 +1272,32 @@
   </mc:AlternateContent>
   <c:chart>
     <c:title>
+      <c:tx>
+        <c:rich>
+          <a:bodyPr rot="0" spcFirstLastPara="1" vertOverflow="ellipsis" vert="horz" wrap="square" anchor="ctr" anchorCtr="1"/>
+          <a:lstStyle/>
+          <a:p>
+            <a:pPr>
+              <a:defRPr sz="1862" b="0" i="0" u="none" strike="noStrike" kern="1200" spc="0" baseline="0">
+                <a:solidFill>
+                  <a:schemeClr val="tx1">
+                    <a:lumMod val="65000"/>
+                    <a:lumOff val="35000"/>
+                  </a:schemeClr>
+                </a:solidFill>
+                <a:latin typeface="+mn-lt"/>
+                <a:ea typeface="+mn-ea"/>
+                <a:cs typeface="+mn-cs"/>
+              </a:defRPr>
+            </a:pPr>
+            <a:r>
+              <a:rPr lang="es-ES" sz="1862" b="0" i="0" u="none" strike="noStrike" baseline="0" dirty="0"/>
+              <a:t>Ventas por Año</a:t>
+            </a:r>
+            <a:endParaRPr lang="en-US" dirty="0"/>
+          </a:p>
+        </c:rich>
+      </c:tx>
       <c:overlay val="0"/>
       <c:spPr>
         <a:noFill/>
@@ -1308,7 +1329,17 @@
     </c:title>
     <c:autoTitleDeleted val="0"/>
     <c:plotArea>
-      <c:layout/>
+      <c:layout>
+        <c:manualLayout>
+          <c:layoutTarget val="inner"/>
+          <c:xMode val="edge"/>
+          <c:yMode val="edge"/>
+          <c:x val="8.1742495078740152E-2"/>
+          <c:y val="0.10303124366195597"/>
+          <c:w val="0.89325750492125988"/>
+          <c:h val="0.83014844794854525"/>
+        </c:manualLayout>
+      </c:layout>
       <c:barChart>
         <c:barDir val="col"/>
         <c:grouping val="clustered"/>
@@ -1329,7 +1360,9 @@
           </c:tx>
           <c:spPr>
             <a:solidFill>
-              <a:schemeClr val="accent1"/>
+              <a:schemeClr val="accent3">
+                <a:lumMod val="75000"/>
+              </a:schemeClr>
             </a:solidFill>
             <a:ln>
               <a:noFill/>
@@ -1500,15 +1533,64 @@
         <c:crossBetween val="between"/>
       </c:valAx>
       <c:spPr>
-        <a:noFill/>
+        <a:solidFill>
+          <a:schemeClr val="accent1"/>
+        </a:solidFill>
         <a:ln>
           <a:noFill/>
         </a:ln>
         <a:effectLst/>
       </c:spPr>
     </c:plotArea>
-    <c:legend>
-      <c:legendPos val="b"/>
+    <c:plotVisOnly val="1"/>
+    <c:dispBlanksAs val="gap"/>
+    <c:showDLblsOverMax val="0"/>
+    <c:extLst>
+      <c:ext xmlns:c16r3="http://schemas.microsoft.com/office/drawing/2017/03/chart" uri="{56B9EC1D-385E-4148-901F-78D8002777C0}">
+        <c16r3:dataDisplayOptions16>
+          <c16r3:dispNaAsBlank val="1"/>
+        </c16r3:dataDisplayOptions16>
+      </c:ext>
+    </c:extLst>
+  </c:chart>
+  <c:spPr>
+    <a:noFill/>
+    <a:ln>
+      <a:noFill/>
+    </a:ln>
+    <a:effectLst/>
+  </c:spPr>
+  <c:txPr>
+    <a:bodyPr/>
+    <a:lstStyle/>
+    <a:p>
+      <a:pPr>
+        <a:defRPr/>
+      </a:pPr>
+      <a:endParaRPr lang="es-ES"/>
+    </a:p>
+  </c:txPr>
+  <c:externalData r:id="rId3">
+    <c:autoUpdate val="0"/>
+  </c:externalData>
+</c:chartSpace>
+</file>
+
+<file path=ppt/charts/chart5.xml><?xml version="1.0" encoding="utf-8"?>
+<c:chartSpace xmlns:c="http://schemas.openxmlformats.org/drawingml/2006/chart" xmlns:a="http://schemas.openxmlformats.org/drawingml/2006/main" xmlns:r="http://schemas.openxmlformats.org/officeDocument/2006/relationships" xmlns:c16r2="http://schemas.microsoft.com/office/drawing/2015/06/chart">
+  <c:date1904 val="0"/>
+  <c:lang val="es-ES"/>
+  <c:roundedCorners val="0"/>
+  <mc:AlternateContent xmlns:mc="http://schemas.openxmlformats.org/markup-compatibility/2006">
+    <mc:Choice xmlns:c14="http://schemas.microsoft.com/office/drawing/2007/8/2/chart" Requires="c14">
+      <c14:style val="102"/>
+    </mc:Choice>
+    <mc:Fallback>
+      <c:style val="2"/>
+    </mc:Fallback>
+  </mc:AlternateContent>
+  <c:chart>
+    <c:title>
       <c:overlay val="0"/>
       <c:spPr>
         <a:noFill/>
@@ -1522,7 +1604,7 @@
         <a:lstStyle/>
         <a:p>
           <a:pPr>
-            <a:defRPr sz="1197" b="0" i="0" u="none" strike="noStrike" kern="1200" baseline="0">
+            <a:defRPr sz="1862" b="0" i="0" u="none" strike="noStrike" kern="1200" spc="0" baseline="0">
               <a:solidFill>
                 <a:schemeClr val="tx1">
                   <a:lumMod val="65000"/>
@@ -1537,7 +1619,244 @@
           <a:endParaRPr lang="es-ES"/>
         </a:p>
       </c:txPr>
-    </c:legend>
+    </c:title>
+    <c:autoTitleDeleted val="0"/>
+    <c:plotArea>
+      <c:layout/>
+      <c:barChart>
+        <c:barDir val="bar"/>
+        <c:grouping val="clustered"/>
+        <c:varyColors val="0"/>
+        <c:ser>
+          <c:idx val="0"/>
+          <c:order val="0"/>
+          <c:tx>
+            <c:strRef>
+              <c:f>Hoja1!$B$1</c:f>
+              <c:strCache>
+                <c:ptCount val="1"/>
+                <c:pt idx="0">
+                  <c:v>Top 10 Clientes de las ventas totales</c:v>
+                </c:pt>
+              </c:strCache>
+            </c:strRef>
+          </c:tx>
+          <c:spPr>
+            <a:solidFill>
+              <a:schemeClr val="accent3">
+                <a:lumMod val="75000"/>
+              </a:schemeClr>
+            </a:solidFill>
+            <a:ln>
+              <a:noFill/>
+            </a:ln>
+            <a:effectLst/>
+          </c:spPr>
+          <c:invertIfNegative val="0"/>
+          <c:cat>
+            <c:strRef>
+              <c:f>Hoja1!$A$2:$A$10</c:f>
+              <c:strCache>
+                <c:ptCount val="9"/>
+                <c:pt idx="0">
+                  <c:v>QUICK-Stop</c:v>
+                </c:pt>
+                <c:pt idx="1">
+                  <c:v>Save-a-lot Markets</c:v>
+                </c:pt>
+                <c:pt idx="2">
+                  <c:v>Ernst Handel</c:v>
+                </c:pt>
+                <c:pt idx="3">
+                  <c:v>Hungry Owl All-Night Grocers</c:v>
+                </c:pt>
+                <c:pt idx="4">
+                  <c:v>Rattlesnake Canyon Grocery</c:v>
+                </c:pt>
+                <c:pt idx="5">
+                  <c:v>Hanari Carnes</c:v>
+                </c:pt>
+                <c:pt idx="6">
+                  <c:v>Königlich Essen</c:v>
+                </c:pt>
+                <c:pt idx="7">
+                  <c:v>Folk och fä HB</c:v>
+                </c:pt>
+                <c:pt idx="8">
+                  <c:v>Mère Paillarde</c:v>
+                </c:pt>
+              </c:strCache>
+            </c:strRef>
+          </c:cat>
+          <c:val>
+            <c:numRef>
+              <c:f>Hoja1!$B$2:$B$10</c:f>
+              <c:numCache>
+                <c:formatCode>General</c:formatCode>
+                <c:ptCount val="9"/>
+                <c:pt idx="0">
+                  <c:v>110277.3</c:v>
+                </c:pt>
+                <c:pt idx="1">
+                  <c:v>104361.94</c:v>
+                </c:pt>
+                <c:pt idx="2">
+                  <c:v>94976.07</c:v>
+                </c:pt>
+                <c:pt idx="3">
+                  <c:v>49979.9</c:v>
+                </c:pt>
+                <c:pt idx="4">
+                  <c:v>49842.07</c:v>
+                </c:pt>
+                <c:pt idx="5">
+                  <c:v>32841.360000000001</c:v>
+                </c:pt>
+                <c:pt idx="6">
+                  <c:v>30908.38</c:v>
+                </c:pt>
+                <c:pt idx="7">
+                  <c:v>29567.56</c:v>
+                </c:pt>
+                <c:pt idx="8">
+                  <c:v>28872.19</c:v>
+                </c:pt>
+              </c:numCache>
+            </c:numRef>
+          </c:val>
+          <c:extLst>
+            <c:ext xmlns:c16="http://schemas.microsoft.com/office/drawing/2014/chart" uri="{C3380CC4-5D6E-409C-BE32-E72D297353CC}">
+              <c16:uniqueId val="{00000000-FFDE-4877-93BF-2B17725FC95F}"/>
+            </c:ext>
+          </c:extLst>
+        </c:ser>
+        <c:dLbls>
+          <c:showLegendKey val="0"/>
+          <c:showVal val="0"/>
+          <c:showCatName val="0"/>
+          <c:showSerName val="0"/>
+          <c:showPercent val="0"/>
+          <c:showBubbleSize val="0"/>
+        </c:dLbls>
+        <c:gapWidth val="182"/>
+        <c:axId val="1323725919"/>
+        <c:axId val="1323700959"/>
+      </c:barChart>
+      <c:catAx>
+        <c:axId val="1323725919"/>
+        <c:scaling>
+          <c:orientation val="minMax"/>
+        </c:scaling>
+        <c:delete val="0"/>
+        <c:axPos val="l"/>
+        <c:numFmt formatCode="General" sourceLinked="1"/>
+        <c:majorTickMark val="none"/>
+        <c:minorTickMark val="none"/>
+        <c:tickLblPos val="nextTo"/>
+        <c:spPr>
+          <a:noFill/>
+          <a:ln w="9525" cap="flat" cmpd="sng" algn="ctr">
+            <a:solidFill>
+              <a:schemeClr val="tx1">
+                <a:lumMod val="15000"/>
+                <a:lumOff val="85000"/>
+              </a:schemeClr>
+            </a:solidFill>
+            <a:round/>
+          </a:ln>
+          <a:effectLst/>
+        </c:spPr>
+        <c:txPr>
+          <a:bodyPr rot="-60000000" spcFirstLastPara="1" vertOverflow="ellipsis" vert="horz" wrap="square" anchor="ctr" anchorCtr="1"/>
+          <a:lstStyle/>
+          <a:p>
+            <a:pPr>
+              <a:defRPr sz="1197" b="0" i="0" u="none" strike="noStrike" kern="1200" baseline="0">
+                <a:solidFill>
+                  <a:schemeClr val="tx1">
+                    <a:lumMod val="65000"/>
+                    <a:lumOff val="35000"/>
+                  </a:schemeClr>
+                </a:solidFill>
+                <a:latin typeface="+mn-lt"/>
+                <a:ea typeface="+mn-ea"/>
+                <a:cs typeface="+mn-cs"/>
+              </a:defRPr>
+            </a:pPr>
+            <a:endParaRPr lang="es-ES"/>
+          </a:p>
+        </c:txPr>
+        <c:crossAx val="1323700959"/>
+        <c:crosses val="autoZero"/>
+        <c:auto val="1"/>
+        <c:lblAlgn val="ctr"/>
+        <c:lblOffset val="100"/>
+        <c:noMultiLvlLbl val="0"/>
+      </c:catAx>
+      <c:valAx>
+        <c:axId val="1323700959"/>
+        <c:scaling>
+          <c:orientation val="minMax"/>
+        </c:scaling>
+        <c:delete val="0"/>
+        <c:axPos val="b"/>
+        <c:majorGridlines>
+          <c:spPr>
+            <a:ln w="9525" cap="flat" cmpd="sng" algn="ctr">
+              <a:solidFill>
+                <a:schemeClr val="tx1">
+                  <a:lumMod val="15000"/>
+                  <a:lumOff val="85000"/>
+                </a:schemeClr>
+              </a:solidFill>
+              <a:round/>
+            </a:ln>
+            <a:effectLst/>
+          </c:spPr>
+        </c:majorGridlines>
+        <c:numFmt formatCode="General" sourceLinked="1"/>
+        <c:majorTickMark val="none"/>
+        <c:minorTickMark val="none"/>
+        <c:tickLblPos val="nextTo"/>
+        <c:spPr>
+          <a:noFill/>
+          <a:ln>
+            <a:noFill/>
+          </a:ln>
+          <a:effectLst/>
+        </c:spPr>
+        <c:txPr>
+          <a:bodyPr rot="-60000000" spcFirstLastPara="1" vertOverflow="ellipsis" vert="horz" wrap="square" anchor="ctr" anchorCtr="1"/>
+          <a:lstStyle/>
+          <a:p>
+            <a:pPr>
+              <a:defRPr sz="1197" b="0" i="0" u="none" strike="noStrike" kern="1200" baseline="0">
+                <a:solidFill>
+                  <a:schemeClr val="tx1">
+                    <a:lumMod val="65000"/>
+                    <a:lumOff val="35000"/>
+                  </a:schemeClr>
+                </a:solidFill>
+                <a:latin typeface="+mn-lt"/>
+                <a:ea typeface="+mn-ea"/>
+                <a:cs typeface="+mn-cs"/>
+              </a:defRPr>
+            </a:pPr>
+            <a:endParaRPr lang="es-ES"/>
+          </a:p>
+        </c:txPr>
+        <c:crossAx val="1323725919"/>
+        <c:crosses val="autoZero"/>
+        <c:crossBetween val="between"/>
+      </c:valAx>
+      <c:spPr>
+        <a:noFill/>
+        <a:ln>
+          <a:noFill/>
+        </a:ln>
+        <a:effectLst/>
+      </c:spPr>
+    </c:plotArea>
     <c:plotVisOnly val="1"/>
     <c:dispBlanksAs val="gap"/>
     <c:showDLblsOverMax val="0"/>
@@ -1550,7 +1869,719 @@
     </c:extLst>
   </c:chart>
   <c:spPr>
-    <a:noFill/>
+    <a:solidFill>
+      <a:schemeClr val="accent1"/>
+    </a:solidFill>
+    <a:ln>
+      <a:noFill/>
+    </a:ln>
+    <a:effectLst/>
+  </c:spPr>
+  <c:txPr>
+    <a:bodyPr/>
+    <a:lstStyle/>
+    <a:p>
+      <a:pPr>
+        <a:defRPr/>
+      </a:pPr>
+      <a:endParaRPr lang="es-ES"/>
+    </a:p>
+  </c:txPr>
+  <c:externalData r:id="rId3">
+    <c:autoUpdate val="0"/>
+  </c:externalData>
+</c:chartSpace>
+</file>
+
+<file path=ppt/charts/chart6.xml><?xml version="1.0" encoding="utf-8"?>
+<c:chartSpace xmlns:c="http://schemas.openxmlformats.org/drawingml/2006/chart" xmlns:a="http://schemas.openxmlformats.org/drawingml/2006/main" xmlns:r="http://schemas.openxmlformats.org/officeDocument/2006/relationships" xmlns:c16r2="http://schemas.microsoft.com/office/drawing/2015/06/chart">
+  <c:date1904 val="0"/>
+  <c:lang val="es-ES"/>
+  <c:roundedCorners val="0"/>
+  <mc:AlternateContent xmlns:mc="http://schemas.openxmlformats.org/markup-compatibility/2006">
+    <mc:Choice xmlns:c14="http://schemas.microsoft.com/office/drawing/2007/8/2/chart" Requires="c14">
+      <c14:style val="102"/>
+    </mc:Choice>
+    <mc:Fallback>
+      <c:style val="2"/>
+    </mc:Fallback>
+  </mc:AlternateContent>
+  <c:chart>
+    <c:title>
+      <c:tx>
+        <c:rich>
+          <a:bodyPr rot="0" spcFirstLastPara="1" vertOverflow="ellipsis" vert="horz" wrap="square" anchor="ctr" anchorCtr="1"/>
+          <a:lstStyle/>
+          <a:p>
+            <a:pPr>
+              <a:defRPr sz="1862" b="0" i="0" u="none" strike="noStrike" kern="1200" spc="0" baseline="0">
+                <a:solidFill>
+                  <a:schemeClr val="tx1">
+                    <a:lumMod val="65000"/>
+                    <a:lumOff val="35000"/>
+                  </a:schemeClr>
+                </a:solidFill>
+                <a:latin typeface="+mn-lt"/>
+                <a:ea typeface="+mn-ea"/>
+                <a:cs typeface="+mn-cs"/>
+              </a:defRPr>
+            </a:pPr>
+            <a:r>
+              <a:rPr lang="en-US" dirty="0"/>
+              <a:t>Top 10 </a:t>
+            </a:r>
+            <a:r>
+              <a:rPr lang="en-US" dirty="0" err="1"/>
+              <a:t>productos</a:t>
+            </a:r>
+            <a:r>
+              <a:rPr lang="en-US" baseline="0" dirty="0"/>
+              <a:t> de las </a:t>
+            </a:r>
+            <a:r>
+              <a:rPr lang="en-US" baseline="0" dirty="0" err="1"/>
+              <a:t>ventas</a:t>
+            </a:r>
+            <a:r>
+              <a:rPr lang="en-US" baseline="0" dirty="0"/>
+              <a:t> </a:t>
+            </a:r>
+            <a:r>
+              <a:rPr lang="en-US" baseline="0" dirty="0" err="1"/>
+              <a:t>totales</a:t>
+            </a:r>
+            <a:endParaRPr lang="en-US" dirty="0"/>
+          </a:p>
+        </c:rich>
+      </c:tx>
+      <c:layout>
+        <c:manualLayout>
+          <c:xMode val="edge"/>
+          <c:yMode val="edge"/>
+          <c:x val="0.12971954381648973"/>
+          <c:y val="2.0089871857200559E-2"/>
+        </c:manualLayout>
+      </c:layout>
+      <c:overlay val="0"/>
+      <c:spPr>
+        <a:noFill/>
+        <a:ln>
+          <a:noFill/>
+        </a:ln>
+        <a:effectLst/>
+      </c:spPr>
+      <c:txPr>
+        <a:bodyPr rot="0" spcFirstLastPara="1" vertOverflow="ellipsis" vert="horz" wrap="square" anchor="ctr" anchorCtr="1"/>
+        <a:lstStyle/>
+        <a:p>
+          <a:pPr>
+            <a:defRPr sz="1862" b="0" i="0" u="none" strike="noStrike" kern="1200" spc="0" baseline="0">
+              <a:solidFill>
+                <a:schemeClr val="tx1">
+                  <a:lumMod val="65000"/>
+                  <a:lumOff val="35000"/>
+                </a:schemeClr>
+              </a:solidFill>
+              <a:latin typeface="+mn-lt"/>
+              <a:ea typeface="+mn-ea"/>
+              <a:cs typeface="+mn-cs"/>
+            </a:defRPr>
+          </a:pPr>
+          <a:endParaRPr lang="es-ES"/>
+        </a:p>
+      </c:txPr>
+    </c:title>
+    <c:autoTitleDeleted val="0"/>
+    <c:plotArea>
+      <c:layout/>
+      <c:barChart>
+        <c:barDir val="bar"/>
+        <c:grouping val="clustered"/>
+        <c:varyColors val="0"/>
+        <c:ser>
+          <c:idx val="0"/>
+          <c:order val="0"/>
+          <c:tx>
+            <c:strRef>
+              <c:f>Hoja1!$B$1</c:f>
+              <c:strCache>
+                <c:ptCount val="1"/>
+                <c:pt idx="0">
+                  <c:v>Serie 1</c:v>
+                </c:pt>
+              </c:strCache>
+            </c:strRef>
+          </c:tx>
+          <c:spPr>
+            <a:solidFill>
+              <a:schemeClr val="accent3">
+                <a:lumMod val="75000"/>
+              </a:schemeClr>
+            </a:solidFill>
+            <a:ln>
+              <a:noFill/>
+            </a:ln>
+            <a:effectLst/>
+          </c:spPr>
+          <c:invertIfNegative val="0"/>
+          <c:cat>
+            <c:strRef>
+              <c:f>Hoja1!$A$2:$A$10</c:f>
+              <c:strCache>
+                <c:ptCount val="9"/>
+                <c:pt idx="0">
+                  <c:v>Côte de Blaye</c:v>
+                </c:pt>
+                <c:pt idx="1">
+                  <c:v>Thüringer Rostbratwurst</c:v>
+                </c:pt>
+                <c:pt idx="2">
+                  <c:v>Raclette Courdavault</c:v>
+                </c:pt>
+                <c:pt idx="3">
+                  <c:v>Tarte au sucre</c:v>
+                </c:pt>
+                <c:pt idx="4">
+                  <c:v>Camembert Pierrot</c:v>
+                </c:pt>
+                <c:pt idx="5">
+                  <c:v>Gnocchi di nonna Alice</c:v>
+                </c:pt>
+                <c:pt idx="6">
+                  <c:v>Manjimup Dried Apples</c:v>
+                </c:pt>
+                <c:pt idx="7">
+                  <c:v>Alice Mutton</c:v>
+                </c:pt>
+                <c:pt idx="8">
+                  <c:v>Carnarvon Tigers</c:v>
+                </c:pt>
+              </c:strCache>
+            </c:strRef>
+          </c:cat>
+          <c:val>
+            <c:numRef>
+              <c:f>Hoja1!$B$2:$B$10</c:f>
+              <c:numCache>
+                <c:formatCode>General</c:formatCode>
+                <c:ptCount val="9"/>
+                <c:pt idx="0">
+                  <c:v>141396.73000000001</c:v>
+                </c:pt>
+                <c:pt idx="1">
+                  <c:v>80368.67</c:v>
+                </c:pt>
+                <c:pt idx="2">
+                  <c:v>71155.7</c:v>
+                </c:pt>
+                <c:pt idx="3">
+                  <c:v>47234.96</c:v>
+                </c:pt>
+                <c:pt idx="4">
+                  <c:v>46825.48</c:v>
+                </c:pt>
+                <c:pt idx="5">
+                  <c:v>42593.06</c:v>
+                </c:pt>
+                <c:pt idx="6">
+                  <c:v>41819.65</c:v>
+                </c:pt>
+                <c:pt idx="7">
+                  <c:v>32698.37</c:v>
+                </c:pt>
+                <c:pt idx="8">
+                  <c:v>29171.87</c:v>
+                </c:pt>
+              </c:numCache>
+            </c:numRef>
+          </c:val>
+          <c:extLst>
+            <c:ext xmlns:c16="http://schemas.microsoft.com/office/drawing/2014/chart" uri="{C3380CC4-5D6E-409C-BE32-E72D297353CC}">
+              <c16:uniqueId val="{00000000-D72F-4A46-8211-2CFAC06E065F}"/>
+            </c:ext>
+          </c:extLst>
+        </c:ser>
+        <c:dLbls>
+          <c:showLegendKey val="0"/>
+          <c:showVal val="0"/>
+          <c:showCatName val="0"/>
+          <c:showSerName val="0"/>
+          <c:showPercent val="0"/>
+          <c:showBubbleSize val="0"/>
+        </c:dLbls>
+        <c:gapWidth val="182"/>
+        <c:axId val="1500626895"/>
+        <c:axId val="1500628335"/>
+      </c:barChart>
+      <c:catAx>
+        <c:axId val="1500626895"/>
+        <c:scaling>
+          <c:orientation val="minMax"/>
+        </c:scaling>
+        <c:delete val="0"/>
+        <c:axPos val="l"/>
+        <c:numFmt formatCode="General" sourceLinked="1"/>
+        <c:majorTickMark val="none"/>
+        <c:minorTickMark val="none"/>
+        <c:tickLblPos val="nextTo"/>
+        <c:spPr>
+          <a:noFill/>
+          <a:ln w="9525" cap="flat" cmpd="sng" algn="ctr">
+            <a:solidFill>
+              <a:schemeClr val="tx1">
+                <a:lumMod val="15000"/>
+                <a:lumOff val="85000"/>
+              </a:schemeClr>
+            </a:solidFill>
+            <a:round/>
+          </a:ln>
+          <a:effectLst/>
+        </c:spPr>
+        <c:txPr>
+          <a:bodyPr rot="-60000000" spcFirstLastPara="1" vertOverflow="ellipsis" vert="horz" wrap="square" anchor="ctr" anchorCtr="1"/>
+          <a:lstStyle/>
+          <a:p>
+            <a:pPr>
+              <a:defRPr sz="1197" b="0" i="0" u="none" strike="noStrike" kern="1200" baseline="0">
+                <a:solidFill>
+                  <a:schemeClr val="tx1">
+                    <a:lumMod val="65000"/>
+                    <a:lumOff val="35000"/>
+                  </a:schemeClr>
+                </a:solidFill>
+                <a:latin typeface="+mn-lt"/>
+                <a:ea typeface="+mn-ea"/>
+                <a:cs typeface="+mn-cs"/>
+              </a:defRPr>
+            </a:pPr>
+            <a:endParaRPr lang="es-ES"/>
+          </a:p>
+        </c:txPr>
+        <c:crossAx val="1500628335"/>
+        <c:crosses val="autoZero"/>
+        <c:auto val="1"/>
+        <c:lblAlgn val="ctr"/>
+        <c:lblOffset val="100"/>
+        <c:noMultiLvlLbl val="0"/>
+      </c:catAx>
+      <c:valAx>
+        <c:axId val="1500628335"/>
+        <c:scaling>
+          <c:orientation val="minMax"/>
+        </c:scaling>
+        <c:delete val="0"/>
+        <c:axPos val="b"/>
+        <c:majorGridlines>
+          <c:spPr>
+            <a:ln w="9525" cap="flat" cmpd="sng" algn="ctr">
+              <a:solidFill>
+                <a:schemeClr val="tx1">
+                  <a:lumMod val="15000"/>
+                  <a:lumOff val="85000"/>
+                </a:schemeClr>
+              </a:solidFill>
+              <a:round/>
+            </a:ln>
+            <a:effectLst/>
+          </c:spPr>
+        </c:majorGridlines>
+        <c:numFmt formatCode="General" sourceLinked="1"/>
+        <c:majorTickMark val="none"/>
+        <c:minorTickMark val="none"/>
+        <c:tickLblPos val="nextTo"/>
+        <c:spPr>
+          <a:noFill/>
+          <a:ln>
+            <a:noFill/>
+          </a:ln>
+          <a:effectLst/>
+        </c:spPr>
+        <c:txPr>
+          <a:bodyPr rot="-60000000" spcFirstLastPara="1" vertOverflow="ellipsis" vert="horz" wrap="square" anchor="ctr" anchorCtr="1"/>
+          <a:lstStyle/>
+          <a:p>
+            <a:pPr>
+              <a:defRPr sz="1197" b="0" i="0" u="none" strike="noStrike" kern="1200" baseline="0">
+                <a:solidFill>
+                  <a:schemeClr val="tx1">
+                    <a:lumMod val="65000"/>
+                    <a:lumOff val="35000"/>
+                  </a:schemeClr>
+                </a:solidFill>
+                <a:latin typeface="+mn-lt"/>
+                <a:ea typeface="+mn-ea"/>
+                <a:cs typeface="+mn-cs"/>
+              </a:defRPr>
+            </a:pPr>
+            <a:endParaRPr lang="es-ES"/>
+          </a:p>
+        </c:txPr>
+        <c:crossAx val="1500626895"/>
+        <c:crosses val="autoZero"/>
+        <c:crossBetween val="between"/>
+      </c:valAx>
+      <c:spPr>
+        <a:noFill/>
+        <a:ln>
+          <a:noFill/>
+        </a:ln>
+        <a:effectLst/>
+      </c:spPr>
+    </c:plotArea>
+    <c:plotVisOnly val="1"/>
+    <c:dispBlanksAs val="gap"/>
+    <c:showDLblsOverMax val="0"/>
+    <c:extLst>
+      <c:ext xmlns:c16r3="http://schemas.microsoft.com/office/drawing/2017/03/chart" uri="{56B9EC1D-385E-4148-901F-78D8002777C0}">
+        <c16r3:dataDisplayOptions16>
+          <c16r3:dispNaAsBlank val="1"/>
+        </c16r3:dataDisplayOptions16>
+      </c:ext>
+    </c:extLst>
+  </c:chart>
+  <c:spPr>
+    <a:solidFill>
+      <a:schemeClr val="accent1"/>
+    </a:solidFill>
+    <a:ln>
+      <a:noFill/>
+    </a:ln>
+    <a:effectLst/>
+  </c:spPr>
+  <c:txPr>
+    <a:bodyPr/>
+    <a:lstStyle/>
+    <a:p>
+      <a:pPr>
+        <a:defRPr/>
+      </a:pPr>
+      <a:endParaRPr lang="es-ES"/>
+    </a:p>
+  </c:txPr>
+  <c:externalData r:id="rId3">
+    <c:autoUpdate val="0"/>
+  </c:externalData>
+</c:chartSpace>
+</file>
+
+<file path=ppt/charts/chart7.xml><?xml version="1.0" encoding="utf-8"?>
+<c:chartSpace xmlns:c="http://schemas.openxmlformats.org/drawingml/2006/chart" xmlns:a="http://schemas.openxmlformats.org/drawingml/2006/main" xmlns:r="http://schemas.openxmlformats.org/officeDocument/2006/relationships" xmlns:c16r2="http://schemas.microsoft.com/office/drawing/2015/06/chart">
+  <c:date1904 val="0"/>
+  <c:lang val="es-ES"/>
+  <c:roundedCorners val="0"/>
+  <mc:AlternateContent xmlns:mc="http://schemas.openxmlformats.org/markup-compatibility/2006">
+    <mc:Choice xmlns:c14="http://schemas.microsoft.com/office/drawing/2007/8/2/chart" Requires="c14">
+      <c14:style val="102"/>
+    </mc:Choice>
+    <mc:Fallback>
+      <c:style val="2"/>
+    </mc:Fallback>
+  </mc:AlternateContent>
+  <c:chart>
+    <c:title>
+      <c:tx>
+        <c:rich>
+          <a:bodyPr rot="0" spcFirstLastPara="1" vertOverflow="ellipsis" vert="horz" wrap="square" anchor="ctr" anchorCtr="1"/>
+          <a:lstStyle/>
+          <a:p>
+            <a:pPr>
+              <a:defRPr sz="1862" b="0" i="0" u="none" strike="noStrike" kern="1200" spc="0" baseline="0">
+                <a:solidFill>
+                  <a:schemeClr val="tx1">
+                    <a:lumMod val="65000"/>
+                    <a:lumOff val="35000"/>
+                  </a:schemeClr>
+                </a:solidFill>
+                <a:latin typeface="+mn-lt"/>
+                <a:ea typeface="+mn-ea"/>
+                <a:cs typeface="+mn-cs"/>
+              </a:defRPr>
+            </a:pPr>
+            <a:r>
+              <a:rPr lang="en-US" dirty="0"/>
+              <a:t>Total </a:t>
+            </a:r>
+            <a:r>
+              <a:rPr lang="en-US" dirty="0" err="1"/>
+              <a:t>descuentos</a:t>
+            </a:r>
+            <a:r>
+              <a:rPr lang="en-US" dirty="0"/>
+              <a:t> </a:t>
+            </a:r>
+            <a:r>
+              <a:rPr lang="en-US" dirty="0" err="1"/>
+              <a:t>aplicados</a:t>
+            </a:r>
+            <a:r>
+              <a:rPr lang="en-US" dirty="0"/>
+              <a:t> </a:t>
+            </a:r>
+            <a:r>
+              <a:rPr lang="en-US" dirty="0" err="1"/>
+              <a:t>por</a:t>
+            </a:r>
+            <a:r>
+              <a:rPr lang="en-US" dirty="0"/>
+              <a:t> </a:t>
+            </a:r>
+            <a:r>
+              <a:rPr lang="en-US" dirty="0" err="1"/>
+              <a:t>año</a:t>
+            </a:r>
+            <a:endParaRPr lang="en-US" dirty="0"/>
+          </a:p>
+        </c:rich>
+      </c:tx>
+      <c:overlay val="0"/>
+      <c:spPr>
+        <a:noFill/>
+        <a:ln>
+          <a:noFill/>
+        </a:ln>
+        <a:effectLst/>
+      </c:spPr>
+      <c:txPr>
+        <a:bodyPr rot="0" spcFirstLastPara="1" vertOverflow="ellipsis" vert="horz" wrap="square" anchor="ctr" anchorCtr="1"/>
+        <a:lstStyle/>
+        <a:p>
+          <a:pPr>
+            <a:defRPr sz="1862" b="0" i="0" u="none" strike="noStrike" kern="1200" spc="0" baseline="0">
+              <a:solidFill>
+                <a:schemeClr val="tx1">
+                  <a:lumMod val="65000"/>
+                  <a:lumOff val="35000"/>
+                </a:schemeClr>
+              </a:solidFill>
+              <a:latin typeface="+mn-lt"/>
+              <a:ea typeface="+mn-ea"/>
+              <a:cs typeface="+mn-cs"/>
+            </a:defRPr>
+          </a:pPr>
+          <a:endParaRPr lang="es-ES"/>
+        </a:p>
+      </c:txPr>
+    </c:title>
+    <c:autoTitleDeleted val="0"/>
+    <c:plotArea>
+      <c:layout/>
+      <c:lineChart>
+        <c:grouping val="standard"/>
+        <c:varyColors val="0"/>
+        <c:ser>
+          <c:idx val="0"/>
+          <c:order val="0"/>
+          <c:tx>
+            <c:strRef>
+              <c:f>Hoja1!$B$1</c:f>
+              <c:strCache>
+                <c:ptCount val="1"/>
+                <c:pt idx="0">
+                  <c:v>Columna1</c:v>
+                </c:pt>
+              </c:strCache>
+            </c:strRef>
+          </c:tx>
+          <c:spPr>
+            <a:ln w="50800" cap="rnd">
+              <a:solidFill>
+                <a:schemeClr val="accent3">
+                  <a:lumMod val="75000"/>
+                </a:schemeClr>
+              </a:solidFill>
+              <a:round/>
+            </a:ln>
+            <a:effectLst/>
+          </c:spPr>
+          <c:marker>
+            <c:symbol val="none"/>
+          </c:marker>
+          <c:cat>
+            <c:numRef>
+              <c:f>Hoja1!$A$2:$A$4</c:f>
+              <c:numCache>
+                <c:formatCode>General</c:formatCode>
+                <c:ptCount val="3"/>
+                <c:pt idx="0">
+                  <c:v>1996</c:v>
+                </c:pt>
+                <c:pt idx="1">
+                  <c:v>1997</c:v>
+                </c:pt>
+                <c:pt idx="2">
+                  <c:v>1998</c:v>
+                </c:pt>
+              </c:numCache>
+            </c:numRef>
+          </c:cat>
+          <c:val>
+            <c:numRef>
+              <c:f>Hoja1!$B$2:$B$4</c:f>
+              <c:numCache>
+                <c:formatCode>General</c:formatCode>
+                <c:ptCount val="3"/>
+                <c:pt idx="0">
+                  <c:v>18214.53</c:v>
+                </c:pt>
+                <c:pt idx="1">
+                  <c:v>41303.54</c:v>
+                </c:pt>
+                <c:pt idx="2">
+                  <c:v>29147.47</c:v>
+                </c:pt>
+              </c:numCache>
+            </c:numRef>
+          </c:val>
+          <c:smooth val="0"/>
+          <c:extLst>
+            <c:ext xmlns:c16="http://schemas.microsoft.com/office/drawing/2014/chart" uri="{C3380CC4-5D6E-409C-BE32-E72D297353CC}">
+              <c16:uniqueId val="{00000000-01AF-4FAA-9EA2-F4539CC4F1E8}"/>
+            </c:ext>
+          </c:extLst>
+        </c:ser>
+        <c:dLbls>
+          <c:showLegendKey val="0"/>
+          <c:showVal val="0"/>
+          <c:showCatName val="0"/>
+          <c:showSerName val="0"/>
+          <c:showPercent val="0"/>
+          <c:showBubbleSize val="0"/>
+        </c:dLbls>
+        <c:smooth val="0"/>
+        <c:axId val="1544268847"/>
+        <c:axId val="1544267887"/>
+      </c:lineChart>
+      <c:catAx>
+        <c:axId val="1544268847"/>
+        <c:scaling>
+          <c:orientation val="minMax"/>
+        </c:scaling>
+        <c:delete val="0"/>
+        <c:axPos val="b"/>
+        <c:numFmt formatCode="General" sourceLinked="1"/>
+        <c:majorTickMark val="none"/>
+        <c:minorTickMark val="none"/>
+        <c:tickLblPos val="nextTo"/>
+        <c:spPr>
+          <a:noFill/>
+          <a:ln w="9525" cap="flat" cmpd="sng" algn="ctr">
+            <a:solidFill>
+              <a:schemeClr val="tx1">
+                <a:lumMod val="15000"/>
+                <a:lumOff val="85000"/>
+              </a:schemeClr>
+            </a:solidFill>
+            <a:round/>
+          </a:ln>
+          <a:effectLst/>
+        </c:spPr>
+        <c:txPr>
+          <a:bodyPr rot="-60000000" spcFirstLastPara="1" vertOverflow="ellipsis" vert="horz" wrap="square" anchor="ctr" anchorCtr="1"/>
+          <a:lstStyle/>
+          <a:p>
+            <a:pPr>
+              <a:defRPr sz="1197" b="0" i="0" u="none" strike="noStrike" kern="1200" baseline="0">
+                <a:solidFill>
+                  <a:schemeClr val="tx1">
+                    <a:lumMod val="65000"/>
+                    <a:lumOff val="35000"/>
+                  </a:schemeClr>
+                </a:solidFill>
+                <a:latin typeface="+mn-lt"/>
+                <a:ea typeface="+mn-ea"/>
+                <a:cs typeface="+mn-cs"/>
+              </a:defRPr>
+            </a:pPr>
+            <a:endParaRPr lang="es-ES"/>
+          </a:p>
+        </c:txPr>
+        <c:crossAx val="1544267887"/>
+        <c:crosses val="autoZero"/>
+        <c:auto val="1"/>
+        <c:lblAlgn val="ctr"/>
+        <c:lblOffset val="100"/>
+        <c:noMultiLvlLbl val="0"/>
+      </c:catAx>
+      <c:valAx>
+        <c:axId val="1544267887"/>
+        <c:scaling>
+          <c:orientation val="minMax"/>
+          <c:min val="15000"/>
+        </c:scaling>
+        <c:delete val="0"/>
+        <c:axPos val="l"/>
+        <c:majorGridlines>
+          <c:spPr>
+            <a:ln w="9525" cap="flat" cmpd="sng" algn="ctr">
+              <a:solidFill>
+                <a:schemeClr val="tx1">
+                  <a:lumMod val="15000"/>
+                  <a:lumOff val="85000"/>
+                </a:schemeClr>
+              </a:solidFill>
+              <a:round/>
+            </a:ln>
+            <a:effectLst/>
+          </c:spPr>
+        </c:majorGridlines>
+        <c:numFmt formatCode="General" sourceLinked="1"/>
+        <c:majorTickMark val="none"/>
+        <c:minorTickMark val="none"/>
+        <c:tickLblPos val="nextTo"/>
+        <c:spPr>
+          <a:noFill/>
+          <a:ln>
+            <a:noFill/>
+          </a:ln>
+          <a:effectLst/>
+        </c:spPr>
+        <c:txPr>
+          <a:bodyPr rot="-60000000" spcFirstLastPara="1" vertOverflow="ellipsis" vert="horz" wrap="square" anchor="ctr" anchorCtr="1"/>
+          <a:lstStyle/>
+          <a:p>
+            <a:pPr>
+              <a:defRPr sz="1197" b="0" i="0" u="none" strike="noStrike" kern="1200" baseline="0">
+                <a:solidFill>
+                  <a:schemeClr val="tx1">
+                    <a:lumMod val="65000"/>
+                    <a:lumOff val="35000"/>
+                  </a:schemeClr>
+                </a:solidFill>
+                <a:latin typeface="+mn-lt"/>
+                <a:ea typeface="+mn-ea"/>
+                <a:cs typeface="+mn-cs"/>
+              </a:defRPr>
+            </a:pPr>
+            <a:endParaRPr lang="es-ES"/>
+          </a:p>
+        </c:txPr>
+        <c:crossAx val="1544268847"/>
+        <c:crosses val="autoZero"/>
+        <c:crossBetween val="between"/>
+      </c:valAx>
+      <c:spPr>
+        <a:noFill/>
+        <a:ln>
+          <a:noFill/>
+        </a:ln>
+        <a:effectLst/>
+      </c:spPr>
+    </c:plotArea>
+    <c:plotVisOnly val="1"/>
+    <c:dispBlanksAs val="gap"/>
+    <c:showDLblsOverMax val="0"/>
+    <c:extLst>
+      <c:ext xmlns:c16r3="http://schemas.microsoft.com/office/drawing/2017/03/chart" uri="{56B9EC1D-385E-4148-901F-78D8002777C0}">
+        <c16r3:dataDisplayOptions16>
+          <c16r3:dispNaAsBlank val="1"/>
+        </c16r3:dataDisplayOptions16>
+      </c:ext>
+    </c:extLst>
+  </c:chart>
+  <c:spPr>
+    <a:solidFill>
+      <a:schemeClr val="accent1"/>
+    </a:solidFill>
     <a:ln>
       <a:noFill/>
     </a:ln>
@@ -1630,6 +2661,126 @@
 </cs:colorStyle>
 </file>
 
+<file path=ppt/charts/colors5.xml><?xml version="1.0" encoding="utf-8"?>
+<cs:colorStyle xmlns:cs="http://schemas.microsoft.com/office/drawing/2012/chartStyle" xmlns:a="http://schemas.openxmlformats.org/drawingml/2006/main" meth="cycle" id="10">
+  <a:schemeClr val="accent1"/>
+  <a:schemeClr val="accent2"/>
+  <a:schemeClr val="accent3"/>
+  <a:schemeClr val="accent4"/>
+  <a:schemeClr val="accent5"/>
+  <a:schemeClr val="accent6"/>
+  <cs:variation/>
+  <cs:variation>
+    <a:lumMod val="60000"/>
+  </cs:variation>
+  <cs:variation>
+    <a:lumMod val="80000"/>
+    <a:lumOff val="20000"/>
+  </cs:variation>
+  <cs:variation>
+    <a:lumMod val="80000"/>
+  </cs:variation>
+  <cs:variation>
+    <a:lumMod val="60000"/>
+    <a:lumOff val="40000"/>
+  </cs:variation>
+  <cs:variation>
+    <a:lumMod val="50000"/>
+  </cs:variation>
+  <cs:variation>
+    <a:lumMod val="70000"/>
+    <a:lumOff val="30000"/>
+  </cs:variation>
+  <cs:variation>
+    <a:lumMod val="70000"/>
+  </cs:variation>
+  <cs:variation>
+    <a:lumMod val="50000"/>
+    <a:lumOff val="50000"/>
+  </cs:variation>
+</cs:colorStyle>
+</file>
+
+<file path=ppt/charts/colors6.xml><?xml version="1.0" encoding="utf-8"?>
+<cs:colorStyle xmlns:cs="http://schemas.microsoft.com/office/drawing/2012/chartStyle" xmlns:a="http://schemas.openxmlformats.org/drawingml/2006/main" meth="cycle" id="10">
+  <a:schemeClr val="accent1"/>
+  <a:schemeClr val="accent2"/>
+  <a:schemeClr val="accent3"/>
+  <a:schemeClr val="accent4"/>
+  <a:schemeClr val="accent5"/>
+  <a:schemeClr val="accent6"/>
+  <cs:variation/>
+  <cs:variation>
+    <a:lumMod val="60000"/>
+  </cs:variation>
+  <cs:variation>
+    <a:lumMod val="80000"/>
+    <a:lumOff val="20000"/>
+  </cs:variation>
+  <cs:variation>
+    <a:lumMod val="80000"/>
+  </cs:variation>
+  <cs:variation>
+    <a:lumMod val="60000"/>
+    <a:lumOff val="40000"/>
+  </cs:variation>
+  <cs:variation>
+    <a:lumMod val="50000"/>
+  </cs:variation>
+  <cs:variation>
+    <a:lumMod val="70000"/>
+    <a:lumOff val="30000"/>
+  </cs:variation>
+  <cs:variation>
+    <a:lumMod val="70000"/>
+  </cs:variation>
+  <cs:variation>
+    <a:lumMod val="50000"/>
+    <a:lumOff val="50000"/>
+  </cs:variation>
+</cs:colorStyle>
+</file>
+
+<file path=ppt/charts/colors7.xml><?xml version="1.0" encoding="utf-8"?>
+<cs:colorStyle xmlns:cs="http://schemas.microsoft.com/office/drawing/2012/chartStyle" xmlns:a="http://schemas.openxmlformats.org/drawingml/2006/main" meth="cycle" id="10">
+  <a:schemeClr val="accent1"/>
+  <a:schemeClr val="accent2"/>
+  <a:schemeClr val="accent3"/>
+  <a:schemeClr val="accent4"/>
+  <a:schemeClr val="accent5"/>
+  <a:schemeClr val="accent6"/>
+  <cs:variation/>
+  <cs:variation>
+    <a:lumMod val="60000"/>
+  </cs:variation>
+  <cs:variation>
+    <a:lumMod val="80000"/>
+    <a:lumOff val="20000"/>
+  </cs:variation>
+  <cs:variation>
+    <a:lumMod val="80000"/>
+  </cs:variation>
+  <cs:variation>
+    <a:lumMod val="60000"/>
+    <a:lumOff val="40000"/>
+  </cs:variation>
+  <cs:variation>
+    <a:lumMod val="50000"/>
+  </cs:variation>
+  <cs:variation>
+    <a:lumMod val="70000"/>
+    <a:lumOff val="30000"/>
+  </cs:variation>
+  <cs:variation>
+    <a:lumMod val="70000"/>
+  </cs:variation>
+  <cs:variation>
+    <a:lumMod val="50000"/>
+    <a:lumOff val="50000"/>
+  </cs:variation>
+</cs:colorStyle>
+</file>
+
 <file path=ppt/charts/style1.xml><?xml version="1.0" encoding="utf-8"?>
 <cs:chartStyle xmlns:cs="http://schemas.microsoft.com/office/drawing/2012/chartStyle" xmlns:a="http://schemas.openxmlformats.org/drawingml/2006/main" id="218">
   <cs:axisTitle>
@@ -3416,6 +4567,1532 @@
       <a:schemeClr val="tx1"/>
     </cs:fontRef>
     <cs:spPr>
+      <a:ln w="9525">
+        <a:solidFill>
+          <a:schemeClr val="phClr"/>
+        </a:solidFill>
+      </a:ln>
+    </cs:spPr>
+  </cs:dataPointMarker>
+  <cs:dataPointMarkerLayout symbol="circle" size="5"/>
+  <cs:dataPointWireframe>
+    <cs:lnRef idx="0">
+      <cs:styleClr val="auto"/>
+    </cs:lnRef>
+    <cs:fillRef idx="1"/>
+    <cs:effectRef idx="0"/>
+    <cs:fontRef idx="minor">
+      <a:schemeClr val="tx1"/>
+    </cs:fontRef>
+    <cs:spPr>
+      <a:ln w="9525" cap="rnd">
+        <a:solidFill>
+          <a:schemeClr val="phClr"/>
+        </a:solidFill>
+        <a:round/>
+      </a:ln>
+    </cs:spPr>
+  </cs:dataPointWireframe>
+  <cs:dataTable>
+    <cs:lnRef idx="0"/>
+    <cs:fillRef idx="0"/>
+    <cs:effectRef idx="0"/>
+    <cs:fontRef idx="minor">
+      <a:schemeClr val="tx1">
+        <a:lumMod val="65000"/>
+        <a:lumOff val="35000"/>
+      </a:schemeClr>
+    </cs:fontRef>
+    <cs:spPr>
+      <a:noFill/>
+      <a:ln w="9525" cap="flat" cmpd="sng" algn="ctr">
+        <a:solidFill>
+          <a:schemeClr val="tx1">
+            <a:lumMod val="15000"/>
+            <a:lumOff val="85000"/>
+          </a:schemeClr>
+        </a:solidFill>
+        <a:round/>
+      </a:ln>
+    </cs:spPr>
+    <cs:defRPr sz="1197" kern="1200"/>
+  </cs:dataTable>
+  <cs:downBar>
+    <cs:lnRef idx="0"/>
+    <cs:fillRef idx="0"/>
+    <cs:effectRef idx="0"/>
+    <cs:fontRef idx="minor">
+      <a:schemeClr val="dk1"/>
+    </cs:fontRef>
+    <cs:spPr>
+      <a:solidFill>
+        <a:schemeClr val="dk1">
+          <a:lumMod val="65000"/>
+          <a:lumOff val="35000"/>
+        </a:schemeClr>
+      </a:solidFill>
+      <a:ln w="9525">
+        <a:solidFill>
+          <a:schemeClr val="tx1">
+            <a:lumMod val="65000"/>
+            <a:lumOff val="35000"/>
+          </a:schemeClr>
+        </a:solidFill>
+      </a:ln>
+    </cs:spPr>
+  </cs:downBar>
+  <cs:dropLine>
+    <cs:lnRef idx="0"/>
+    <cs:fillRef idx="0"/>
+    <cs:effectRef idx="0"/>
+    <cs:fontRef idx="minor">
+      <a:schemeClr val="tx1"/>
+    </cs:fontRef>
+    <cs:spPr>
+      <a:ln w="9525" cap="flat" cmpd="sng" algn="ctr">
+        <a:solidFill>
+          <a:schemeClr val="tx1">
+            <a:lumMod val="35000"/>
+            <a:lumOff val="65000"/>
+          </a:schemeClr>
+        </a:solidFill>
+        <a:round/>
+      </a:ln>
+    </cs:spPr>
+  </cs:dropLine>
+  <cs:errorBar>
+    <cs:lnRef idx="0"/>
+    <cs:fillRef idx="0"/>
+    <cs:effectRef idx="0"/>
+    <cs:fontRef idx="minor">
+      <a:schemeClr val="tx1"/>
+    </cs:fontRef>
+    <cs:spPr>
+      <a:ln w="9525" cap="flat" cmpd="sng" algn="ctr">
+        <a:solidFill>
+          <a:schemeClr val="tx1">
+            <a:lumMod val="65000"/>
+            <a:lumOff val="35000"/>
+          </a:schemeClr>
+        </a:solidFill>
+        <a:round/>
+      </a:ln>
+    </cs:spPr>
+  </cs:errorBar>
+  <cs:floor>
+    <cs:lnRef idx="0"/>
+    <cs:fillRef idx="0"/>
+    <cs:effectRef idx="0"/>
+    <cs:fontRef idx="minor">
+      <a:schemeClr val="tx1"/>
+    </cs:fontRef>
+    <cs:spPr>
+      <a:noFill/>
+      <a:ln>
+        <a:noFill/>
+      </a:ln>
+    </cs:spPr>
+  </cs:floor>
+  <cs:gridlineMajor>
+    <cs:lnRef idx="0"/>
+    <cs:fillRef idx="0"/>
+    <cs:effectRef idx="0"/>
+    <cs:fontRef idx="minor">
+      <a:schemeClr val="tx1"/>
+    </cs:fontRef>
+    <cs:spPr>
+      <a:ln w="9525" cap="flat" cmpd="sng" algn="ctr">
+        <a:solidFill>
+          <a:schemeClr val="tx1">
+            <a:lumMod val="15000"/>
+            <a:lumOff val="85000"/>
+          </a:schemeClr>
+        </a:solidFill>
+        <a:round/>
+      </a:ln>
+    </cs:spPr>
+  </cs:gridlineMajor>
+  <cs:gridlineMinor>
+    <cs:lnRef idx="0"/>
+    <cs:fillRef idx="0"/>
+    <cs:effectRef idx="0"/>
+    <cs:fontRef idx="minor">
+      <a:schemeClr val="tx1"/>
+    </cs:fontRef>
+    <cs:spPr>
+      <a:ln w="9525" cap="flat" cmpd="sng" algn="ctr">
+        <a:solidFill>
+          <a:schemeClr val="tx1">
+            <a:lumMod val="5000"/>
+            <a:lumOff val="95000"/>
+          </a:schemeClr>
+        </a:solidFill>
+        <a:round/>
+      </a:ln>
+    </cs:spPr>
+  </cs:gridlineMinor>
+  <cs:hiLoLine>
+    <cs:lnRef idx="0"/>
+    <cs:fillRef idx="0"/>
+    <cs:effectRef idx="0"/>
+    <cs:fontRef idx="minor">
+      <a:schemeClr val="tx1"/>
+    </cs:fontRef>
+    <cs:spPr>
+      <a:ln w="9525" cap="flat" cmpd="sng" algn="ctr">
+        <a:solidFill>
+          <a:schemeClr val="tx1">
+            <a:lumMod val="75000"/>
+            <a:lumOff val="25000"/>
+          </a:schemeClr>
+        </a:solidFill>
+        <a:round/>
+      </a:ln>
+    </cs:spPr>
+  </cs:hiLoLine>
+  <cs:leaderLine>
+    <cs:lnRef idx="0"/>
+    <cs:fillRef idx="0"/>
+    <cs:effectRef idx="0"/>
+    <cs:fontRef idx="minor">
+      <a:schemeClr val="tx1"/>
+    </cs:fontRef>
+    <cs:spPr>
+      <a:ln w="9525" cap="flat" cmpd="sng" algn="ctr">
+        <a:solidFill>
+          <a:schemeClr val="tx1">
+            <a:lumMod val="35000"/>
+            <a:lumOff val="65000"/>
+          </a:schemeClr>
+        </a:solidFill>
+        <a:round/>
+      </a:ln>
+    </cs:spPr>
+  </cs:leaderLine>
+  <cs:legend>
+    <cs:lnRef idx="0"/>
+    <cs:fillRef idx="0"/>
+    <cs:effectRef idx="0"/>
+    <cs:fontRef idx="minor">
+      <a:schemeClr val="tx1">
+        <a:lumMod val="65000"/>
+        <a:lumOff val="35000"/>
+      </a:schemeClr>
+    </cs:fontRef>
+    <cs:defRPr sz="1197" kern="1200"/>
+  </cs:legend>
+  <cs:plotArea mods="allowNoFillOverride allowNoLineOverride">
+    <cs:lnRef idx="0"/>
+    <cs:fillRef idx="0"/>
+    <cs:effectRef idx="0"/>
+    <cs:fontRef idx="minor">
+      <a:schemeClr val="tx1"/>
+    </cs:fontRef>
+  </cs:plotArea>
+  <cs:plotArea3D mods="allowNoFillOverride allowNoLineOverride">
+    <cs:lnRef idx="0"/>
+    <cs:fillRef idx="0"/>
+    <cs:effectRef idx="0"/>
+    <cs:fontRef idx="minor">
+      <a:schemeClr val="tx1"/>
+    </cs:fontRef>
+  </cs:plotArea3D>
+  <cs:seriesAxis>
+    <cs:lnRef idx="0"/>
+    <cs:fillRef idx="0"/>
+    <cs:effectRef idx="0"/>
+    <cs:fontRef idx="minor">
+      <a:schemeClr val="tx1">
+        <a:lumMod val="65000"/>
+        <a:lumOff val="35000"/>
+      </a:schemeClr>
+    </cs:fontRef>
+    <cs:defRPr sz="1197" kern="1200"/>
+  </cs:seriesAxis>
+  <cs:seriesLine>
+    <cs:lnRef idx="0"/>
+    <cs:fillRef idx="0"/>
+    <cs:effectRef idx="0"/>
+    <cs:fontRef idx="minor">
+      <a:schemeClr val="tx1"/>
+    </cs:fontRef>
+    <cs:spPr>
+      <a:ln w="9525" cap="flat" cmpd="sng" algn="ctr">
+        <a:solidFill>
+          <a:schemeClr val="tx1">
+            <a:lumMod val="35000"/>
+            <a:lumOff val="65000"/>
+          </a:schemeClr>
+        </a:solidFill>
+        <a:round/>
+      </a:ln>
+    </cs:spPr>
+  </cs:seriesLine>
+  <cs:title>
+    <cs:lnRef idx="0"/>
+    <cs:fillRef idx="0"/>
+    <cs:effectRef idx="0"/>
+    <cs:fontRef idx="minor">
+      <a:schemeClr val="tx1">
+        <a:lumMod val="65000"/>
+        <a:lumOff val="35000"/>
+      </a:schemeClr>
+    </cs:fontRef>
+    <cs:defRPr sz="1862" b="0" kern="1200" spc="0" baseline="0"/>
+  </cs:title>
+  <cs:trendline>
+    <cs:lnRef idx="0">
+      <cs:styleClr val="auto"/>
+    </cs:lnRef>
+    <cs:fillRef idx="0"/>
+    <cs:effectRef idx="0"/>
+    <cs:fontRef idx="minor">
+      <a:schemeClr val="tx1"/>
+    </cs:fontRef>
+    <cs:spPr>
+      <a:ln w="19050" cap="rnd">
+        <a:solidFill>
+          <a:schemeClr val="phClr"/>
+        </a:solidFill>
+        <a:prstDash val="sysDot"/>
+      </a:ln>
+    </cs:spPr>
+  </cs:trendline>
+  <cs:trendlineLabel>
+    <cs:lnRef idx="0"/>
+    <cs:fillRef idx="0"/>
+    <cs:effectRef idx="0"/>
+    <cs:fontRef idx="minor">
+      <a:schemeClr val="tx1">
+        <a:lumMod val="65000"/>
+        <a:lumOff val="35000"/>
+      </a:schemeClr>
+    </cs:fontRef>
+    <cs:defRPr sz="1197" kern="1200"/>
+  </cs:trendlineLabel>
+  <cs:upBar>
+    <cs:lnRef idx="0"/>
+    <cs:fillRef idx="0"/>
+    <cs:effectRef idx="0"/>
+    <cs:fontRef idx="minor">
+      <a:schemeClr val="dk1"/>
+    </cs:fontRef>
+    <cs:spPr>
+      <a:solidFill>
+        <a:schemeClr val="lt1"/>
+      </a:solidFill>
+      <a:ln w="9525">
+        <a:solidFill>
+          <a:schemeClr val="tx1">
+            <a:lumMod val="15000"/>
+            <a:lumOff val="85000"/>
+          </a:schemeClr>
+        </a:solidFill>
+      </a:ln>
+    </cs:spPr>
+  </cs:upBar>
+  <cs:valueAxis>
+    <cs:lnRef idx="0"/>
+    <cs:fillRef idx="0"/>
+    <cs:effectRef idx="0"/>
+    <cs:fontRef idx="minor">
+      <a:schemeClr val="tx1">
+        <a:lumMod val="65000"/>
+        <a:lumOff val="35000"/>
+      </a:schemeClr>
+    </cs:fontRef>
+    <cs:defRPr sz="1197" kern="1200"/>
+  </cs:valueAxis>
+  <cs:wall>
+    <cs:lnRef idx="0"/>
+    <cs:fillRef idx="0"/>
+    <cs:effectRef idx="0"/>
+    <cs:fontRef idx="minor">
+      <a:schemeClr val="tx1"/>
+    </cs:fontRef>
+    <cs:spPr>
+      <a:noFill/>
+      <a:ln>
+        <a:noFill/>
+      </a:ln>
+    </cs:spPr>
+  </cs:wall>
+</cs:chartStyle>
+</file>
+
+<file path=ppt/charts/style5.xml><?xml version="1.0" encoding="utf-8"?>
+<cs:chartStyle xmlns:cs="http://schemas.microsoft.com/office/drawing/2012/chartStyle" xmlns:a="http://schemas.openxmlformats.org/drawingml/2006/main" id="216">
+  <cs:axisTitle>
+    <cs:lnRef idx="0"/>
+    <cs:fillRef idx="0"/>
+    <cs:effectRef idx="0"/>
+    <cs:fontRef idx="minor">
+      <a:schemeClr val="tx1">
+        <a:lumMod val="65000"/>
+        <a:lumOff val="35000"/>
+      </a:schemeClr>
+    </cs:fontRef>
+    <cs:defRPr sz="1330" kern="1200"/>
+  </cs:axisTitle>
+  <cs:categoryAxis>
+    <cs:lnRef idx="0"/>
+    <cs:fillRef idx="0"/>
+    <cs:effectRef idx="0"/>
+    <cs:fontRef idx="minor">
+      <a:schemeClr val="tx1">
+        <a:lumMod val="65000"/>
+        <a:lumOff val="35000"/>
+      </a:schemeClr>
+    </cs:fontRef>
+    <cs:spPr>
+      <a:ln w="9525" cap="flat" cmpd="sng" algn="ctr">
+        <a:solidFill>
+          <a:schemeClr val="tx1">
+            <a:lumMod val="15000"/>
+            <a:lumOff val="85000"/>
+          </a:schemeClr>
+        </a:solidFill>
+        <a:round/>
+      </a:ln>
+    </cs:spPr>
+    <cs:defRPr sz="1197" kern="1200"/>
+  </cs:categoryAxis>
+  <cs:chartArea mods="allowNoFillOverride allowNoLineOverride">
+    <cs:lnRef idx="0"/>
+    <cs:fillRef idx="0"/>
+    <cs:effectRef idx="0"/>
+    <cs:fontRef idx="minor">
+      <a:schemeClr val="tx1"/>
+    </cs:fontRef>
+    <cs:spPr>
+      <a:solidFill>
+        <a:schemeClr val="bg1"/>
+      </a:solidFill>
+      <a:ln w="9525" cap="flat" cmpd="sng" algn="ctr">
+        <a:solidFill>
+          <a:schemeClr val="tx1">
+            <a:lumMod val="15000"/>
+            <a:lumOff val="85000"/>
+          </a:schemeClr>
+        </a:solidFill>
+        <a:round/>
+      </a:ln>
+    </cs:spPr>
+    <cs:defRPr sz="1330" kern="1200"/>
+  </cs:chartArea>
+  <cs:dataLabel>
+    <cs:lnRef idx="0"/>
+    <cs:fillRef idx="0"/>
+    <cs:effectRef idx="0"/>
+    <cs:fontRef idx="minor">
+      <a:schemeClr val="tx1">
+        <a:lumMod val="75000"/>
+        <a:lumOff val="25000"/>
+      </a:schemeClr>
+    </cs:fontRef>
+    <cs:defRPr sz="1197" kern="1200"/>
+  </cs:dataLabel>
+  <cs:dataLabelCallout>
+    <cs:lnRef idx="0"/>
+    <cs:fillRef idx="0"/>
+    <cs:effectRef idx="0"/>
+    <cs:fontRef idx="minor">
+      <a:schemeClr val="dk1">
+        <a:lumMod val="65000"/>
+        <a:lumOff val="35000"/>
+      </a:schemeClr>
+    </cs:fontRef>
+    <cs:spPr>
+      <a:solidFill>
+        <a:schemeClr val="lt1"/>
+      </a:solidFill>
+      <a:ln>
+        <a:solidFill>
+          <a:schemeClr val="dk1">
+            <a:lumMod val="25000"/>
+            <a:lumOff val="75000"/>
+          </a:schemeClr>
+        </a:solidFill>
+      </a:ln>
+    </cs:spPr>
+    <cs:defRPr sz="1197" kern="1200"/>
+    <cs:bodyPr rot="0" spcFirstLastPara="1" vertOverflow="clip" horzOverflow="clip" vert="horz" wrap="square" lIns="36576" tIns="18288" rIns="36576" bIns="18288" anchor="ctr" anchorCtr="1">
+      <a:spAutoFit/>
+    </cs:bodyPr>
+  </cs:dataLabelCallout>
+  <cs:dataPoint>
+    <cs:lnRef idx="0"/>
+    <cs:fillRef idx="1">
+      <cs:styleClr val="auto"/>
+    </cs:fillRef>
+    <cs:effectRef idx="0"/>
+    <cs:fontRef idx="minor">
+      <a:schemeClr val="tx1"/>
+    </cs:fontRef>
+  </cs:dataPoint>
+  <cs:dataPoint3D>
+    <cs:lnRef idx="0"/>
+    <cs:fillRef idx="1">
+      <cs:styleClr val="auto"/>
+    </cs:fillRef>
+    <cs:effectRef idx="0"/>
+    <cs:fontRef idx="minor">
+      <a:schemeClr val="tx1"/>
+    </cs:fontRef>
+  </cs:dataPoint3D>
+  <cs:dataPointLine>
+    <cs:lnRef idx="0">
+      <cs:styleClr val="auto"/>
+    </cs:lnRef>
+    <cs:fillRef idx="1"/>
+    <cs:effectRef idx="0"/>
+    <cs:fontRef idx="minor">
+      <a:schemeClr val="tx1"/>
+    </cs:fontRef>
+    <cs:spPr>
+      <a:ln w="28575" cap="rnd">
+        <a:solidFill>
+          <a:schemeClr val="phClr"/>
+        </a:solidFill>
+        <a:round/>
+      </a:ln>
+    </cs:spPr>
+  </cs:dataPointLine>
+  <cs:dataPointMarker>
+    <cs:lnRef idx="0">
+      <cs:styleClr val="auto"/>
+    </cs:lnRef>
+    <cs:fillRef idx="1">
+      <cs:styleClr val="auto"/>
+    </cs:fillRef>
+    <cs:effectRef idx="0"/>
+    <cs:fontRef idx="minor">
+      <a:schemeClr val="tx1"/>
+    </cs:fontRef>
+    <cs:spPr>
+      <a:ln w="9525">
+        <a:solidFill>
+          <a:schemeClr val="phClr"/>
+        </a:solidFill>
+      </a:ln>
+    </cs:spPr>
+  </cs:dataPointMarker>
+  <cs:dataPointMarkerLayout symbol="circle" size="5"/>
+  <cs:dataPointWireframe>
+    <cs:lnRef idx="0">
+      <cs:styleClr val="auto"/>
+    </cs:lnRef>
+    <cs:fillRef idx="1"/>
+    <cs:effectRef idx="0"/>
+    <cs:fontRef idx="minor">
+      <a:schemeClr val="tx1"/>
+    </cs:fontRef>
+    <cs:spPr>
+      <a:ln w="9525" cap="rnd">
+        <a:solidFill>
+          <a:schemeClr val="phClr"/>
+        </a:solidFill>
+        <a:round/>
+      </a:ln>
+    </cs:spPr>
+  </cs:dataPointWireframe>
+  <cs:dataTable>
+    <cs:lnRef idx="0"/>
+    <cs:fillRef idx="0"/>
+    <cs:effectRef idx="0"/>
+    <cs:fontRef idx="minor">
+      <a:schemeClr val="tx1">
+        <a:lumMod val="65000"/>
+        <a:lumOff val="35000"/>
+      </a:schemeClr>
+    </cs:fontRef>
+    <cs:spPr>
+      <a:noFill/>
+      <a:ln w="9525" cap="flat" cmpd="sng" algn="ctr">
+        <a:solidFill>
+          <a:schemeClr val="tx1">
+            <a:lumMod val="15000"/>
+            <a:lumOff val="85000"/>
+          </a:schemeClr>
+        </a:solidFill>
+        <a:round/>
+      </a:ln>
+    </cs:spPr>
+    <cs:defRPr sz="1197" kern="1200"/>
+  </cs:dataTable>
+  <cs:downBar>
+    <cs:lnRef idx="0"/>
+    <cs:fillRef idx="0"/>
+    <cs:effectRef idx="0"/>
+    <cs:fontRef idx="minor">
+      <a:schemeClr val="tx1"/>
+    </cs:fontRef>
+    <cs:spPr>
+      <a:solidFill>
+        <a:schemeClr val="dk1">
+          <a:lumMod val="75000"/>
+          <a:lumOff val="25000"/>
+        </a:schemeClr>
+      </a:solidFill>
+      <a:ln w="9525" cap="flat" cmpd="sng" algn="ctr">
+        <a:solidFill>
+          <a:schemeClr val="tx1">
+            <a:lumMod val="65000"/>
+            <a:lumOff val="35000"/>
+          </a:schemeClr>
+        </a:solidFill>
+        <a:round/>
+      </a:ln>
+    </cs:spPr>
+  </cs:downBar>
+  <cs:dropLine>
+    <cs:lnRef idx="0"/>
+    <cs:fillRef idx="0"/>
+    <cs:effectRef idx="0"/>
+    <cs:fontRef idx="minor">
+      <a:schemeClr val="tx1"/>
+    </cs:fontRef>
+    <cs:spPr>
+      <a:ln w="9525" cap="flat" cmpd="sng" algn="ctr">
+        <a:solidFill>
+          <a:schemeClr val="tx1">
+            <a:lumMod val="35000"/>
+            <a:lumOff val="65000"/>
+          </a:schemeClr>
+        </a:solidFill>
+        <a:round/>
+      </a:ln>
+    </cs:spPr>
+  </cs:dropLine>
+  <cs:errorBar>
+    <cs:lnRef idx="0"/>
+    <cs:fillRef idx="0"/>
+    <cs:effectRef idx="0"/>
+    <cs:fontRef idx="minor">
+      <a:schemeClr val="tx1"/>
+    </cs:fontRef>
+    <cs:spPr>
+      <a:ln w="9525" cap="flat" cmpd="sng" algn="ctr">
+        <a:solidFill>
+          <a:schemeClr val="tx1">
+            <a:lumMod val="65000"/>
+            <a:lumOff val="35000"/>
+          </a:schemeClr>
+        </a:solidFill>
+        <a:round/>
+      </a:ln>
+    </cs:spPr>
+  </cs:errorBar>
+  <cs:floor>
+    <cs:lnRef idx="0"/>
+    <cs:fillRef idx="0"/>
+    <cs:effectRef idx="0"/>
+    <cs:fontRef idx="minor">
+      <a:schemeClr val="tx1"/>
+    </cs:fontRef>
+    <cs:spPr>
+      <a:noFill/>
+      <a:ln>
+        <a:noFill/>
+      </a:ln>
+    </cs:spPr>
+  </cs:floor>
+  <cs:gridlineMajor>
+    <cs:lnRef idx="0"/>
+    <cs:fillRef idx="0"/>
+    <cs:effectRef idx="0"/>
+    <cs:fontRef idx="minor">
+      <a:schemeClr val="tx1"/>
+    </cs:fontRef>
+    <cs:spPr>
+      <a:ln w="9525" cap="flat" cmpd="sng" algn="ctr">
+        <a:solidFill>
+          <a:schemeClr val="tx1">
+            <a:lumMod val="15000"/>
+            <a:lumOff val="85000"/>
+          </a:schemeClr>
+        </a:solidFill>
+        <a:round/>
+      </a:ln>
+    </cs:spPr>
+  </cs:gridlineMajor>
+  <cs:gridlineMinor>
+    <cs:lnRef idx="0"/>
+    <cs:fillRef idx="0"/>
+    <cs:effectRef idx="0"/>
+    <cs:fontRef idx="minor">
+      <a:schemeClr val="tx1"/>
+    </cs:fontRef>
+    <cs:spPr>
+      <a:ln w="9525" cap="flat" cmpd="sng" algn="ctr">
+        <a:solidFill>
+          <a:schemeClr val="tx1">
+            <a:lumMod val="5000"/>
+            <a:lumOff val="95000"/>
+          </a:schemeClr>
+        </a:solidFill>
+        <a:round/>
+      </a:ln>
+    </cs:spPr>
+  </cs:gridlineMinor>
+  <cs:hiLoLine>
+    <cs:lnRef idx="0"/>
+    <cs:fillRef idx="0"/>
+    <cs:effectRef idx="0"/>
+    <cs:fontRef idx="minor">
+      <a:schemeClr val="tx1"/>
+    </cs:fontRef>
+    <cs:spPr>
+      <a:ln w="9525" cap="flat" cmpd="sng" algn="ctr">
+        <a:solidFill>
+          <a:schemeClr val="tx1">
+            <a:lumMod val="50000"/>
+            <a:lumOff val="50000"/>
+          </a:schemeClr>
+        </a:solidFill>
+        <a:round/>
+      </a:ln>
+    </cs:spPr>
+  </cs:hiLoLine>
+  <cs:leaderLine>
+    <cs:lnRef idx="0"/>
+    <cs:fillRef idx="0"/>
+    <cs:effectRef idx="0"/>
+    <cs:fontRef idx="minor">
+      <a:schemeClr val="tx1"/>
+    </cs:fontRef>
+    <cs:spPr>
+      <a:ln w="9525" cap="flat" cmpd="sng" algn="ctr">
+        <a:solidFill>
+          <a:schemeClr val="tx1">
+            <a:lumMod val="35000"/>
+            <a:lumOff val="65000"/>
+          </a:schemeClr>
+        </a:solidFill>
+        <a:round/>
+      </a:ln>
+    </cs:spPr>
+  </cs:leaderLine>
+  <cs:legend>
+    <cs:lnRef idx="0"/>
+    <cs:fillRef idx="0"/>
+    <cs:effectRef idx="0"/>
+    <cs:fontRef idx="minor">
+      <a:schemeClr val="tx1">
+        <a:lumMod val="65000"/>
+        <a:lumOff val="35000"/>
+      </a:schemeClr>
+    </cs:fontRef>
+    <cs:defRPr sz="1197" kern="1200"/>
+  </cs:legend>
+  <cs:plotArea mods="allowNoFillOverride allowNoLineOverride">
+    <cs:lnRef idx="0"/>
+    <cs:fillRef idx="0"/>
+    <cs:effectRef idx="0"/>
+    <cs:fontRef idx="minor">
+      <a:schemeClr val="tx1"/>
+    </cs:fontRef>
+  </cs:plotArea>
+  <cs:plotArea3D mods="allowNoFillOverride allowNoLineOverride">
+    <cs:lnRef idx="0"/>
+    <cs:fillRef idx="0"/>
+    <cs:effectRef idx="0"/>
+    <cs:fontRef idx="minor">
+      <a:schemeClr val="tx1"/>
+    </cs:fontRef>
+  </cs:plotArea3D>
+  <cs:seriesAxis>
+    <cs:lnRef idx="0"/>
+    <cs:fillRef idx="0"/>
+    <cs:effectRef idx="0"/>
+    <cs:fontRef idx="minor">
+      <a:schemeClr val="tx1">
+        <a:lumMod val="65000"/>
+        <a:lumOff val="35000"/>
+      </a:schemeClr>
+    </cs:fontRef>
+    <cs:defRPr sz="1197" kern="1200"/>
+  </cs:seriesAxis>
+  <cs:seriesLine>
+    <cs:lnRef idx="0"/>
+    <cs:fillRef idx="0"/>
+    <cs:effectRef idx="0"/>
+    <cs:fontRef idx="minor">
+      <a:schemeClr val="tx1"/>
+    </cs:fontRef>
+    <cs:spPr>
+      <a:ln w="9525" cap="flat" cmpd="sng" algn="ctr">
+        <a:solidFill>
+          <a:schemeClr val="tx1">
+            <a:lumMod val="35000"/>
+            <a:lumOff val="65000"/>
+          </a:schemeClr>
+        </a:solidFill>
+        <a:round/>
+      </a:ln>
+    </cs:spPr>
+  </cs:seriesLine>
+  <cs:title>
+    <cs:lnRef idx="0"/>
+    <cs:fillRef idx="0"/>
+    <cs:effectRef idx="0"/>
+    <cs:fontRef idx="minor">
+      <a:schemeClr val="tx1">
+        <a:lumMod val="65000"/>
+        <a:lumOff val="35000"/>
+      </a:schemeClr>
+    </cs:fontRef>
+    <cs:defRPr sz="1862" b="0" kern="1200" spc="0" baseline="0"/>
+  </cs:title>
+  <cs:trendline>
+    <cs:lnRef idx="0">
+      <cs:styleClr val="auto"/>
+    </cs:lnRef>
+    <cs:fillRef idx="0"/>
+    <cs:effectRef idx="0"/>
+    <cs:fontRef idx="minor">
+      <a:schemeClr val="tx1"/>
+    </cs:fontRef>
+    <cs:spPr>
+      <a:ln w="19050" cap="rnd">
+        <a:solidFill>
+          <a:schemeClr val="phClr"/>
+        </a:solidFill>
+        <a:prstDash val="sysDot"/>
+      </a:ln>
+    </cs:spPr>
+  </cs:trendline>
+  <cs:trendlineLabel>
+    <cs:lnRef idx="0"/>
+    <cs:fillRef idx="0"/>
+    <cs:effectRef idx="0"/>
+    <cs:fontRef idx="minor">
+      <a:schemeClr val="tx1">
+        <a:lumMod val="65000"/>
+        <a:lumOff val="35000"/>
+      </a:schemeClr>
+    </cs:fontRef>
+    <cs:defRPr sz="1197" kern="1200"/>
+  </cs:trendlineLabel>
+  <cs:upBar>
+    <cs:lnRef idx="0"/>
+    <cs:fillRef idx="0"/>
+    <cs:effectRef idx="0"/>
+    <cs:fontRef idx="minor">
+      <a:schemeClr val="tx1"/>
+    </cs:fontRef>
+    <cs:spPr>
+      <a:solidFill>
+        <a:schemeClr val="lt1"/>
+      </a:solidFill>
+      <a:ln w="9525" cap="flat" cmpd="sng" algn="ctr">
+        <a:solidFill>
+          <a:schemeClr val="tx1">
+            <a:lumMod val="65000"/>
+            <a:lumOff val="35000"/>
+          </a:schemeClr>
+        </a:solidFill>
+        <a:round/>
+      </a:ln>
+    </cs:spPr>
+  </cs:upBar>
+  <cs:valueAxis>
+    <cs:lnRef idx="0"/>
+    <cs:fillRef idx="0"/>
+    <cs:effectRef idx="0"/>
+    <cs:fontRef idx="minor">
+      <a:schemeClr val="tx1">
+        <a:lumMod val="65000"/>
+        <a:lumOff val="35000"/>
+      </a:schemeClr>
+    </cs:fontRef>
+    <cs:defRPr sz="1197" kern="1200"/>
+  </cs:valueAxis>
+  <cs:wall>
+    <cs:lnRef idx="0"/>
+    <cs:fillRef idx="0"/>
+    <cs:effectRef idx="0"/>
+    <cs:fontRef idx="minor">
+      <a:schemeClr val="tx1"/>
+    </cs:fontRef>
+    <cs:spPr>
+      <a:noFill/>
+      <a:ln>
+        <a:noFill/>
+      </a:ln>
+    </cs:spPr>
+  </cs:wall>
+</cs:chartStyle>
+</file>
+
+<file path=ppt/charts/style6.xml><?xml version="1.0" encoding="utf-8"?>
+<cs:chartStyle xmlns:cs="http://schemas.microsoft.com/office/drawing/2012/chartStyle" xmlns:a="http://schemas.openxmlformats.org/drawingml/2006/main" id="216">
+  <cs:axisTitle>
+    <cs:lnRef idx="0"/>
+    <cs:fillRef idx="0"/>
+    <cs:effectRef idx="0"/>
+    <cs:fontRef idx="minor">
+      <a:schemeClr val="tx1">
+        <a:lumMod val="65000"/>
+        <a:lumOff val="35000"/>
+      </a:schemeClr>
+    </cs:fontRef>
+    <cs:defRPr sz="1330" kern="1200"/>
+  </cs:axisTitle>
+  <cs:categoryAxis>
+    <cs:lnRef idx="0"/>
+    <cs:fillRef idx="0"/>
+    <cs:effectRef idx="0"/>
+    <cs:fontRef idx="minor">
+      <a:schemeClr val="tx1">
+        <a:lumMod val="65000"/>
+        <a:lumOff val="35000"/>
+      </a:schemeClr>
+    </cs:fontRef>
+    <cs:spPr>
+      <a:ln w="9525" cap="flat" cmpd="sng" algn="ctr">
+        <a:solidFill>
+          <a:schemeClr val="tx1">
+            <a:lumMod val="15000"/>
+            <a:lumOff val="85000"/>
+          </a:schemeClr>
+        </a:solidFill>
+        <a:round/>
+      </a:ln>
+    </cs:spPr>
+    <cs:defRPr sz="1197" kern="1200"/>
+  </cs:categoryAxis>
+  <cs:chartArea mods="allowNoFillOverride allowNoLineOverride">
+    <cs:lnRef idx="0"/>
+    <cs:fillRef idx="0"/>
+    <cs:effectRef idx="0"/>
+    <cs:fontRef idx="minor">
+      <a:schemeClr val="tx1"/>
+    </cs:fontRef>
+    <cs:spPr>
+      <a:solidFill>
+        <a:schemeClr val="bg1"/>
+      </a:solidFill>
+      <a:ln w="9525" cap="flat" cmpd="sng" algn="ctr">
+        <a:solidFill>
+          <a:schemeClr val="tx1">
+            <a:lumMod val="15000"/>
+            <a:lumOff val="85000"/>
+          </a:schemeClr>
+        </a:solidFill>
+        <a:round/>
+      </a:ln>
+    </cs:spPr>
+    <cs:defRPr sz="1330" kern="1200"/>
+  </cs:chartArea>
+  <cs:dataLabel>
+    <cs:lnRef idx="0"/>
+    <cs:fillRef idx="0"/>
+    <cs:effectRef idx="0"/>
+    <cs:fontRef idx="minor">
+      <a:schemeClr val="tx1">
+        <a:lumMod val="75000"/>
+        <a:lumOff val="25000"/>
+      </a:schemeClr>
+    </cs:fontRef>
+    <cs:defRPr sz="1197" kern="1200"/>
+  </cs:dataLabel>
+  <cs:dataLabelCallout>
+    <cs:lnRef idx="0"/>
+    <cs:fillRef idx="0"/>
+    <cs:effectRef idx="0"/>
+    <cs:fontRef idx="minor">
+      <a:schemeClr val="dk1">
+        <a:lumMod val="65000"/>
+        <a:lumOff val="35000"/>
+      </a:schemeClr>
+    </cs:fontRef>
+    <cs:spPr>
+      <a:solidFill>
+        <a:schemeClr val="lt1"/>
+      </a:solidFill>
+      <a:ln>
+        <a:solidFill>
+          <a:schemeClr val="dk1">
+            <a:lumMod val="25000"/>
+            <a:lumOff val="75000"/>
+          </a:schemeClr>
+        </a:solidFill>
+      </a:ln>
+    </cs:spPr>
+    <cs:defRPr sz="1197" kern="1200"/>
+    <cs:bodyPr rot="0" spcFirstLastPara="1" vertOverflow="clip" horzOverflow="clip" vert="horz" wrap="square" lIns="36576" tIns="18288" rIns="36576" bIns="18288" anchor="ctr" anchorCtr="1">
+      <a:spAutoFit/>
+    </cs:bodyPr>
+  </cs:dataLabelCallout>
+  <cs:dataPoint>
+    <cs:lnRef idx="0"/>
+    <cs:fillRef idx="1">
+      <cs:styleClr val="auto"/>
+    </cs:fillRef>
+    <cs:effectRef idx="0"/>
+    <cs:fontRef idx="minor">
+      <a:schemeClr val="tx1"/>
+    </cs:fontRef>
+  </cs:dataPoint>
+  <cs:dataPoint3D>
+    <cs:lnRef idx="0"/>
+    <cs:fillRef idx="1">
+      <cs:styleClr val="auto"/>
+    </cs:fillRef>
+    <cs:effectRef idx="0"/>
+    <cs:fontRef idx="minor">
+      <a:schemeClr val="tx1"/>
+    </cs:fontRef>
+  </cs:dataPoint3D>
+  <cs:dataPointLine>
+    <cs:lnRef idx="0">
+      <cs:styleClr val="auto"/>
+    </cs:lnRef>
+    <cs:fillRef idx="1"/>
+    <cs:effectRef idx="0"/>
+    <cs:fontRef idx="minor">
+      <a:schemeClr val="tx1"/>
+    </cs:fontRef>
+    <cs:spPr>
+      <a:ln w="28575" cap="rnd">
+        <a:solidFill>
+          <a:schemeClr val="phClr"/>
+        </a:solidFill>
+        <a:round/>
+      </a:ln>
+    </cs:spPr>
+  </cs:dataPointLine>
+  <cs:dataPointMarker>
+    <cs:lnRef idx="0">
+      <cs:styleClr val="auto"/>
+    </cs:lnRef>
+    <cs:fillRef idx="1">
+      <cs:styleClr val="auto"/>
+    </cs:fillRef>
+    <cs:effectRef idx="0"/>
+    <cs:fontRef idx="minor">
+      <a:schemeClr val="tx1"/>
+    </cs:fontRef>
+    <cs:spPr>
+      <a:ln w="9525">
+        <a:solidFill>
+          <a:schemeClr val="phClr"/>
+        </a:solidFill>
+      </a:ln>
+    </cs:spPr>
+  </cs:dataPointMarker>
+  <cs:dataPointMarkerLayout symbol="circle" size="5"/>
+  <cs:dataPointWireframe>
+    <cs:lnRef idx="0">
+      <cs:styleClr val="auto"/>
+    </cs:lnRef>
+    <cs:fillRef idx="1"/>
+    <cs:effectRef idx="0"/>
+    <cs:fontRef idx="minor">
+      <a:schemeClr val="tx1"/>
+    </cs:fontRef>
+    <cs:spPr>
+      <a:ln w="9525" cap="rnd">
+        <a:solidFill>
+          <a:schemeClr val="phClr"/>
+        </a:solidFill>
+        <a:round/>
+      </a:ln>
+    </cs:spPr>
+  </cs:dataPointWireframe>
+  <cs:dataTable>
+    <cs:lnRef idx="0"/>
+    <cs:fillRef idx="0"/>
+    <cs:effectRef idx="0"/>
+    <cs:fontRef idx="minor">
+      <a:schemeClr val="tx1">
+        <a:lumMod val="65000"/>
+        <a:lumOff val="35000"/>
+      </a:schemeClr>
+    </cs:fontRef>
+    <cs:spPr>
+      <a:noFill/>
+      <a:ln w="9525" cap="flat" cmpd="sng" algn="ctr">
+        <a:solidFill>
+          <a:schemeClr val="tx1">
+            <a:lumMod val="15000"/>
+            <a:lumOff val="85000"/>
+          </a:schemeClr>
+        </a:solidFill>
+        <a:round/>
+      </a:ln>
+    </cs:spPr>
+    <cs:defRPr sz="1197" kern="1200"/>
+  </cs:dataTable>
+  <cs:downBar>
+    <cs:lnRef idx="0"/>
+    <cs:fillRef idx="0"/>
+    <cs:effectRef idx="0"/>
+    <cs:fontRef idx="minor">
+      <a:schemeClr val="tx1"/>
+    </cs:fontRef>
+    <cs:spPr>
+      <a:solidFill>
+        <a:schemeClr val="dk1">
+          <a:lumMod val="75000"/>
+          <a:lumOff val="25000"/>
+        </a:schemeClr>
+      </a:solidFill>
+      <a:ln w="9525" cap="flat" cmpd="sng" algn="ctr">
+        <a:solidFill>
+          <a:schemeClr val="tx1">
+            <a:lumMod val="65000"/>
+            <a:lumOff val="35000"/>
+          </a:schemeClr>
+        </a:solidFill>
+        <a:round/>
+      </a:ln>
+    </cs:spPr>
+  </cs:downBar>
+  <cs:dropLine>
+    <cs:lnRef idx="0"/>
+    <cs:fillRef idx="0"/>
+    <cs:effectRef idx="0"/>
+    <cs:fontRef idx="minor">
+      <a:schemeClr val="tx1"/>
+    </cs:fontRef>
+    <cs:spPr>
+      <a:ln w="9525" cap="flat" cmpd="sng" algn="ctr">
+        <a:solidFill>
+          <a:schemeClr val="tx1">
+            <a:lumMod val="35000"/>
+            <a:lumOff val="65000"/>
+          </a:schemeClr>
+        </a:solidFill>
+        <a:round/>
+      </a:ln>
+    </cs:spPr>
+  </cs:dropLine>
+  <cs:errorBar>
+    <cs:lnRef idx="0"/>
+    <cs:fillRef idx="0"/>
+    <cs:effectRef idx="0"/>
+    <cs:fontRef idx="minor">
+      <a:schemeClr val="tx1"/>
+    </cs:fontRef>
+    <cs:spPr>
+      <a:ln w="9525" cap="flat" cmpd="sng" algn="ctr">
+        <a:solidFill>
+          <a:schemeClr val="tx1">
+            <a:lumMod val="65000"/>
+            <a:lumOff val="35000"/>
+          </a:schemeClr>
+        </a:solidFill>
+        <a:round/>
+      </a:ln>
+    </cs:spPr>
+  </cs:errorBar>
+  <cs:floor>
+    <cs:lnRef idx="0"/>
+    <cs:fillRef idx="0"/>
+    <cs:effectRef idx="0"/>
+    <cs:fontRef idx="minor">
+      <a:schemeClr val="tx1"/>
+    </cs:fontRef>
+    <cs:spPr>
+      <a:noFill/>
+      <a:ln>
+        <a:noFill/>
+      </a:ln>
+    </cs:spPr>
+  </cs:floor>
+  <cs:gridlineMajor>
+    <cs:lnRef idx="0"/>
+    <cs:fillRef idx="0"/>
+    <cs:effectRef idx="0"/>
+    <cs:fontRef idx="minor">
+      <a:schemeClr val="tx1"/>
+    </cs:fontRef>
+    <cs:spPr>
+      <a:ln w="9525" cap="flat" cmpd="sng" algn="ctr">
+        <a:solidFill>
+          <a:schemeClr val="tx1">
+            <a:lumMod val="15000"/>
+            <a:lumOff val="85000"/>
+          </a:schemeClr>
+        </a:solidFill>
+        <a:round/>
+      </a:ln>
+    </cs:spPr>
+  </cs:gridlineMajor>
+  <cs:gridlineMinor>
+    <cs:lnRef idx="0"/>
+    <cs:fillRef idx="0"/>
+    <cs:effectRef idx="0"/>
+    <cs:fontRef idx="minor">
+      <a:schemeClr val="tx1"/>
+    </cs:fontRef>
+    <cs:spPr>
+      <a:ln w="9525" cap="flat" cmpd="sng" algn="ctr">
+        <a:solidFill>
+          <a:schemeClr val="tx1">
+            <a:lumMod val="5000"/>
+            <a:lumOff val="95000"/>
+          </a:schemeClr>
+        </a:solidFill>
+        <a:round/>
+      </a:ln>
+    </cs:spPr>
+  </cs:gridlineMinor>
+  <cs:hiLoLine>
+    <cs:lnRef idx="0"/>
+    <cs:fillRef idx="0"/>
+    <cs:effectRef idx="0"/>
+    <cs:fontRef idx="minor">
+      <a:schemeClr val="tx1"/>
+    </cs:fontRef>
+    <cs:spPr>
+      <a:ln w="9525" cap="flat" cmpd="sng" algn="ctr">
+        <a:solidFill>
+          <a:schemeClr val="tx1">
+            <a:lumMod val="50000"/>
+            <a:lumOff val="50000"/>
+          </a:schemeClr>
+        </a:solidFill>
+        <a:round/>
+      </a:ln>
+    </cs:spPr>
+  </cs:hiLoLine>
+  <cs:leaderLine>
+    <cs:lnRef idx="0"/>
+    <cs:fillRef idx="0"/>
+    <cs:effectRef idx="0"/>
+    <cs:fontRef idx="minor">
+      <a:schemeClr val="tx1"/>
+    </cs:fontRef>
+    <cs:spPr>
+      <a:ln w="9525" cap="flat" cmpd="sng" algn="ctr">
+        <a:solidFill>
+          <a:schemeClr val="tx1">
+            <a:lumMod val="35000"/>
+            <a:lumOff val="65000"/>
+          </a:schemeClr>
+        </a:solidFill>
+        <a:round/>
+      </a:ln>
+    </cs:spPr>
+  </cs:leaderLine>
+  <cs:legend>
+    <cs:lnRef idx="0"/>
+    <cs:fillRef idx="0"/>
+    <cs:effectRef idx="0"/>
+    <cs:fontRef idx="minor">
+      <a:schemeClr val="tx1">
+        <a:lumMod val="65000"/>
+        <a:lumOff val="35000"/>
+      </a:schemeClr>
+    </cs:fontRef>
+    <cs:defRPr sz="1197" kern="1200"/>
+  </cs:legend>
+  <cs:plotArea mods="allowNoFillOverride allowNoLineOverride">
+    <cs:lnRef idx="0"/>
+    <cs:fillRef idx="0"/>
+    <cs:effectRef idx="0"/>
+    <cs:fontRef idx="minor">
+      <a:schemeClr val="tx1"/>
+    </cs:fontRef>
+  </cs:plotArea>
+  <cs:plotArea3D mods="allowNoFillOverride allowNoLineOverride">
+    <cs:lnRef idx="0"/>
+    <cs:fillRef idx="0"/>
+    <cs:effectRef idx="0"/>
+    <cs:fontRef idx="minor">
+      <a:schemeClr val="tx1"/>
+    </cs:fontRef>
+  </cs:plotArea3D>
+  <cs:seriesAxis>
+    <cs:lnRef idx="0"/>
+    <cs:fillRef idx="0"/>
+    <cs:effectRef idx="0"/>
+    <cs:fontRef idx="minor">
+      <a:schemeClr val="tx1">
+        <a:lumMod val="65000"/>
+        <a:lumOff val="35000"/>
+      </a:schemeClr>
+    </cs:fontRef>
+    <cs:defRPr sz="1197" kern="1200"/>
+  </cs:seriesAxis>
+  <cs:seriesLine>
+    <cs:lnRef idx="0"/>
+    <cs:fillRef idx="0"/>
+    <cs:effectRef idx="0"/>
+    <cs:fontRef idx="minor">
+      <a:schemeClr val="tx1"/>
+    </cs:fontRef>
+    <cs:spPr>
+      <a:ln w="9525" cap="flat" cmpd="sng" algn="ctr">
+        <a:solidFill>
+          <a:schemeClr val="tx1">
+            <a:lumMod val="35000"/>
+            <a:lumOff val="65000"/>
+          </a:schemeClr>
+        </a:solidFill>
+        <a:round/>
+      </a:ln>
+    </cs:spPr>
+  </cs:seriesLine>
+  <cs:title>
+    <cs:lnRef idx="0"/>
+    <cs:fillRef idx="0"/>
+    <cs:effectRef idx="0"/>
+    <cs:fontRef idx="minor">
+      <a:schemeClr val="tx1">
+        <a:lumMod val="65000"/>
+        <a:lumOff val="35000"/>
+      </a:schemeClr>
+    </cs:fontRef>
+    <cs:defRPr sz="1862" b="0" kern="1200" spc="0" baseline="0"/>
+  </cs:title>
+  <cs:trendline>
+    <cs:lnRef idx="0">
+      <cs:styleClr val="auto"/>
+    </cs:lnRef>
+    <cs:fillRef idx="0"/>
+    <cs:effectRef idx="0"/>
+    <cs:fontRef idx="minor">
+      <a:schemeClr val="tx1"/>
+    </cs:fontRef>
+    <cs:spPr>
+      <a:ln w="19050" cap="rnd">
+        <a:solidFill>
+          <a:schemeClr val="phClr"/>
+        </a:solidFill>
+        <a:prstDash val="sysDot"/>
+      </a:ln>
+    </cs:spPr>
+  </cs:trendline>
+  <cs:trendlineLabel>
+    <cs:lnRef idx="0"/>
+    <cs:fillRef idx="0"/>
+    <cs:effectRef idx="0"/>
+    <cs:fontRef idx="minor">
+      <a:schemeClr val="tx1">
+        <a:lumMod val="65000"/>
+        <a:lumOff val="35000"/>
+      </a:schemeClr>
+    </cs:fontRef>
+    <cs:defRPr sz="1197" kern="1200"/>
+  </cs:trendlineLabel>
+  <cs:upBar>
+    <cs:lnRef idx="0"/>
+    <cs:fillRef idx="0"/>
+    <cs:effectRef idx="0"/>
+    <cs:fontRef idx="minor">
+      <a:schemeClr val="tx1"/>
+    </cs:fontRef>
+    <cs:spPr>
+      <a:solidFill>
+        <a:schemeClr val="lt1"/>
+      </a:solidFill>
+      <a:ln w="9525" cap="flat" cmpd="sng" algn="ctr">
+        <a:solidFill>
+          <a:schemeClr val="tx1">
+            <a:lumMod val="65000"/>
+            <a:lumOff val="35000"/>
+          </a:schemeClr>
+        </a:solidFill>
+        <a:round/>
+      </a:ln>
+    </cs:spPr>
+  </cs:upBar>
+  <cs:valueAxis>
+    <cs:lnRef idx="0"/>
+    <cs:fillRef idx="0"/>
+    <cs:effectRef idx="0"/>
+    <cs:fontRef idx="minor">
+      <a:schemeClr val="tx1">
+        <a:lumMod val="65000"/>
+        <a:lumOff val="35000"/>
+      </a:schemeClr>
+    </cs:fontRef>
+    <cs:defRPr sz="1197" kern="1200"/>
+  </cs:valueAxis>
+  <cs:wall>
+    <cs:lnRef idx="0"/>
+    <cs:fillRef idx="0"/>
+    <cs:effectRef idx="0"/>
+    <cs:fontRef idx="minor">
+      <a:schemeClr val="tx1"/>
+    </cs:fontRef>
+    <cs:spPr>
+      <a:noFill/>
+      <a:ln>
+        <a:noFill/>
+      </a:ln>
+    </cs:spPr>
+  </cs:wall>
+</cs:chartStyle>
+</file>
+
+<file path=ppt/charts/style7.xml><?xml version="1.0" encoding="utf-8"?>
+<cs:chartStyle xmlns:cs="http://schemas.microsoft.com/office/drawing/2012/chartStyle" xmlns:a="http://schemas.openxmlformats.org/drawingml/2006/main" id="227">
+  <cs:axisTitle>
+    <cs:lnRef idx="0"/>
+    <cs:fillRef idx="0"/>
+    <cs:effectRef idx="0"/>
+    <cs:fontRef idx="minor">
+      <a:schemeClr val="tx1">
+        <a:lumMod val="65000"/>
+        <a:lumOff val="35000"/>
+      </a:schemeClr>
+    </cs:fontRef>
+    <cs:defRPr sz="1330" kern="1200"/>
+  </cs:axisTitle>
+  <cs:categoryAxis>
+    <cs:lnRef idx="0"/>
+    <cs:fillRef idx="0"/>
+    <cs:effectRef idx="0"/>
+    <cs:fontRef idx="minor">
+      <a:schemeClr val="tx1">
+        <a:lumMod val="65000"/>
+        <a:lumOff val="35000"/>
+      </a:schemeClr>
+    </cs:fontRef>
+    <cs:spPr>
+      <a:ln w="9525" cap="flat" cmpd="sng" algn="ctr">
+        <a:solidFill>
+          <a:schemeClr val="tx1">
+            <a:lumMod val="15000"/>
+            <a:lumOff val="85000"/>
+          </a:schemeClr>
+        </a:solidFill>
+        <a:round/>
+      </a:ln>
+    </cs:spPr>
+    <cs:defRPr sz="1197" kern="1200"/>
+  </cs:categoryAxis>
+  <cs:chartArea mods="allowNoFillOverride allowNoLineOverride">
+    <cs:lnRef idx="0"/>
+    <cs:fillRef idx="0"/>
+    <cs:effectRef idx="0"/>
+    <cs:fontRef idx="minor">
+      <a:schemeClr val="tx1"/>
+    </cs:fontRef>
+    <cs:spPr>
+      <a:solidFill>
+        <a:schemeClr val="bg1"/>
+      </a:solidFill>
+      <a:ln w="9525" cap="flat" cmpd="sng" algn="ctr">
+        <a:solidFill>
+          <a:schemeClr val="tx1">
+            <a:lumMod val="15000"/>
+            <a:lumOff val="85000"/>
+          </a:schemeClr>
+        </a:solidFill>
+        <a:round/>
+      </a:ln>
+    </cs:spPr>
+    <cs:defRPr sz="1330" kern="1200"/>
+  </cs:chartArea>
+  <cs:dataLabel>
+    <cs:lnRef idx="0"/>
+    <cs:fillRef idx="0"/>
+    <cs:effectRef idx="0"/>
+    <cs:fontRef idx="minor">
+      <a:schemeClr val="tx1">
+        <a:lumMod val="75000"/>
+        <a:lumOff val="25000"/>
+      </a:schemeClr>
+    </cs:fontRef>
+    <cs:defRPr sz="1197" kern="1200"/>
+  </cs:dataLabel>
+  <cs:dataLabelCallout>
+    <cs:lnRef idx="0"/>
+    <cs:fillRef idx="0"/>
+    <cs:effectRef idx="0"/>
+    <cs:fontRef idx="minor">
+      <a:schemeClr val="dk1">
+        <a:lumMod val="65000"/>
+        <a:lumOff val="35000"/>
+      </a:schemeClr>
+    </cs:fontRef>
+    <cs:spPr>
+      <a:solidFill>
+        <a:schemeClr val="lt1"/>
+      </a:solidFill>
+      <a:ln>
+        <a:solidFill>
+          <a:schemeClr val="dk1">
+            <a:lumMod val="25000"/>
+            <a:lumOff val="75000"/>
+          </a:schemeClr>
+        </a:solidFill>
+      </a:ln>
+    </cs:spPr>
+    <cs:defRPr sz="1197" kern="1200"/>
+    <cs:bodyPr rot="0" spcFirstLastPara="1" vertOverflow="clip" horzOverflow="clip" vert="horz" wrap="square" lIns="36576" tIns="18288" rIns="36576" bIns="18288" anchor="ctr" anchorCtr="1">
+      <a:spAutoFit/>
+    </cs:bodyPr>
+  </cs:dataLabelCallout>
+  <cs:dataPoint>
+    <cs:lnRef idx="0"/>
+    <cs:fillRef idx="1">
+      <cs:styleClr val="auto"/>
+    </cs:fillRef>
+    <cs:effectRef idx="0"/>
+    <cs:fontRef idx="minor">
+      <a:schemeClr val="tx1"/>
+    </cs:fontRef>
+    <cs:spPr>
+      <a:solidFill>
+        <a:schemeClr val="phClr"/>
+      </a:solidFill>
+    </cs:spPr>
+  </cs:dataPoint>
+  <cs:dataPoint3D>
+    <cs:lnRef idx="0"/>
+    <cs:fillRef idx="1">
+      <cs:styleClr val="auto"/>
+    </cs:fillRef>
+    <cs:effectRef idx="0"/>
+    <cs:fontRef idx="minor">
+      <a:schemeClr val="tx1"/>
+    </cs:fontRef>
+    <cs:spPr>
+      <a:solidFill>
+        <a:schemeClr val="phClr"/>
+      </a:solidFill>
+    </cs:spPr>
+  </cs:dataPoint3D>
+  <cs:dataPointLine>
+    <cs:lnRef idx="0">
+      <cs:styleClr val="auto"/>
+    </cs:lnRef>
+    <cs:fillRef idx="1"/>
+    <cs:effectRef idx="0"/>
+    <cs:fontRef idx="minor">
+      <a:schemeClr val="tx1"/>
+    </cs:fontRef>
+    <cs:spPr>
+      <a:ln w="28575" cap="rnd">
+        <a:solidFill>
+          <a:schemeClr val="phClr"/>
+        </a:solidFill>
+        <a:round/>
+      </a:ln>
+    </cs:spPr>
+  </cs:dataPointLine>
+  <cs:dataPointMarker>
+    <cs:lnRef idx="0">
+      <cs:styleClr val="auto"/>
+    </cs:lnRef>
+    <cs:fillRef idx="1">
+      <cs:styleClr val="auto"/>
+    </cs:fillRef>
+    <cs:effectRef idx="0"/>
+    <cs:fontRef idx="minor">
+      <a:schemeClr val="tx1"/>
+    </cs:fontRef>
+    <cs:spPr>
+      <a:solidFill>
+        <a:schemeClr val="phClr"/>
+      </a:solidFill>
       <a:ln w="9525">
         <a:solidFill>
           <a:schemeClr val="phClr"/>
@@ -3961,7 +6638,7 @@
             <a:fld id="{B61BEF0D-F0BB-DE4B-95CE-6DB70DBA9567}" type="datetimeFigureOut">
               <a:rPr lang="en-US" dirty="0"/>
               <a:pPr/>
-              <a:t>9/14/2025</a:t>
+              <a:t>9/17/2025</a:t>
             </a:fld>
             <a:endParaRPr lang="en-US" dirty="0"/>
           </a:p>
@@ -4394,7 +7071,7 @@
             <a:fld id="{B61BEF0D-F0BB-DE4B-95CE-6DB70DBA9567}" type="datetimeFigureOut">
               <a:rPr lang="en-US" dirty="0"/>
               <a:pPr/>
-              <a:t>9/14/2025</a:t>
+              <a:t>9/17/2025</a:t>
             </a:fld>
             <a:endParaRPr lang="en-US" dirty="0"/>
           </a:p>
@@ -4641,7 +7318,7 @@
             <a:fld id="{B61BEF0D-F0BB-DE4B-95CE-6DB70DBA9567}" type="datetimeFigureOut">
               <a:rPr lang="en-US" dirty="0"/>
               <a:pPr/>
-              <a:t>9/14/2025</a:t>
+              <a:t>9/17/2025</a:t>
             </a:fld>
             <a:endParaRPr lang="en-US" dirty="0"/>
           </a:p>
@@ -4946,7 +7623,7 @@
             <a:fld id="{B61BEF0D-F0BB-DE4B-95CE-6DB70DBA9567}" type="datetimeFigureOut">
               <a:rPr lang="en-US" dirty="0"/>
               <a:pPr/>
-              <a:t>9/14/2025</a:t>
+              <a:t>9/17/2025</a:t>
             </a:fld>
             <a:endParaRPr lang="en-US" dirty="0"/>
           </a:p>
@@ -5261,7 +7938,7 @@
             <a:fld id="{B61BEF0D-F0BB-DE4B-95CE-6DB70DBA9567}" type="datetimeFigureOut">
               <a:rPr lang="en-US" dirty="0"/>
               <a:pPr/>
-              <a:t>9/14/2025</a:t>
+              <a:t>9/17/2025</a:t>
             </a:fld>
             <a:endParaRPr lang="en-US" dirty="0"/>
           </a:p>
@@ -5560,7 +8237,7 @@
             <a:fld id="{B61BEF0D-F0BB-DE4B-95CE-6DB70DBA9567}" type="datetimeFigureOut">
               <a:rPr lang="en-US" dirty="0"/>
               <a:pPr/>
-              <a:t>9/14/2025</a:t>
+              <a:t>9/17/2025</a:t>
             </a:fld>
             <a:endParaRPr lang="en-US" dirty="0"/>
           </a:p>
@@ -5924,7 +8601,7 @@
             <a:fld id="{B61BEF0D-F0BB-DE4B-95CE-6DB70DBA9567}" type="datetimeFigureOut">
               <a:rPr lang="en-US" dirty="0"/>
               <a:pPr/>
-              <a:t>9/14/2025</a:t>
+              <a:t>9/17/2025</a:t>
             </a:fld>
             <a:endParaRPr lang="en-US" dirty="0"/>
           </a:p>
@@ -6095,7 +8772,7 @@
             <a:fld id="{B61BEF0D-F0BB-DE4B-95CE-6DB70DBA9567}" type="datetimeFigureOut">
               <a:rPr lang="en-US" dirty="0"/>
               <a:pPr/>
-              <a:t>9/14/2025</a:t>
+              <a:t>9/17/2025</a:t>
             </a:fld>
             <a:endParaRPr lang="en-US" dirty="0"/>
           </a:p>
@@ -6272,7 +8949,7 @@
             <a:fld id="{B61BEF0D-F0BB-DE4B-95CE-6DB70DBA9567}" type="datetimeFigureOut">
               <a:rPr lang="en-US" dirty="0"/>
               <a:pPr/>
-              <a:t>9/14/2025</a:t>
+              <a:t>9/17/2025</a:t>
             </a:fld>
             <a:endParaRPr lang="en-US" dirty="0"/>
           </a:p>
@@ -6439,7 +9116,7 @@
             <a:fld id="{B61BEF0D-F0BB-DE4B-95CE-6DB70DBA9567}" type="datetimeFigureOut">
               <a:rPr lang="en-US" dirty="0"/>
               <a:pPr/>
-              <a:t>9/14/2025</a:t>
+              <a:t>9/17/2025</a:t>
             </a:fld>
             <a:endParaRPr lang="en-US" dirty="0"/>
           </a:p>
@@ -6686,7 +9363,7 @@
             <a:fld id="{B61BEF0D-F0BB-DE4B-95CE-6DB70DBA9567}" type="datetimeFigureOut">
               <a:rPr lang="en-US" dirty="0"/>
               <a:pPr/>
-              <a:t>9/14/2025</a:t>
+              <a:t>9/17/2025</a:t>
             </a:fld>
             <a:endParaRPr lang="en-US" dirty="0"/>
           </a:p>
@@ -6919,7 +9596,7 @@
             <a:fld id="{B61BEF0D-F0BB-DE4B-95CE-6DB70DBA9567}" type="datetimeFigureOut">
               <a:rPr lang="en-US" dirty="0"/>
               <a:pPr/>
-              <a:t>9/14/2025</a:t>
+              <a:t>9/17/2025</a:t>
             </a:fld>
             <a:endParaRPr lang="en-US" dirty="0"/>
           </a:p>
@@ -7298,7 +9975,7 @@
             <a:fld id="{B61BEF0D-F0BB-DE4B-95CE-6DB70DBA9567}" type="datetimeFigureOut">
               <a:rPr lang="en-US" dirty="0"/>
               <a:pPr/>
-              <a:t>9/14/2025</a:t>
+              <a:t>9/17/2025</a:t>
             </a:fld>
             <a:endParaRPr lang="en-US" dirty="0"/>
           </a:p>
@@ -7413,7 +10090,7 @@
             <a:fld id="{B61BEF0D-F0BB-DE4B-95CE-6DB70DBA9567}" type="datetimeFigureOut">
               <a:rPr lang="en-US" dirty="0"/>
               <a:pPr/>
-              <a:t>9/14/2025</a:t>
+              <a:t>9/17/2025</a:t>
             </a:fld>
             <a:endParaRPr lang="en-US" dirty="0"/>
           </a:p>
@@ -7505,7 +10182,7 @@
             <a:fld id="{B61BEF0D-F0BB-DE4B-95CE-6DB70DBA9567}" type="datetimeFigureOut">
               <a:rPr lang="en-US" dirty="0"/>
               <a:pPr/>
-              <a:t>9/14/2025</a:t>
+              <a:t>9/17/2025</a:t>
             </a:fld>
             <a:endParaRPr lang="en-US" dirty="0"/>
           </a:p>
@@ -7757,7 +10434,7 @@
             <a:fld id="{B61BEF0D-F0BB-DE4B-95CE-6DB70DBA9567}" type="datetimeFigureOut">
               <a:rPr lang="en-US" dirty="0"/>
               <a:pPr/>
-              <a:t>9/14/2025</a:t>
+              <a:t>9/17/2025</a:t>
             </a:fld>
             <a:endParaRPr lang="en-US" dirty="0"/>
           </a:p>
@@ -8037,7 +10714,7 @@
             <a:fld id="{B61BEF0D-F0BB-DE4B-95CE-6DB70DBA9567}" type="datetimeFigureOut">
               <a:rPr lang="en-US" dirty="0"/>
               <a:pPr/>
-              <a:t>9/14/2025</a:t>
+              <a:t>9/17/2025</a:t>
             </a:fld>
             <a:endParaRPr lang="en-US" dirty="0"/>
           </a:p>
@@ -8440,7 +11117,7 @@
             <a:fld id="{B61BEF0D-F0BB-DE4B-95CE-6DB70DBA9567}" type="datetimeFigureOut">
               <a:rPr lang="en-US" dirty="0"/>
               <a:pPr/>
-              <a:t>9/14/2025</a:t>
+              <a:t>9/17/2025</a:t>
             </a:fld>
             <a:endParaRPr lang="en-US" dirty="0"/>
           </a:p>
@@ -9135,7 +11812,7 @@
           <p:nvPr>
             <p:extLst>
               <p:ext uri="{D42A27DB-BD31-4B8C-83A1-F6EECF244321}">
-                <p14:modId xmlns:p14="http://schemas.microsoft.com/office/powerpoint/2010/main" val="4249877940"/>
+                <p14:modId xmlns:p14="http://schemas.microsoft.com/office/powerpoint/2010/main" val="3355748804"/>
               </p:ext>
             </p:extLst>
           </p:nvPr>
@@ -9405,39 +12082,90 @@
             </a:lvl9pPr>
           </a:lstStyle>
           <a:p>
-            <a:pPr>
-              <a:buFont typeface="Wingdings" panose="05000000000000000000" pitchFamily="2" charset="2"/>
-              <a:buChar char="v"/>
+            <a:pPr marL="0" indent="0">
+              <a:buNone/>
             </a:pPr>
             <a:r>
-              <a:rPr lang="es-ES" b="1" dirty="0" err="1"/>
+              <a:rPr lang="es-ES" b="1" dirty="0" err="1">
+                <a:solidFill>
+                  <a:schemeClr val="bg1">
+                    <a:lumMod val="95000"/>
+                    <a:lumOff val="5000"/>
+                  </a:schemeClr>
+                </a:solidFill>
+              </a:rPr>
               <a:t>Insight</a:t>
             </a:r>
             <a:r>
-              <a:rPr lang="es-ES" b="1" dirty="0"/>
+              <a:rPr lang="es-ES" b="1" dirty="0">
+                <a:solidFill>
+                  <a:schemeClr val="bg1">
+                    <a:lumMod val="95000"/>
+                    <a:lumOff val="5000"/>
+                  </a:schemeClr>
+                </a:solidFill>
+              </a:rPr>
               <a:t>:</a:t>
             </a:r>
             <a:r>
-              <a:rPr lang="es-ES" dirty="0"/>
+              <a:rPr lang="es-ES" dirty="0">
+                <a:solidFill>
+                  <a:schemeClr val="bg1">
+                    <a:lumMod val="95000"/>
+                    <a:lumOff val="5000"/>
+                  </a:schemeClr>
+                </a:solidFill>
+              </a:rPr>
               <a:t> </a:t>
             </a:r>
             <a:r>
-              <a:rPr lang="es-ES" i="1" dirty="0"/>
+              <a:rPr lang="es-ES" i="1" dirty="0">
+                <a:solidFill>
+                  <a:schemeClr val="bg1">
+                    <a:lumMod val="95000"/>
+                    <a:lumOff val="5000"/>
+                  </a:schemeClr>
+                </a:solidFill>
+              </a:rPr>
               <a:t>Mercado concentrado en Norteamérica y Europa Occidental.</a:t>
             </a:r>
           </a:p>
           <a:p>
-            <a:pPr>
-              <a:buFont typeface="Wingdings" panose="05000000000000000000" pitchFamily="2" charset="2"/>
-              <a:buChar char="v"/>
+            <a:pPr marL="0" indent="0">
+              <a:buNone/>
             </a:pPr>
             <a:r>
-              <a:rPr lang="es-ES" b="1" dirty="0"/>
+              <a:rPr lang="es-ES" b="1" dirty="0">
+                <a:solidFill>
+                  <a:schemeClr val="bg1">
+                    <a:lumMod val="95000"/>
+                    <a:lumOff val="5000"/>
+                  </a:schemeClr>
+                </a:solidFill>
+              </a:rPr>
               <a:t>Dato clave:</a:t>
             </a:r>
             <a:r>
-              <a:rPr lang="es-ES" dirty="0"/>
-              <a:t> 91 clientes en total.</a:t>
+              <a:rPr lang="es-ES" dirty="0">
+                <a:solidFill>
+                  <a:schemeClr val="bg1">
+                    <a:lumMod val="95000"/>
+                    <a:lumOff val="5000"/>
+                  </a:schemeClr>
+                </a:solidFill>
+              </a:rPr>
+              <a:t> </a:t>
+            </a:r>
+            <a:r>
+              <a:rPr lang="es-ES" i="1" dirty="0">
+                <a:solidFill>
+                  <a:schemeClr val="bg1">
+                    <a:lumMod val="95000"/>
+                    <a:lumOff val="5000"/>
+                  </a:schemeClr>
+                </a:solidFill>
+              </a:rPr>
+              <a:t>91 clientes en total.</a:t>
             </a:r>
           </a:p>
         </p:txBody>
@@ -9490,7 +12218,7 @@
         </p:nvSpPr>
         <p:spPr>
           <a:xfrm>
-            <a:off x="1" y="0"/>
+            <a:off x="201882" y="190005"/>
             <a:ext cx="6612556" cy="1578543"/>
           </a:xfrm>
         </p:spPr>
@@ -9502,38 +12230,78 @@
               <a:buNone/>
             </a:pPr>
             <a:r>
-              <a:rPr lang="es-ES" b="1" dirty="0" err="1"/>
+              <a:rPr lang="es-ES" b="1" dirty="0" err="1">
+                <a:solidFill>
+                  <a:schemeClr val="bg1">
+                    <a:lumMod val="95000"/>
+                    <a:lumOff val="5000"/>
+                  </a:schemeClr>
+                </a:solidFill>
+              </a:rPr>
               <a:t>Insight</a:t>
             </a:r>
             <a:r>
-              <a:rPr lang="es-ES" b="1" dirty="0"/>
+              <a:rPr lang="es-ES" b="1" dirty="0">
+                <a:solidFill>
+                  <a:schemeClr val="bg1">
+                    <a:lumMod val="95000"/>
+                    <a:lumOff val="5000"/>
+                  </a:schemeClr>
+                </a:solidFill>
+              </a:rPr>
               <a:t>:</a:t>
             </a:r>
             <a:r>
-              <a:rPr lang="es-ES" dirty="0"/>
+              <a:rPr lang="es-ES" dirty="0">
+                <a:solidFill>
+                  <a:schemeClr val="bg1">
+                    <a:lumMod val="95000"/>
+                    <a:lumOff val="5000"/>
+                  </a:schemeClr>
+                </a:solidFill>
+              </a:rPr>
               <a:t> </a:t>
             </a:r>
           </a:p>
           <a:p>
-            <a:pPr>
-              <a:buFont typeface="Wingdings" panose="05000000000000000000" pitchFamily="2" charset="2"/>
-              <a:buChar char="v"/>
+            <a:pPr marL="0" indent="0">
+              <a:buNone/>
             </a:pPr>
             <a:r>
-              <a:rPr lang="es-ES" i="1" dirty="0"/>
+              <a:rPr lang="es-ES" i="1" dirty="0">
+                <a:solidFill>
+                  <a:schemeClr val="bg1">
+                    <a:lumMod val="95000"/>
+                    <a:lumOff val="5000"/>
+                  </a:schemeClr>
+                </a:solidFill>
+              </a:rPr>
               <a:t>Categorías premium: carnes (≈54 USD). </a:t>
             </a:r>
           </a:p>
           <a:p>
-            <a:pPr>
-              <a:buFont typeface="Wingdings" panose="05000000000000000000" pitchFamily="2" charset="2"/>
-              <a:buChar char="v"/>
+            <a:pPr marL="0" indent="0">
+              <a:buNone/>
             </a:pPr>
             <a:r>
-              <a:rPr lang="es-ES" i="1" dirty="0"/>
+              <a:rPr lang="es-ES" i="1" dirty="0">
+                <a:solidFill>
+                  <a:schemeClr val="bg1">
+                    <a:lumMod val="95000"/>
+                    <a:lumOff val="5000"/>
+                  </a:schemeClr>
+                </a:solidFill>
+              </a:rPr>
               <a:t>Más económicos: granos y cereales (≈20 USD).</a:t>
             </a:r>
-            <a:endParaRPr lang="es-ES" dirty="0"/>
+            <a:endParaRPr lang="es-ES" dirty="0">
+              <a:solidFill>
+                <a:schemeClr val="bg1">
+                  <a:lumMod val="95000"/>
+                  <a:lumOff val="5000"/>
+                </a:schemeClr>
+              </a:solidFill>
+            </a:endParaRPr>
           </a:p>
         </p:txBody>
       </p:sp>
@@ -9550,14 +12318,14 @@
           <p:nvPr>
             <p:extLst>
               <p:ext uri="{D42A27DB-BD31-4B8C-83A1-F6EECF244321}">
-                <p14:modId xmlns:p14="http://schemas.microsoft.com/office/powerpoint/2010/main" val="3016374404"/>
+                <p14:modId xmlns:p14="http://schemas.microsoft.com/office/powerpoint/2010/main" val="2704121329"/>
               </p:ext>
             </p:extLst>
           </p:nvPr>
         </p:nvGraphicFramePr>
         <p:xfrm>
           <a:off x="352927" y="2438711"/>
-          <a:ext cx="5743073" cy="3801980"/>
+          <a:ext cx="5596611" cy="3801980"/>
         </p:xfrm>
         <a:graphic>
           <a:graphicData uri="http://schemas.openxmlformats.org/drawingml/2006/chart">
@@ -9578,14 +12346,14 @@
           <p:nvPr>
             <p:extLst>
               <p:ext uri="{D42A27DB-BD31-4B8C-83A1-F6EECF244321}">
-                <p14:modId xmlns:p14="http://schemas.microsoft.com/office/powerpoint/2010/main" val="1290379194"/>
+                <p14:modId xmlns:p14="http://schemas.microsoft.com/office/powerpoint/2010/main" val="542205575"/>
               </p:ext>
             </p:extLst>
           </p:nvPr>
         </p:nvGraphicFramePr>
         <p:xfrm>
-          <a:off x="6612558" y="2438711"/>
-          <a:ext cx="5116360" cy="3801980"/>
+          <a:off x="6483927" y="2438711"/>
+          <a:ext cx="5244991" cy="3801980"/>
         </p:xfrm>
         <a:graphic>
           <a:graphicData uri="http://schemas.openxmlformats.org/drawingml/2006/chart">
@@ -9625,46 +12393,6 @@
       </p:grpSpPr>
       <p:sp>
         <p:nvSpPr>
-          <p:cNvPr id="2" name="Título 1">
-            <a:extLst>
-              <a:ext uri="{FF2B5EF4-FFF2-40B4-BE49-F238E27FC236}">
-                <a16:creationId xmlns:a16="http://schemas.microsoft.com/office/drawing/2014/main" id="{E7212D62-36BA-FD7E-22A4-718B7E466CCE}"/>
-              </a:ext>
-            </a:extLst>
-          </p:cNvPr>
-          <p:cNvSpPr>
-            <a:spLocks noGrp="1"/>
-          </p:cNvSpPr>
-          <p:nvPr>
-            <p:ph type="title"/>
-          </p:nvPr>
-        </p:nvSpPr>
-        <p:spPr/>
-        <p:txBody>
-          <a:bodyPr>
-            <a:normAutofit/>
-          </a:bodyPr>
-          <a:lstStyle/>
-          <a:p>
-            <a:pPr lvl="0" defTabSz="914400" eaLnBrk="0" fontAlgn="base" hangingPunct="0">
-              <a:spcAft>
-                <a:spcPct val="0"/>
-              </a:spcAft>
-            </a:pPr>
-            <a:br>
-              <a:rPr lang="es-ES" altLang="es-ES" cap="none" dirty="0">
-                <a:ln>
-                  <a:noFill/>
-                </a:ln>
-                <a:latin typeface="Arial" panose="020B0604020202020204" pitchFamily="34" charset="0"/>
-              </a:rPr>
-            </a:br>
-            <a:endParaRPr lang="es-ES" dirty="0"/>
-          </a:p>
-        </p:txBody>
-      </p:sp>
-      <p:sp>
-        <p:nvSpPr>
           <p:cNvPr id="4" name="Rectangle 1">
             <a:extLst>
               <a:ext uri="{FF2B5EF4-FFF2-40B4-BE49-F238E27FC236}">
@@ -9681,8 +12409,8 @@
         </p:nvSpPr>
         <p:spPr bwMode="auto">
           <a:xfrm>
-            <a:off x="575355" y="4200705"/>
-            <a:ext cx="1390124" cy="1200329"/>
+            <a:off x="286597" y="904405"/>
+            <a:ext cx="1326004" cy="1200329"/>
           </a:xfrm>
           <a:prstGeom prst="rect">
             <a:avLst/>
@@ -9739,67 +12467,98 @@
               </a:spcAft>
               <a:buClrTx/>
               <a:buSzTx/>
-              <a:buFontTx/>
-              <a:buChar char="•"/>
+              <a:buNone/>
             </a:pPr>
             <a:r>
               <a:rPr lang="es-ES" altLang="es-ES" sz="1800" dirty="0">
+                <a:solidFill>
+                  <a:schemeClr val="bg1">
+                    <a:lumMod val="95000"/>
+                    <a:lumOff val="5000"/>
+                  </a:schemeClr>
+                </a:solidFill>
                 <a:latin typeface="Arial" panose="020B0604020202020204" pitchFamily="34" charset="0"/>
               </a:rPr>
               <a:t>Datos:</a:t>
             </a:r>
             <a:br>
               <a:rPr lang="es-ES" altLang="es-ES" sz="1800" dirty="0">
+                <a:solidFill>
+                  <a:schemeClr val="bg1">
+                    <a:lumMod val="95000"/>
+                    <a:lumOff val="5000"/>
+                  </a:schemeClr>
+                </a:solidFill>
                 <a:latin typeface="Arial" panose="020B0604020202020204" pitchFamily="34" charset="0"/>
               </a:rPr>
             </a:br>
             <a:r>
               <a:rPr lang="es-ES" altLang="es-ES" sz="1800" dirty="0">
+                <a:solidFill>
+                  <a:schemeClr val="bg1">
+                    <a:lumMod val="95000"/>
+                    <a:lumOff val="5000"/>
+                  </a:schemeClr>
+                </a:solidFill>
                 <a:latin typeface="Arial" panose="020B0604020202020204" pitchFamily="34" charset="0"/>
               </a:rPr>
               <a:t>1996: 193k</a:t>
             </a:r>
             <a:br>
               <a:rPr lang="es-ES" altLang="es-ES" sz="1800" dirty="0">
+                <a:solidFill>
+                  <a:schemeClr val="bg1">
+                    <a:lumMod val="95000"/>
+                    <a:lumOff val="5000"/>
+                  </a:schemeClr>
+                </a:solidFill>
                 <a:latin typeface="Arial" panose="020B0604020202020204" pitchFamily="34" charset="0"/>
               </a:rPr>
             </a:br>
             <a:r>
               <a:rPr lang="es-ES" altLang="es-ES" sz="1800" dirty="0">
+                <a:solidFill>
+                  <a:schemeClr val="bg1">
+                    <a:lumMod val="95000"/>
+                    <a:lumOff val="5000"/>
+                  </a:schemeClr>
+                </a:solidFill>
                 <a:latin typeface="Arial" panose="020B0604020202020204" pitchFamily="34" charset="0"/>
               </a:rPr>
               <a:t>1997: 608k</a:t>
             </a:r>
             <a:br>
               <a:rPr lang="es-ES" altLang="es-ES" sz="1800" dirty="0">
+                <a:solidFill>
+                  <a:schemeClr val="bg1">
+                    <a:lumMod val="95000"/>
+                    <a:lumOff val="5000"/>
+                  </a:schemeClr>
+                </a:solidFill>
                 <a:latin typeface="Arial" panose="020B0604020202020204" pitchFamily="34" charset="0"/>
               </a:rPr>
             </a:br>
             <a:r>
               <a:rPr lang="es-ES" altLang="es-ES" sz="1800" dirty="0">
+                <a:solidFill>
+                  <a:schemeClr val="bg1">
+                    <a:lumMod val="95000"/>
+                    <a:lumOff val="5000"/>
+                  </a:schemeClr>
+                </a:solidFill>
                 <a:latin typeface="Arial" panose="020B0604020202020204" pitchFamily="34" charset="0"/>
               </a:rPr>
               <a:t>1998: 438k</a:t>
-            </a:r>
-            <a:r>
-              <a:rPr kumimoji="0" lang="es-ES" altLang="es-ES" sz="1800" b="0" i="1" u="none" strike="noStrike" cap="none" normalizeH="0" baseline="0" dirty="0">
-                <a:ln>
-                  <a:noFill/>
-                </a:ln>
-                <a:solidFill>
-                  <a:schemeClr val="tx1"/>
-                </a:solidFill>
-                <a:effectLst/>
-                <a:latin typeface="Arial" panose="020B0604020202020204" pitchFamily="34" charset="0"/>
-              </a:rPr>
-              <a:t>.</a:t>
             </a:r>
             <a:endParaRPr kumimoji="0" lang="es-ES" altLang="es-ES" sz="1800" b="0" i="0" u="none" strike="noStrike" cap="none" normalizeH="0" baseline="0" dirty="0">
               <a:ln>
                 <a:noFill/>
               </a:ln>
               <a:solidFill>
-                <a:schemeClr val="tx1"/>
+                <a:schemeClr val="bg1">
+                  <a:lumMod val="95000"/>
+                  <a:lumOff val="5000"/>
+                </a:schemeClr>
               </a:solidFill>
               <a:effectLst/>
               <a:latin typeface="Arial" panose="020B0604020202020204" pitchFamily="34" charset="0"/>
@@ -9823,8 +12582,8 @@
         </p:nvSpPr>
         <p:spPr bwMode="auto">
           <a:xfrm>
-            <a:off x="135968" y="314870"/>
-            <a:ext cx="8023350" cy="369332"/>
+            <a:off x="150257" y="319556"/>
+            <a:ext cx="9602309" cy="400110"/>
           </a:xfrm>
           <a:prstGeom prst="rect">
             <a:avLst/>
@@ -10107,42 +12866,41 @@
               </a:spcAft>
               <a:buClrTx/>
               <a:buSzTx/>
-              <a:buFontTx/>
-              <a:buChar char="•"/>
+              <a:buNone/>
             </a:pPr>
             <a:r>
-              <a:rPr lang="es-ES" altLang="es-ES" sz="1800" b="1">
-                <a:solidFill>
-                  <a:schemeClr val="tx1"/>
-                </a:solidFill>
-                <a:latin typeface="Arial" panose="020B0604020202020204" pitchFamily="34" charset="0"/>
+              <a:rPr lang="es-ES" altLang="es-ES" b="1" dirty="0" err="1">
+                <a:solidFill>
+                  <a:schemeClr val="bg1">
+                    <a:lumMod val="95000"/>
+                    <a:lumOff val="5000"/>
+                  </a:schemeClr>
+                </a:solidFill>
               </a:rPr>
-              <a:t>Insight:</a:t>
-            </a:r>
-            <a:r>
-              <a:rPr lang="es-ES" altLang="es-ES" sz="1800">
-                <a:solidFill>
-                  <a:schemeClr val="tx1"/>
-                </a:solidFill>
-                <a:latin typeface="Arial" panose="020B0604020202020204" pitchFamily="34" charset="0"/>
+              <a:t>Insight</a:t>
+            </a:r>
+            <a:r>
+              <a:rPr lang="es-ES" altLang="es-ES" b="1" dirty="0">
+                <a:solidFill>
+                  <a:schemeClr val="bg1">
+                    <a:lumMod val="95000"/>
+                    <a:lumOff val="5000"/>
+                  </a:schemeClr>
+                </a:solidFill>
               </a:rPr>
-              <a:t> </a:t>
-            </a:r>
-            <a:r>
-              <a:rPr lang="es-ES" altLang="es-ES" sz="1800" i="1">
-                <a:solidFill>
-                  <a:schemeClr val="tx1"/>
-                </a:solidFill>
-                <a:latin typeface="Arial" panose="020B0604020202020204" pitchFamily="34" charset="0"/>
+              <a:t>: </a:t>
+            </a:r>
+            <a:r>
+              <a:rPr lang="es-ES" altLang="es-ES" i="1" dirty="0">
+                <a:solidFill>
+                  <a:schemeClr val="bg1">
+                    <a:lumMod val="95000"/>
+                    <a:lumOff val="5000"/>
+                  </a:schemeClr>
+                </a:solidFill>
               </a:rPr>
               <a:t>1997 fue el año pico, con más del triple de ventas respecto a 1996.</a:t>
             </a:r>
-            <a:endParaRPr lang="es-ES" altLang="es-ES" sz="1800" dirty="0">
-              <a:solidFill>
-                <a:schemeClr val="tx1"/>
-              </a:solidFill>
-              <a:latin typeface="Arial" panose="020B0604020202020204" pitchFamily="34" charset="0"/>
-            </a:endParaRPr>
           </a:p>
         </p:txBody>
       </p:sp>
@@ -10159,14 +12917,497 @@
           <p:nvPr>
             <p:extLst>
               <p:ext uri="{D42A27DB-BD31-4B8C-83A1-F6EECF244321}">
-                <p14:modId xmlns:p14="http://schemas.microsoft.com/office/powerpoint/2010/main" val="285221071"/>
+                <p14:modId xmlns:p14="http://schemas.microsoft.com/office/powerpoint/2010/main" val="2066321555"/>
               </p:ext>
             </p:extLst>
           </p:nvPr>
         </p:nvGraphicFramePr>
         <p:xfrm>
-          <a:off x="2032000" y="719666"/>
-          <a:ext cx="8128000" cy="5418667"/>
+          <a:off x="1757548" y="1341911"/>
+          <a:ext cx="8224310" cy="5362787"/>
+        </p:xfrm>
+        <a:graphic>
+          <a:graphicData uri="http://schemas.openxmlformats.org/drawingml/2006/chart">
+            <c:chart xmlns:c="http://schemas.openxmlformats.org/drawingml/2006/chart" xmlns:r="http://schemas.openxmlformats.org/officeDocument/2006/relationships" r:id="rId2"/>
+          </a:graphicData>
+        </a:graphic>
+      </p:graphicFrame>
+      <p:sp>
+        <p:nvSpPr>
+          <p:cNvPr id="9" name="CuadroTexto 8">
+            <a:extLst>
+              <a:ext uri="{FF2B5EF4-FFF2-40B4-BE49-F238E27FC236}">
+                <a16:creationId xmlns:a16="http://schemas.microsoft.com/office/drawing/2014/main" id="{F226276E-BE14-D7CC-9455-95316F2481B0}"/>
+              </a:ext>
+            </a:extLst>
+          </p:cNvPr>
+          <p:cNvSpPr txBox="1"/>
+          <p:nvPr/>
+        </p:nvSpPr>
+        <p:spPr>
+          <a:xfrm>
+            <a:off x="3301341" y="5516089"/>
+            <a:ext cx="724394" cy="369332"/>
+          </a:xfrm>
+          <a:prstGeom prst="rect">
+            <a:avLst/>
+          </a:prstGeom>
+          <a:noFill/>
+        </p:spPr>
+        <p:txBody>
+          <a:bodyPr wrap="square">
+            <a:spAutoFit/>
+          </a:bodyPr>
+          <a:lstStyle/>
+          <a:p>
+            <a:r>
+              <a:rPr lang="es-ES" altLang="es-ES" sz="1800" dirty="0">
+                <a:latin typeface="Arial" panose="020B0604020202020204" pitchFamily="34" charset="0"/>
+              </a:rPr>
+              <a:t>193k</a:t>
+            </a:r>
+            <a:endParaRPr lang="es-ES" dirty="0"/>
+          </a:p>
+        </p:txBody>
+      </p:sp>
+      <p:sp>
+        <p:nvSpPr>
+          <p:cNvPr id="11" name="CuadroTexto 10">
+            <a:extLst>
+              <a:ext uri="{FF2B5EF4-FFF2-40B4-BE49-F238E27FC236}">
+                <a16:creationId xmlns:a16="http://schemas.microsoft.com/office/drawing/2014/main" id="{2B6D8E11-4DA1-A4F0-F409-FF331EE9180E}"/>
+              </a:ext>
+            </a:extLst>
+          </p:cNvPr>
+          <p:cNvSpPr txBox="1"/>
+          <p:nvPr/>
+        </p:nvSpPr>
+        <p:spPr>
+          <a:xfrm>
+            <a:off x="5733803" y="4115499"/>
+            <a:ext cx="724394" cy="646331"/>
+          </a:xfrm>
+          <a:prstGeom prst="rect">
+            <a:avLst/>
+          </a:prstGeom>
+          <a:noFill/>
+        </p:spPr>
+        <p:txBody>
+          <a:bodyPr wrap="square">
+            <a:spAutoFit/>
+          </a:bodyPr>
+          <a:lstStyle/>
+          <a:p>
+            <a:r>
+              <a:rPr lang="es-ES" altLang="es-ES" sz="1800" dirty="0">
+                <a:latin typeface="Arial" panose="020B0604020202020204" pitchFamily="34" charset="0"/>
+              </a:rPr>
+              <a:t>608k</a:t>
+            </a:r>
+            <a:br>
+              <a:rPr lang="es-ES" altLang="es-ES" sz="1800" dirty="0">
+                <a:latin typeface="Arial" panose="020B0604020202020204" pitchFamily="34" charset="0"/>
+              </a:rPr>
+            </a:br>
+            <a:endParaRPr lang="es-ES" dirty="0"/>
+          </a:p>
+        </p:txBody>
+      </p:sp>
+      <p:sp>
+        <p:nvSpPr>
+          <p:cNvPr id="13" name="CuadroTexto 12">
+            <a:extLst>
+              <a:ext uri="{FF2B5EF4-FFF2-40B4-BE49-F238E27FC236}">
+                <a16:creationId xmlns:a16="http://schemas.microsoft.com/office/drawing/2014/main" id="{6B1659C6-280F-0F88-6B7C-EEE6F78B84DD}"/>
+              </a:ext>
+            </a:extLst>
+          </p:cNvPr>
+          <p:cNvSpPr txBox="1"/>
+          <p:nvPr/>
+        </p:nvSpPr>
+        <p:spPr>
+          <a:xfrm>
+            <a:off x="8205850" y="4669635"/>
+            <a:ext cx="724394" cy="369332"/>
+          </a:xfrm>
+          <a:prstGeom prst="rect">
+            <a:avLst/>
+          </a:prstGeom>
+          <a:noFill/>
+        </p:spPr>
+        <p:txBody>
+          <a:bodyPr wrap="square">
+            <a:spAutoFit/>
+          </a:bodyPr>
+          <a:lstStyle/>
+          <a:p>
+            <a:r>
+              <a:rPr lang="es-ES" altLang="es-ES" sz="1800" dirty="0">
+                <a:latin typeface="Arial" panose="020B0604020202020204" pitchFamily="34" charset="0"/>
+              </a:rPr>
+              <a:t>438k</a:t>
+            </a:r>
+            <a:endParaRPr lang="es-ES" dirty="0"/>
+          </a:p>
+        </p:txBody>
+      </p:sp>
+    </p:spTree>
+    <p:extLst>
+      <p:ext uri="{BB962C8B-B14F-4D97-AF65-F5344CB8AC3E}">
+        <p14:creationId xmlns:p14="http://schemas.microsoft.com/office/powerpoint/2010/main" val="2640548449"/>
+      </p:ext>
+    </p:extLst>
+  </p:cSld>
+  <p:clrMapOvr>
+    <a:masterClrMapping/>
+  </p:clrMapOvr>
+</p:sld>
+</file>
+
+<file path=ppt/slides/slide5.xml><?xml version="1.0" encoding="utf-8"?>
+<p:sld xmlns:a="http://schemas.openxmlformats.org/drawingml/2006/main" xmlns:r="http://schemas.openxmlformats.org/officeDocument/2006/relationships" xmlns:p="http://schemas.openxmlformats.org/presentationml/2006/main">
+  <p:cSld>
+    <p:spTree>
+      <p:nvGrpSpPr>
+        <p:cNvPr id="1" name=""/>
+        <p:cNvGrpSpPr/>
+        <p:nvPr/>
+      </p:nvGrpSpPr>
+      <p:grpSpPr>
+        <a:xfrm>
+          <a:off x="0" y="0"/>
+          <a:ext cx="0" cy="0"/>
+          <a:chOff x="0" y="0"/>
+          <a:chExt cx="0" cy="0"/>
+        </a:xfrm>
+      </p:grpSpPr>
+      <p:graphicFrame>
+        <p:nvGraphicFramePr>
+          <p:cNvPr id="6" name="Gráfico 5">
+            <a:extLst>
+              <a:ext uri="{FF2B5EF4-FFF2-40B4-BE49-F238E27FC236}">
+                <a16:creationId xmlns:a16="http://schemas.microsoft.com/office/drawing/2014/main" id="{9397B745-3A1C-8C99-E774-DCEF050D7725}"/>
+              </a:ext>
+            </a:extLst>
+          </p:cNvPr>
+          <p:cNvGraphicFramePr/>
+          <p:nvPr>
+            <p:extLst>
+              <p:ext uri="{D42A27DB-BD31-4B8C-83A1-F6EECF244321}">
+                <p14:modId xmlns:p14="http://schemas.microsoft.com/office/powerpoint/2010/main" val="2824781893"/>
+              </p:ext>
+            </p:extLst>
+          </p:nvPr>
+        </p:nvGraphicFramePr>
+        <p:xfrm>
+          <a:off x="365496" y="1531918"/>
+          <a:ext cx="5730504" cy="5069554"/>
+        </p:xfrm>
+        <a:graphic>
+          <a:graphicData uri="http://schemas.openxmlformats.org/drawingml/2006/chart">
+            <c:chart xmlns:c="http://schemas.openxmlformats.org/drawingml/2006/chart" xmlns:r="http://schemas.openxmlformats.org/officeDocument/2006/relationships" r:id="rId2"/>
+          </a:graphicData>
+        </a:graphic>
+      </p:graphicFrame>
+      <p:graphicFrame>
+        <p:nvGraphicFramePr>
+          <p:cNvPr id="9" name="Gráfico 8">
+            <a:extLst>
+              <a:ext uri="{FF2B5EF4-FFF2-40B4-BE49-F238E27FC236}">
+                <a16:creationId xmlns:a16="http://schemas.microsoft.com/office/drawing/2014/main" id="{2146CFE1-CB8D-7996-4CF3-1D4B08FED270}"/>
+              </a:ext>
+            </a:extLst>
+          </p:cNvPr>
+          <p:cNvGraphicFramePr/>
+          <p:nvPr>
+            <p:extLst>
+              <p:ext uri="{D42A27DB-BD31-4B8C-83A1-F6EECF244321}">
+                <p14:modId xmlns:p14="http://schemas.microsoft.com/office/powerpoint/2010/main" val="2633264838"/>
+              </p:ext>
+            </p:extLst>
+          </p:nvPr>
+        </p:nvGraphicFramePr>
+        <p:xfrm>
+          <a:off x="6567055" y="1531916"/>
+          <a:ext cx="5259449" cy="5069553"/>
+        </p:xfrm>
+        <a:graphic>
+          <a:graphicData uri="http://schemas.openxmlformats.org/drawingml/2006/chart">
+            <c:chart xmlns:c="http://schemas.openxmlformats.org/drawingml/2006/chart" xmlns:r="http://schemas.openxmlformats.org/officeDocument/2006/relationships" r:id="rId3"/>
+          </a:graphicData>
+        </a:graphic>
+      </p:graphicFrame>
+      <p:sp>
+        <p:nvSpPr>
+          <p:cNvPr id="11" name="CuadroTexto 10">
+            <a:extLst>
+              <a:ext uri="{FF2B5EF4-FFF2-40B4-BE49-F238E27FC236}">
+                <a16:creationId xmlns:a16="http://schemas.microsoft.com/office/drawing/2014/main" id="{D67DAEEE-A010-953F-7BBF-8360931379A8}"/>
+              </a:ext>
+            </a:extLst>
+          </p:cNvPr>
+          <p:cNvSpPr txBox="1"/>
+          <p:nvPr/>
+        </p:nvSpPr>
+        <p:spPr>
+          <a:xfrm>
+            <a:off x="270493" y="351530"/>
+            <a:ext cx="6103916" cy="1015663"/>
+          </a:xfrm>
+          <a:prstGeom prst="rect">
+            <a:avLst/>
+          </a:prstGeom>
+          <a:noFill/>
+        </p:spPr>
+        <p:txBody>
+          <a:bodyPr wrap="square">
+            <a:spAutoFit/>
+          </a:bodyPr>
+          <a:lstStyle/>
+          <a:p>
+            <a:pPr>
+              <a:buNone/>
+            </a:pPr>
+            <a:r>
+              <a:rPr lang="en-US" sz="2000" b="1" dirty="0">
+                <a:solidFill>
+                  <a:schemeClr val="bg1">
+                    <a:lumMod val="95000"/>
+                    <a:lumOff val="5000"/>
+                  </a:schemeClr>
+                </a:solidFill>
+              </a:rPr>
+              <a:t>Insight:</a:t>
+            </a:r>
+          </a:p>
+          <a:p>
+            <a:r>
+              <a:rPr lang="en-US" sz="2000" i="1" dirty="0" err="1">
+                <a:solidFill>
+                  <a:schemeClr val="bg1">
+                    <a:lumMod val="95000"/>
+                    <a:lumOff val="5000"/>
+                  </a:schemeClr>
+                </a:solidFill>
+              </a:rPr>
+              <a:t>Cliente</a:t>
+            </a:r>
+            <a:r>
+              <a:rPr lang="en-US" sz="2000" i="1" dirty="0">
+                <a:solidFill>
+                  <a:schemeClr val="bg1">
+                    <a:lumMod val="95000"/>
+                    <a:lumOff val="5000"/>
+                  </a:schemeClr>
+                </a:solidFill>
+              </a:rPr>
+              <a:t> top: QUICK-Stop (110k).</a:t>
+            </a:r>
+          </a:p>
+          <a:p>
+            <a:r>
+              <a:rPr lang="en-US" sz="2000" i="1" dirty="0" err="1">
+                <a:solidFill>
+                  <a:schemeClr val="bg1">
+                    <a:lumMod val="95000"/>
+                    <a:lumOff val="5000"/>
+                  </a:schemeClr>
+                </a:solidFill>
+              </a:rPr>
+              <a:t>Producto</a:t>
+            </a:r>
+            <a:r>
+              <a:rPr lang="en-US" sz="2000" i="1" dirty="0">
+                <a:solidFill>
+                  <a:schemeClr val="bg1">
+                    <a:lumMod val="95000"/>
+                    <a:lumOff val="5000"/>
+                  </a:schemeClr>
+                </a:solidFill>
+              </a:rPr>
+              <a:t> top: Côte de </a:t>
+            </a:r>
+            <a:r>
+              <a:rPr lang="en-US" sz="2000" i="1" dirty="0" err="1">
+                <a:solidFill>
+                  <a:schemeClr val="bg1">
+                    <a:lumMod val="95000"/>
+                    <a:lumOff val="5000"/>
+                  </a:schemeClr>
+                </a:solidFill>
+              </a:rPr>
+              <a:t>Blaye</a:t>
+            </a:r>
+            <a:r>
+              <a:rPr lang="en-US" sz="2000" i="1" dirty="0">
+                <a:solidFill>
+                  <a:schemeClr val="bg1">
+                    <a:lumMod val="95000"/>
+                    <a:lumOff val="5000"/>
+                  </a:schemeClr>
+                </a:solidFill>
+              </a:rPr>
+              <a:t> (141k).</a:t>
+            </a:r>
+          </a:p>
+        </p:txBody>
+      </p:sp>
+    </p:spTree>
+    <p:extLst>
+      <p:ext uri="{BB962C8B-B14F-4D97-AF65-F5344CB8AC3E}">
+        <p14:creationId xmlns:p14="http://schemas.microsoft.com/office/powerpoint/2010/main" val="4287598835"/>
+      </p:ext>
+    </p:extLst>
+  </p:cSld>
+  <p:clrMapOvr>
+    <a:masterClrMapping/>
+  </p:clrMapOvr>
+</p:sld>
+</file>
+
+<file path=ppt/slides/slide6.xml><?xml version="1.0" encoding="utf-8"?>
+<p:sld xmlns:a="http://schemas.openxmlformats.org/drawingml/2006/main" xmlns:r="http://schemas.openxmlformats.org/officeDocument/2006/relationships" xmlns:p="http://schemas.openxmlformats.org/presentationml/2006/main">
+  <p:cSld>
+    <p:spTree>
+      <p:nvGrpSpPr>
+        <p:cNvPr id="1" name=""/>
+        <p:cNvGrpSpPr/>
+        <p:nvPr/>
+      </p:nvGrpSpPr>
+      <p:grpSpPr>
+        <a:xfrm>
+          <a:off x="0" y="0"/>
+          <a:ext cx="0" cy="0"/>
+          <a:chOff x="0" y="0"/>
+          <a:chExt cx="0" cy="0"/>
+        </a:xfrm>
+      </p:grpSpPr>
+      <p:sp>
+        <p:nvSpPr>
+          <p:cNvPr id="3" name="Marcador de contenido 2">
+            <a:extLst>
+              <a:ext uri="{FF2B5EF4-FFF2-40B4-BE49-F238E27FC236}">
+                <a16:creationId xmlns:a16="http://schemas.microsoft.com/office/drawing/2014/main" id="{A1E42FC4-272F-D8E4-903F-3FFEF51B304E}"/>
+              </a:ext>
+            </a:extLst>
+          </p:cNvPr>
+          <p:cNvSpPr>
+            <a:spLocks noGrp="1"/>
+          </p:cNvSpPr>
+          <p:nvPr>
+            <p:ph idx="1"/>
+          </p:nvPr>
+        </p:nvSpPr>
+        <p:spPr>
+          <a:xfrm>
+            <a:off x="292326" y="400463"/>
+            <a:ext cx="8534400" cy="2484142"/>
+          </a:xfrm>
+        </p:spPr>
+        <p:txBody>
+          <a:bodyPr/>
+          <a:lstStyle/>
+          <a:p>
+            <a:pPr marL="0" indent="0">
+              <a:buNone/>
+            </a:pPr>
+            <a:r>
+              <a:rPr lang="es-ES" b="1" dirty="0">
+                <a:solidFill>
+                  <a:schemeClr val="bg1">
+                    <a:lumMod val="95000"/>
+                    <a:lumOff val="5000"/>
+                  </a:schemeClr>
+                </a:solidFill>
+              </a:rPr>
+              <a:t>Conclusión:</a:t>
+            </a:r>
+            <a:endParaRPr lang="es-ES" dirty="0">
+              <a:solidFill>
+                <a:schemeClr val="bg1">
+                  <a:lumMod val="95000"/>
+                  <a:lumOff val="5000"/>
+                </a:schemeClr>
+              </a:solidFill>
+            </a:endParaRPr>
+          </a:p>
+          <a:p>
+            <a:pPr marL="0" indent="0">
+              <a:buNone/>
+            </a:pPr>
+            <a:r>
+              <a:rPr lang="es-ES" dirty="0">
+                <a:solidFill>
+                  <a:schemeClr val="bg1">
+                    <a:lumMod val="95000"/>
+                    <a:lumOff val="5000"/>
+                  </a:schemeClr>
+                </a:solidFill>
+              </a:rPr>
+              <a:t>Logística estable, con casos extremos.</a:t>
+            </a:r>
+          </a:p>
+          <a:p>
+            <a:pPr marL="0" indent="0">
+              <a:buNone/>
+            </a:pPr>
+            <a:r>
+              <a:rPr lang="es-ES" dirty="0">
+                <a:solidFill>
+                  <a:schemeClr val="bg1">
+                    <a:lumMod val="95000"/>
+                    <a:lumOff val="5000"/>
+                  </a:schemeClr>
+                </a:solidFill>
+              </a:rPr>
+              <a:t>Descuentos altos en 1997 acompañaron el crecimiento de ventas.</a:t>
+            </a:r>
+          </a:p>
+          <a:p>
+            <a:pPr marL="0" indent="0">
+              <a:buNone/>
+            </a:pPr>
+            <a:r>
+              <a:rPr lang="es-ES" dirty="0">
+                <a:solidFill>
+                  <a:schemeClr val="bg1">
+                    <a:lumMod val="95000"/>
+                    <a:lumOff val="5000"/>
+                  </a:schemeClr>
+                </a:solidFill>
+              </a:rPr>
+              <a:t>Oportunidad: diversificar clientes y monitorear tiempos de entrega largos.</a:t>
+            </a:r>
+          </a:p>
+          <a:p>
+            <a:pPr marL="0" indent="0">
+              <a:buNone/>
+            </a:pPr>
+            <a:endParaRPr lang="es-ES" dirty="0"/>
+          </a:p>
+        </p:txBody>
+      </p:sp>
+      <p:graphicFrame>
+        <p:nvGraphicFramePr>
+          <p:cNvPr id="6" name="Gráfico 5">
+            <a:extLst>
+              <a:ext uri="{FF2B5EF4-FFF2-40B4-BE49-F238E27FC236}">
+                <a16:creationId xmlns:a16="http://schemas.microsoft.com/office/drawing/2014/main" id="{AA2A7E1E-5AB6-3BEB-4E0D-0E91BDBE13C7}"/>
+              </a:ext>
+            </a:extLst>
+          </p:cNvPr>
+          <p:cNvGraphicFramePr/>
+          <p:nvPr>
+            <p:extLst>
+              <p:ext uri="{D42A27DB-BD31-4B8C-83A1-F6EECF244321}">
+                <p14:modId xmlns:p14="http://schemas.microsoft.com/office/powerpoint/2010/main" val="780786910"/>
+              </p:ext>
+            </p:extLst>
+          </p:nvPr>
+        </p:nvGraphicFramePr>
+        <p:xfrm>
+          <a:off x="292326" y="2884605"/>
+          <a:ext cx="8204530" cy="3674204"/>
         </p:xfrm>
         <a:graphic>
           <a:graphicData uri="http://schemas.openxmlformats.org/drawingml/2006/chart">
@@ -10177,7 +13418,7 @@
     </p:spTree>
     <p:extLst>
       <p:ext uri="{BB962C8B-B14F-4D97-AF65-F5344CB8AC3E}">
-        <p14:creationId xmlns:p14="http://schemas.microsoft.com/office/powerpoint/2010/main" val="2640548449"/>
+        <p14:creationId xmlns:p14="http://schemas.microsoft.com/office/powerpoint/2010/main" val="2829927072"/>
       </p:ext>
     </p:extLst>
   </p:cSld>

</xml_diff>